<commit_message>
update the graphs to use larger font and add intro materials
</commit_message>
<xml_diff>
--- a/example_workflow_0/provenance/workflow_0_graph.pptx
+++ b/example_workflow_0/provenance/workflow_0_graph.pptx
@@ -123,710 +123,6 @@
 <file path=ppt/changesInfos/changesInfo1.xml><?xml version="1.0" encoding="utf-8"?>
 <pc:chgInfo xmlns:a="http://schemas.openxmlformats.org/drawingml/2006/main" xmlns:r="http://schemas.openxmlformats.org/officeDocument/2006/relationships" xmlns:ac="http://schemas.microsoft.com/office/drawing/2013/main/command" xmlns:pc="http://schemas.microsoft.com/office/powerpoint/2013/main/command">
   <pc:docChgLst>
-    <pc:chgData name="Joseph Wonsil" userId="f7a5a8f17f3cf2df" providerId="LiveId" clId="{D6ABC174-D68B-445B-A75D-5908BB74AC88}"/>
-    <pc:docChg chg="undo custSel modSld">
-      <pc:chgData name="Joseph Wonsil" userId="f7a5a8f17f3cf2df" providerId="LiveId" clId="{D6ABC174-D68B-445B-A75D-5908BB74AC88}" dt="2023-10-16T23:29:24.950" v="686" actId="1076"/>
-      <pc:docMkLst>
-        <pc:docMk/>
-      </pc:docMkLst>
-      <pc:sldChg chg="addSp delSp modSp mod">
-        <pc:chgData name="Joseph Wonsil" userId="f7a5a8f17f3cf2df" providerId="LiveId" clId="{D6ABC174-D68B-445B-A75D-5908BB74AC88}" dt="2023-10-16T23:29:24.950" v="686" actId="1076"/>
-        <pc:sldMkLst>
-          <pc:docMk/>
-          <pc:sldMk cId="1645475767" sldId="256"/>
-        </pc:sldMkLst>
-        <pc:spChg chg="mod">
-          <ac:chgData name="Joseph Wonsil" userId="f7a5a8f17f3cf2df" providerId="LiveId" clId="{D6ABC174-D68B-445B-A75D-5908BB74AC88}" dt="2023-10-16T23:29:24.950" v="686" actId="1076"/>
-          <ac:spMkLst>
-            <pc:docMk/>
-            <pc:sldMk cId="1645475767" sldId="256"/>
-            <ac:spMk id="2" creationId="{461DAE0E-18AF-97FF-8732-1CF3DD2A0854}"/>
-          </ac:spMkLst>
-        </pc:spChg>
-        <pc:spChg chg="add mod">
-          <ac:chgData name="Joseph Wonsil" userId="f7a5a8f17f3cf2df" providerId="LiveId" clId="{D6ABC174-D68B-445B-A75D-5908BB74AC88}" dt="2023-10-16T23:29:24.950" v="686" actId="1076"/>
-          <ac:spMkLst>
-            <pc:docMk/>
-            <pc:sldMk cId="1645475767" sldId="256"/>
-            <ac:spMk id="3" creationId="{475EA8C8-F0A4-6F01-74CD-54546E0C2AEE}"/>
-          </ac:spMkLst>
-        </pc:spChg>
-        <pc:spChg chg="mod">
-          <ac:chgData name="Joseph Wonsil" userId="f7a5a8f17f3cf2df" providerId="LiveId" clId="{D6ABC174-D68B-445B-A75D-5908BB74AC88}" dt="2023-10-16T23:29:24.950" v="686" actId="1076"/>
-          <ac:spMkLst>
-            <pc:docMk/>
-            <pc:sldMk cId="1645475767" sldId="256"/>
-            <ac:spMk id="5" creationId="{EDD77D8E-AC62-8835-147A-8365BEE24A8B}"/>
-          </ac:spMkLst>
-        </pc:spChg>
-        <pc:spChg chg="mod">
-          <ac:chgData name="Joseph Wonsil" userId="f7a5a8f17f3cf2df" providerId="LiveId" clId="{D6ABC174-D68B-445B-A75D-5908BB74AC88}" dt="2023-10-16T23:29:24.950" v="686" actId="1076"/>
-          <ac:spMkLst>
-            <pc:docMk/>
-            <pc:sldMk cId="1645475767" sldId="256"/>
-            <ac:spMk id="6" creationId="{F392B7D7-3E0F-8DD1-67FB-1EF515E6A632}"/>
-          </ac:spMkLst>
-        </pc:spChg>
-        <pc:spChg chg="mod">
-          <ac:chgData name="Joseph Wonsil" userId="f7a5a8f17f3cf2df" providerId="LiveId" clId="{D6ABC174-D68B-445B-A75D-5908BB74AC88}" dt="2023-10-16T23:29:24.950" v="686" actId="1076"/>
-          <ac:spMkLst>
-            <pc:docMk/>
-            <pc:sldMk cId="1645475767" sldId="256"/>
-            <ac:spMk id="10" creationId="{5D155BFF-B441-4572-6BCC-1D6480ADC254}"/>
-          </ac:spMkLst>
-        </pc:spChg>
-        <pc:spChg chg="mod">
-          <ac:chgData name="Joseph Wonsil" userId="f7a5a8f17f3cf2df" providerId="LiveId" clId="{D6ABC174-D68B-445B-A75D-5908BB74AC88}" dt="2023-10-16T23:29:24.950" v="686" actId="1076"/>
-          <ac:spMkLst>
-            <pc:docMk/>
-            <pc:sldMk cId="1645475767" sldId="256"/>
-            <ac:spMk id="11" creationId="{89D3A37F-AE8C-286E-D005-973A429F2F60}"/>
-          </ac:spMkLst>
-        </pc:spChg>
-        <pc:spChg chg="mod">
-          <ac:chgData name="Joseph Wonsil" userId="f7a5a8f17f3cf2df" providerId="LiveId" clId="{D6ABC174-D68B-445B-A75D-5908BB74AC88}" dt="2023-10-16T23:29:24.950" v="686" actId="1076"/>
-          <ac:spMkLst>
-            <pc:docMk/>
-            <pc:sldMk cId="1645475767" sldId="256"/>
-            <ac:spMk id="13" creationId="{77E6E453-03D9-6363-9B2B-536E1D203421}"/>
-          </ac:spMkLst>
-        </pc:spChg>
-        <pc:spChg chg="mod">
-          <ac:chgData name="Joseph Wonsil" userId="f7a5a8f17f3cf2df" providerId="LiveId" clId="{D6ABC174-D68B-445B-A75D-5908BB74AC88}" dt="2023-10-16T23:29:24.950" v="686" actId="1076"/>
-          <ac:spMkLst>
-            <pc:docMk/>
-            <pc:sldMk cId="1645475767" sldId="256"/>
-            <ac:spMk id="14" creationId="{F7F39D2E-7806-1ED6-1633-3BF9C768F480}"/>
-          </ac:spMkLst>
-        </pc:spChg>
-        <pc:spChg chg="add mod">
-          <ac:chgData name="Joseph Wonsil" userId="f7a5a8f17f3cf2df" providerId="LiveId" clId="{D6ABC174-D68B-445B-A75D-5908BB74AC88}" dt="2023-10-16T23:29:24.950" v="686" actId="1076"/>
-          <ac:spMkLst>
-            <pc:docMk/>
-            <pc:sldMk cId="1645475767" sldId="256"/>
-            <ac:spMk id="15" creationId="{2082AF95-F57E-7714-98E1-6B18874A37D0}"/>
-          </ac:spMkLst>
-        </pc:spChg>
-        <pc:spChg chg="mod">
-          <ac:chgData name="Joseph Wonsil" userId="f7a5a8f17f3cf2df" providerId="LiveId" clId="{D6ABC174-D68B-445B-A75D-5908BB74AC88}" dt="2023-10-16T23:29:24.950" v="686" actId="1076"/>
-          <ac:spMkLst>
-            <pc:docMk/>
-            <pc:sldMk cId="1645475767" sldId="256"/>
-            <ac:spMk id="17" creationId="{63544155-B132-0D32-3BAA-3EC3DE1072D8}"/>
-          </ac:spMkLst>
-        </pc:spChg>
-        <pc:spChg chg="add del mod">
-          <ac:chgData name="Joseph Wonsil" userId="f7a5a8f17f3cf2df" providerId="LiveId" clId="{D6ABC174-D68B-445B-A75D-5908BB74AC88}" dt="2023-10-16T21:32:02.906" v="26" actId="478"/>
-          <ac:spMkLst>
-            <pc:docMk/>
-            <pc:sldMk cId="1645475767" sldId="256"/>
-            <ac:spMk id="18" creationId="{199C6CC3-53D2-D95F-05F9-68CA3527BA7F}"/>
-          </ac:spMkLst>
-        </pc:spChg>
-        <pc:spChg chg="mod">
-          <ac:chgData name="Joseph Wonsil" userId="f7a5a8f17f3cf2df" providerId="LiveId" clId="{D6ABC174-D68B-445B-A75D-5908BB74AC88}" dt="2023-10-16T23:29:24.950" v="686" actId="1076"/>
-          <ac:spMkLst>
-            <pc:docMk/>
-            <pc:sldMk cId="1645475767" sldId="256"/>
-            <ac:spMk id="19" creationId="{CDC98E58-B7BF-FC65-3CF4-7910AC6F1E87}"/>
-          </ac:spMkLst>
-        </pc:spChg>
-        <pc:spChg chg="add mod">
-          <ac:chgData name="Joseph Wonsil" userId="f7a5a8f17f3cf2df" providerId="LiveId" clId="{D6ABC174-D68B-445B-A75D-5908BB74AC88}" dt="2023-10-16T23:29:24.950" v="686" actId="1076"/>
-          <ac:spMkLst>
-            <pc:docMk/>
-            <pc:sldMk cId="1645475767" sldId="256"/>
-            <ac:spMk id="20" creationId="{F418ACC7-3AD4-0F3B-E0DB-D175E87A7239}"/>
-          </ac:spMkLst>
-        </pc:spChg>
-        <pc:spChg chg="mod">
-          <ac:chgData name="Joseph Wonsil" userId="f7a5a8f17f3cf2df" providerId="LiveId" clId="{D6ABC174-D68B-445B-A75D-5908BB74AC88}" dt="2023-10-16T23:29:24.950" v="686" actId="1076"/>
-          <ac:spMkLst>
-            <pc:docMk/>
-            <pc:sldMk cId="1645475767" sldId="256"/>
-            <ac:spMk id="21" creationId="{3C58F1C7-3BCD-294E-EA4C-FB19607A2A8B}"/>
-          </ac:spMkLst>
-        </pc:spChg>
-        <pc:spChg chg="add del mod">
-          <ac:chgData name="Joseph Wonsil" userId="f7a5a8f17f3cf2df" providerId="LiveId" clId="{D6ABC174-D68B-445B-A75D-5908BB74AC88}" dt="2023-10-16T21:29:14.438" v="23" actId="478"/>
-          <ac:spMkLst>
-            <pc:docMk/>
-            <pc:sldMk cId="1645475767" sldId="256"/>
-            <ac:spMk id="22" creationId="{E9D6ACCE-BADE-1C19-5BD8-11A7F1EDEA7B}"/>
-          </ac:spMkLst>
-        </pc:spChg>
-        <pc:spChg chg="mod">
-          <ac:chgData name="Joseph Wonsil" userId="f7a5a8f17f3cf2df" providerId="LiveId" clId="{D6ABC174-D68B-445B-A75D-5908BB74AC88}" dt="2023-10-16T23:29:24.950" v="686" actId="1076"/>
-          <ac:spMkLst>
-            <pc:docMk/>
-            <pc:sldMk cId="1645475767" sldId="256"/>
-            <ac:spMk id="24" creationId="{3DF15931-71E1-C90B-0673-3380DC81ED7C}"/>
-          </ac:spMkLst>
-        </pc:spChg>
-        <pc:spChg chg="add mod">
-          <ac:chgData name="Joseph Wonsil" userId="f7a5a8f17f3cf2df" providerId="LiveId" clId="{D6ABC174-D68B-445B-A75D-5908BB74AC88}" dt="2023-10-16T23:29:24.950" v="686" actId="1076"/>
-          <ac:spMkLst>
-            <pc:docMk/>
-            <pc:sldMk cId="1645475767" sldId="256"/>
-            <ac:spMk id="25" creationId="{E1A7F699-7971-B2D7-583B-A3C58DD464BF}"/>
-          </ac:spMkLst>
-        </pc:spChg>
-        <pc:spChg chg="add mod">
-          <ac:chgData name="Joseph Wonsil" userId="f7a5a8f17f3cf2df" providerId="LiveId" clId="{D6ABC174-D68B-445B-A75D-5908BB74AC88}" dt="2023-10-16T23:29:24.950" v="686" actId="1076"/>
-          <ac:spMkLst>
-            <pc:docMk/>
-            <pc:sldMk cId="1645475767" sldId="256"/>
-            <ac:spMk id="26" creationId="{1A397F50-31BF-2C16-56A3-490E4FF86B15}"/>
-          </ac:spMkLst>
-        </pc:spChg>
-        <pc:spChg chg="add mod">
-          <ac:chgData name="Joseph Wonsil" userId="f7a5a8f17f3cf2df" providerId="LiveId" clId="{D6ABC174-D68B-445B-A75D-5908BB74AC88}" dt="2023-10-16T23:29:24.950" v="686" actId="1076"/>
-          <ac:spMkLst>
-            <pc:docMk/>
-            <pc:sldMk cId="1645475767" sldId="256"/>
-            <ac:spMk id="27" creationId="{58A52717-D259-852F-EAFC-045F5DFD670C}"/>
-          </ac:spMkLst>
-        </pc:spChg>
-        <pc:spChg chg="mod">
-          <ac:chgData name="Joseph Wonsil" userId="f7a5a8f17f3cf2df" providerId="LiveId" clId="{D6ABC174-D68B-445B-A75D-5908BB74AC88}" dt="2023-10-16T23:29:24.950" v="686" actId="1076"/>
-          <ac:spMkLst>
-            <pc:docMk/>
-            <pc:sldMk cId="1645475767" sldId="256"/>
-            <ac:spMk id="28" creationId="{60C86E43-A887-CEA7-E6E6-67B122EE91E1}"/>
-          </ac:spMkLst>
-        </pc:spChg>
-        <pc:spChg chg="add del mod">
-          <ac:chgData name="Joseph Wonsil" userId="f7a5a8f17f3cf2df" providerId="LiveId" clId="{D6ABC174-D68B-445B-A75D-5908BB74AC88}" dt="2023-10-16T23:07:12.271" v="48" actId="478"/>
-          <ac:spMkLst>
-            <pc:docMk/>
-            <pc:sldMk cId="1645475767" sldId="256"/>
-            <ac:spMk id="29" creationId="{E55653A5-FDB2-CA9B-B199-C0A0E77B8895}"/>
-          </ac:spMkLst>
-        </pc:spChg>
-        <pc:spChg chg="add del mod">
-          <ac:chgData name="Joseph Wonsil" userId="f7a5a8f17f3cf2df" providerId="LiveId" clId="{D6ABC174-D68B-445B-A75D-5908BB74AC88}" dt="2023-10-16T23:14:04.912" v="198" actId="478"/>
-          <ac:spMkLst>
-            <pc:docMk/>
-            <pc:sldMk cId="1645475767" sldId="256"/>
-            <ac:spMk id="31" creationId="{EAF11AAC-02EB-71D5-395A-B2960947DE2A}"/>
-          </ac:spMkLst>
-        </pc:spChg>
-        <pc:spChg chg="mod">
-          <ac:chgData name="Joseph Wonsil" userId="f7a5a8f17f3cf2df" providerId="LiveId" clId="{D6ABC174-D68B-445B-A75D-5908BB74AC88}" dt="2023-10-16T23:29:24.950" v="686" actId="1076"/>
-          <ac:spMkLst>
-            <pc:docMk/>
-            <pc:sldMk cId="1645475767" sldId="256"/>
-            <ac:spMk id="32" creationId="{D4A062A0-410E-0FF1-9B6D-20281611B271}"/>
-          </ac:spMkLst>
-        </pc:spChg>
-        <pc:spChg chg="mod">
-          <ac:chgData name="Joseph Wonsil" userId="f7a5a8f17f3cf2df" providerId="LiveId" clId="{D6ABC174-D68B-445B-A75D-5908BB74AC88}" dt="2023-10-16T23:29:24.950" v="686" actId="1076"/>
-          <ac:spMkLst>
-            <pc:docMk/>
-            <pc:sldMk cId="1645475767" sldId="256"/>
-            <ac:spMk id="33" creationId="{B616FDAC-239F-3BA5-52A9-57EC0735B18A}"/>
-          </ac:spMkLst>
-        </pc:spChg>
-        <pc:spChg chg="add mod">
-          <ac:chgData name="Joseph Wonsil" userId="f7a5a8f17f3cf2df" providerId="LiveId" clId="{D6ABC174-D68B-445B-A75D-5908BB74AC88}" dt="2023-10-16T23:29:24.950" v="686" actId="1076"/>
-          <ac:spMkLst>
-            <pc:docMk/>
-            <pc:sldMk cId="1645475767" sldId="256"/>
-            <ac:spMk id="35" creationId="{79DFB4C1-7173-2B01-1064-8D6762B11BF5}"/>
-          </ac:spMkLst>
-        </pc:spChg>
-        <pc:spChg chg="add mod">
-          <ac:chgData name="Joseph Wonsil" userId="f7a5a8f17f3cf2df" providerId="LiveId" clId="{D6ABC174-D68B-445B-A75D-5908BB74AC88}" dt="2023-10-16T23:29:24.950" v="686" actId="1076"/>
-          <ac:spMkLst>
-            <pc:docMk/>
-            <pc:sldMk cId="1645475767" sldId="256"/>
-            <ac:spMk id="36" creationId="{B350F5B9-E2F8-D410-A3BA-F93D66DB605C}"/>
-          </ac:spMkLst>
-        </pc:spChg>
-        <pc:spChg chg="add del mod">
-          <ac:chgData name="Joseph Wonsil" userId="f7a5a8f17f3cf2df" providerId="LiveId" clId="{D6ABC174-D68B-445B-A75D-5908BB74AC88}" dt="2023-10-16T23:14:06.512" v="200" actId="478"/>
-          <ac:spMkLst>
-            <pc:docMk/>
-            <pc:sldMk cId="1645475767" sldId="256"/>
-            <ac:spMk id="38" creationId="{2E7A7201-8032-B266-461D-AF27F7AC8D30}"/>
-          </ac:spMkLst>
-        </pc:spChg>
-        <pc:spChg chg="add mod">
-          <ac:chgData name="Joseph Wonsil" userId="f7a5a8f17f3cf2df" providerId="LiveId" clId="{D6ABC174-D68B-445B-A75D-5908BB74AC88}" dt="2023-10-16T23:29:24.950" v="686" actId="1076"/>
-          <ac:spMkLst>
-            <pc:docMk/>
-            <pc:sldMk cId="1645475767" sldId="256"/>
-            <ac:spMk id="39" creationId="{6DC816CB-8782-D01C-BC59-A0FB21EA3108}"/>
-          </ac:spMkLst>
-        </pc:spChg>
-        <pc:spChg chg="add mod">
-          <ac:chgData name="Joseph Wonsil" userId="f7a5a8f17f3cf2df" providerId="LiveId" clId="{D6ABC174-D68B-445B-A75D-5908BB74AC88}" dt="2023-10-16T23:29:24.950" v="686" actId="1076"/>
-          <ac:spMkLst>
-            <pc:docMk/>
-            <pc:sldMk cId="1645475767" sldId="256"/>
-            <ac:spMk id="40" creationId="{FA25254E-DFA7-64F8-8FB4-6A5D4F0738C7}"/>
-          </ac:spMkLst>
-        </pc:spChg>
-        <pc:spChg chg="mod">
-          <ac:chgData name="Joseph Wonsil" userId="f7a5a8f17f3cf2df" providerId="LiveId" clId="{D6ABC174-D68B-445B-A75D-5908BB74AC88}" dt="2023-10-16T23:29:24.950" v="686" actId="1076"/>
-          <ac:spMkLst>
-            <pc:docMk/>
-            <pc:sldMk cId="1645475767" sldId="256"/>
-            <ac:spMk id="42" creationId="{62A6E74D-C00B-6C92-47F2-6164F95E0268}"/>
-          </ac:spMkLst>
-        </pc:spChg>
-        <pc:spChg chg="mod">
-          <ac:chgData name="Joseph Wonsil" userId="f7a5a8f17f3cf2df" providerId="LiveId" clId="{D6ABC174-D68B-445B-A75D-5908BB74AC88}" dt="2023-10-16T23:29:24.950" v="686" actId="1076"/>
-          <ac:spMkLst>
-            <pc:docMk/>
-            <pc:sldMk cId="1645475767" sldId="256"/>
-            <ac:spMk id="43" creationId="{B0ECA40D-A1F1-0CE3-96F9-10D673EB3C97}"/>
-          </ac:spMkLst>
-        </pc:spChg>
-        <pc:spChg chg="add del mod">
-          <ac:chgData name="Joseph Wonsil" userId="f7a5a8f17f3cf2df" providerId="LiveId" clId="{D6ABC174-D68B-445B-A75D-5908BB74AC88}" dt="2023-10-16T23:10:15.850" v="97" actId="478"/>
-          <ac:spMkLst>
-            <pc:docMk/>
-            <pc:sldMk cId="1645475767" sldId="256"/>
-            <ac:spMk id="44" creationId="{E43FD57E-4882-063D-6529-A05C3A8A72E9}"/>
-          </ac:spMkLst>
-        </pc:spChg>
-        <pc:spChg chg="mod">
-          <ac:chgData name="Joseph Wonsil" userId="f7a5a8f17f3cf2df" providerId="LiveId" clId="{D6ABC174-D68B-445B-A75D-5908BB74AC88}" dt="2023-10-16T23:29:24.950" v="686" actId="1076"/>
-          <ac:spMkLst>
-            <pc:docMk/>
-            <pc:sldMk cId="1645475767" sldId="256"/>
-            <ac:spMk id="49" creationId="{842C1335-EDA0-BED9-1A06-5454B66B2CE0}"/>
-          </ac:spMkLst>
-        </pc:spChg>
-        <pc:spChg chg="mod">
-          <ac:chgData name="Joseph Wonsil" userId="f7a5a8f17f3cf2df" providerId="LiveId" clId="{D6ABC174-D68B-445B-A75D-5908BB74AC88}" dt="2023-10-16T23:29:24.950" v="686" actId="1076"/>
-          <ac:spMkLst>
-            <pc:docMk/>
-            <pc:sldMk cId="1645475767" sldId="256"/>
-            <ac:spMk id="52" creationId="{7317D925-AE7B-290C-67A6-493750A3352F}"/>
-          </ac:spMkLst>
-        </pc:spChg>
-        <pc:spChg chg="mod">
-          <ac:chgData name="Joseph Wonsil" userId="f7a5a8f17f3cf2df" providerId="LiveId" clId="{D6ABC174-D68B-445B-A75D-5908BB74AC88}" dt="2023-10-16T23:29:24.950" v="686" actId="1076"/>
-          <ac:spMkLst>
-            <pc:docMk/>
-            <pc:sldMk cId="1645475767" sldId="256"/>
-            <ac:spMk id="55" creationId="{A5E815BE-843F-B791-FF94-453526BE2EF2}"/>
-          </ac:spMkLst>
-        </pc:spChg>
-        <pc:spChg chg="add del mod">
-          <ac:chgData name="Joseph Wonsil" userId="f7a5a8f17f3cf2df" providerId="LiveId" clId="{D6ABC174-D68B-445B-A75D-5908BB74AC88}" dt="2023-10-16T23:14:07.497" v="201" actId="478"/>
-          <ac:spMkLst>
-            <pc:docMk/>
-            <pc:sldMk cId="1645475767" sldId="256"/>
-            <ac:spMk id="59" creationId="{B98D6BE7-F304-CBBC-2A63-84EEC4898CC8}"/>
-          </ac:spMkLst>
-        </pc:spChg>
-        <pc:spChg chg="mod">
-          <ac:chgData name="Joseph Wonsil" userId="f7a5a8f17f3cf2df" providerId="LiveId" clId="{D6ABC174-D68B-445B-A75D-5908BB74AC88}" dt="2023-10-16T23:29:24.950" v="686" actId="1076"/>
-          <ac:spMkLst>
-            <pc:docMk/>
-            <pc:sldMk cId="1645475767" sldId="256"/>
-            <ac:spMk id="60" creationId="{35FA7E34-1A13-B6DF-79C2-60F41A23F37B}"/>
-          </ac:spMkLst>
-        </pc:spChg>
-        <pc:spChg chg="mod">
-          <ac:chgData name="Joseph Wonsil" userId="f7a5a8f17f3cf2df" providerId="LiveId" clId="{D6ABC174-D68B-445B-A75D-5908BB74AC88}" dt="2023-10-16T23:29:24.950" v="686" actId="1076"/>
-          <ac:spMkLst>
-            <pc:docMk/>
-            <pc:sldMk cId="1645475767" sldId="256"/>
-            <ac:spMk id="61" creationId="{7ECA03CF-DD24-9307-D184-41182C04B82A}"/>
-          </ac:spMkLst>
-        </pc:spChg>
-        <pc:spChg chg="add mod">
-          <ac:chgData name="Joseph Wonsil" userId="f7a5a8f17f3cf2df" providerId="LiveId" clId="{D6ABC174-D68B-445B-A75D-5908BB74AC88}" dt="2023-10-16T23:29:24.950" v="686" actId="1076"/>
-          <ac:spMkLst>
-            <pc:docMk/>
-            <pc:sldMk cId="1645475767" sldId="256"/>
-            <ac:spMk id="63" creationId="{07A62DDE-C94D-4783-4BFD-408E0B156DED}"/>
-          </ac:spMkLst>
-        </pc:spChg>
-        <pc:spChg chg="add mod">
-          <ac:chgData name="Joseph Wonsil" userId="f7a5a8f17f3cf2df" providerId="LiveId" clId="{D6ABC174-D68B-445B-A75D-5908BB74AC88}" dt="2023-10-16T23:29:24.950" v="686" actId="1076"/>
-          <ac:spMkLst>
-            <pc:docMk/>
-            <pc:sldMk cId="1645475767" sldId="256"/>
-            <ac:spMk id="68" creationId="{9CD63190-6F0C-7B53-9050-C772D436F95B}"/>
-          </ac:spMkLst>
-        </pc:spChg>
-        <pc:spChg chg="mod">
-          <ac:chgData name="Joseph Wonsil" userId="f7a5a8f17f3cf2df" providerId="LiveId" clId="{D6ABC174-D68B-445B-A75D-5908BB74AC88}" dt="2023-10-16T23:29:24.950" v="686" actId="1076"/>
-          <ac:spMkLst>
-            <pc:docMk/>
-            <pc:sldMk cId="1645475767" sldId="256"/>
-            <ac:spMk id="70" creationId="{EEB73B9F-8EE1-8959-6128-F66F9F2B6A19}"/>
-          </ac:spMkLst>
-        </pc:spChg>
-        <pc:spChg chg="mod">
-          <ac:chgData name="Joseph Wonsil" userId="f7a5a8f17f3cf2df" providerId="LiveId" clId="{D6ABC174-D68B-445B-A75D-5908BB74AC88}" dt="2023-10-16T23:29:24.950" v="686" actId="1076"/>
-          <ac:spMkLst>
-            <pc:docMk/>
-            <pc:sldMk cId="1645475767" sldId="256"/>
-            <ac:spMk id="71" creationId="{2A34F01A-7639-BB9B-04EC-3D4D626FAB55}"/>
-          </ac:spMkLst>
-        </pc:spChg>
-        <pc:spChg chg="mod">
-          <ac:chgData name="Joseph Wonsil" userId="f7a5a8f17f3cf2df" providerId="LiveId" clId="{D6ABC174-D68B-445B-A75D-5908BB74AC88}" dt="2023-10-16T23:29:24.950" v="686" actId="1076"/>
-          <ac:spMkLst>
-            <pc:docMk/>
-            <pc:sldMk cId="1645475767" sldId="256"/>
-            <ac:spMk id="74" creationId="{52E3ADAE-159A-D64F-DF75-180DC743C4CA}"/>
-          </ac:spMkLst>
-        </pc:spChg>
-        <pc:spChg chg="add del mod">
-          <ac:chgData name="Joseph Wonsil" userId="f7a5a8f17f3cf2df" providerId="LiveId" clId="{D6ABC174-D68B-445B-A75D-5908BB74AC88}" dt="2023-10-16T23:14:08.549" v="202" actId="478"/>
-          <ac:spMkLst>
-            <pc:docMk/>
-            <pc:sldMk cId="1645475767" sldId="256"/>
-            <ac:spMk id="80" creationId="{5F751107-4977-75F1-7373-E5D7DF7E77ED}"/>
-          </ac:spMkLst>
-        </pc:spChg>
-        <pc:spChg chg="add mod">
-          <ac:chgData name="Joseph Wonsil" userId="f7a5a8f17f3cf2df" providerId="LiveId" clId="{D6ABC174-D68B-445B-A75D-5908BB74AC88}" dt="2023-10-16T23:29:24.950" v="686" actId="1076"/>
-          <ac:spMkLst>
-            <pc:docMk/>
-            <pc:sldMk cId="1645475767" sldId="256"/>
-            <ac:spMk id="84" creationId="{D34F5F8D-B16A-EDE4-A61F-9D0E7E4C7BBC}"/>
-          </ac:spMkLst>
-        </pc:spChg>
-        <pc:spChg chg="add mod">
-          <ac:chgData name="Joseph Wonsil" userId="f7a5a8f17f3cf2df" providerId="LiveId" clId="{D6ABC174-D68B-445B-A75D-5908BB74AC88}" dt="2023-10-16T23:29:24.950" v="686" actId="1076"/>
-          <ac:spMkLst>
-            <pc:docMk/>
-            <pc:sldMk cId="1645475767" sldId="256"/>
-            <ac:spMk id="85" creationId="{84E65B77-934D-4C57-DE5D-9702D4AA5BCB}"/>
-          </ac:spMkLst>
-        </pc:spChg>
-        <pc:spChg chg="add mod">
-          <ac:chgData name="Joseph Wonsil" userId="f7a5a8f17f3cf2df" providerId="LiveId" clId="{D6ABC174-D68B-445B-A75D-5908BB74AC88}" dt="2023-10-16T23:29:24.950" v="686" actId="1076"/>
-          <ac:spMkLst>
-            <pc:docMk/>
-            <pc:sldMk cId="1645475767" sldId="256"/>
-            <ac:spMk id="90" creationId="{8A8D6037-92ED-5E61-EE2A-60DD15DDB033}"/>
-          </ac:spMkLst>
-        </pc:spChg>
-        <pc:spChg chg="add mod">
-          <ac:chgData name="Joseph Wonsil" userId="f7a5a8f17f3cf2df" providerId="LiveId" clId="{D6ABC174-D68B-445B-A75D-5908BB74AC88}" dt="2023-10-16T23:29:24.950" v="686" actId="1076"/>
-          <ac:spMkLst>
-            <pc:docMk/>
-            <pc:sldMk cId="1645475767" sldId="256"/>
-            <ac:spMk id="91" creationId="{659BA44D-74DE-FF8E-EC99-D7D1DC21885A}"/>
-          </ac:spMkLst>
-        </pc:spChg>
-        <pc:spChg chg="add del mod">
-          <ac:chgData name="Joseph Wonsil" userId="f7a5a8f17f3cf2df" providerId="LiveId" clId="{D6ABC174-D68B-445B-A75D-5908BB74AC88}" dt="2023-10-16T23:14:09.806" v="203" actId="478"/>
-          <ac:spMkLst>
-            <pc:docMk/>
-            <pc:sldMk cId="1645475767" sldId="256"/>
-            <ac:spMk id="96" creationId="{76E25628-5BF4-71B1-546D-359ED2818B78}"/>
-          </ac:spMkLst>
-        </pc:spChg>
-        <pc:spChg chg="add del mod">
-          <ac:chgData name="Joseph Wonsil" userId="f7a5a8f17f3cf2df" providerId="LiveId" clId="{D6ABC174-D68B-445B-A75D-5908BB74AC88}" dt="2023-10-16T23:14:10.795" v="204" actId="478"/>
-          <ac:spMkLst>
-            <pc:docMk/>
-            <pc:sldMk cId="1645475767" sldId="256"/>
-            <ac:spMk id="97" creationId="{D9C21539-62BA-46C9-E496-58354AAAEE37}"/>
-          </ac:spMkLst>
-        </pc:spChg>
-        <pc:spChg chg="add mod">
-          <ac:chgData name="Joseph Wonsil" userId="f7a5a8f17f3cf2df" providerId="LiveId" clId="{D6ABC174-D68B-445B-A75D-5908BB74AC88}" dt="2023-10-16T23:29:24.950" v="686" actId="1076"/>
-          <ac:spMkLst>
-            <pc:docMk/>
-            <pc:sldMk cId="1645475767" sldId="256"/>
-            <ac:spMk id="100" creationId="{E92B3433-66A4-7341-0A10-1B6541AA2707}"/>
-          </ac:spMkLst>
-        </pc:spChg>
-        <pc:spChg chg="add mod">
-          <ac:chgData name="Joseph Wonsil" userId="f7a5a8f17f3cf2df" providerId="LiveId" clId="{D6ABC174-D68B-445B-A75D-5908BB74AC88}" dt="2023-10-16T23:29:24.950" v="686" actId="1076"/>
-          <ac:spMkLst>
-            <pc:docMk/>
-            <pc:sldMk cId="1645475767" sldId="256"/>
-            <ac:spMk id="101" creationId="{1DE6908C-CB8C-CAF2-6CD7-D732B0AB1E33}"/>
-          </ac:spMkLst>
-        </pc:spChg>
-        <pc:spChg chg="add mod">
-          <ac:chgData name="Joseph Wonsil" userId="f7a5a8f17f3cf2df" providerId="LiveId" clId="{D6ABC174-D68B-445B-A75D-5908BB74AC88}" dt="2023-10-16T23:29:24.950" v="686" actId="1076"/>
-          <ac:spMkLst>
-            <pc:docMk/>
-            <pc:sldMk cId="1645475767" sldId="256"/>
-            <ac:spMk id="102" creationId="{BAB78B8E-574B-3156-CD83-4D165FEDCC4F}"/>
-          </ac:spMkLst>
-        </pc:spChg>
-        <pc:spChg chg="add mod">
-          <ac:chgData name="Joseph Wonsil" userId="f7a5a8f17f3cf2df" providerId="LiveId" clId="{D6ABC174-D68B-445B-A75D-5908BB74AC88}" dt="2023-10-16T23:29:24.950" v="686" actId="1076"/>
-          <ac:spMkLst>
-            <pc:docMk/>
-            <pc:sldMk cId="1645475767" sldId="256"/>
-            <ac:spMk id="103" creationId="{0C69731E-2E67-A043-504E-23C966E68671}"/>
-          </ac:spMkLst>
-        </pc:spChg>
-        <pc:spChg chg="mod">
-          <ac:chgData name="Joseph Wonsil" userId="f7a5a8f17f3cf2df" providerId="LiveId" clId="{D6ABC174-D68B-445B-A75D-5908BB74AC88}" dt="2023-10-16T23:29:24.950" v="686" actId="1076"/>
-          <ac:spMkLst>
-            <pc:docMk/>
-            <pc:sldMk cId="1645475767" sldId="256"/>
-            <ac:spMk id="104" creationId="{6B62EFFA-4EC9-3E5B-73F6-0D19114CAFC9}"/>
-          </ac:spMkLst>
-        </pc:spChg>
-        <pc:spChg chg="add mod">
-          <ac:chgData name="Joseph Wonsil" userId="f7a5a8f17f3cf2df" providerId="LiveId" clId="{D6ABC174-D68B-445B-A75D-5908BB74AC88}" dt="2023-10-16T23:29:24.950" v="686" actId="1076"/>
-          <ac:spMkLst>
-            <pc:docMk/>
-            <pc:sldMk cId="1645475767" sldId="256"/>
-            <ac:spMk id="105" creationId="{2ACDEB4D-3118-62F1-B8A8-ADB24DBACF82}"/>
-          </ac:spMkLst>
-        </pc:spChg>
-        <pc:spChg chg="add mod">
-          <ac:chgData name="Joseph Wonsil" userId="f7a5a8f17f3cf2df" providerId="LiveId" clId="{D6ABC174-D68B-445B-A75D-5908BB74AC88}" dt="2023-10-16T23:29:24.950" v="686" actId="1076"/>
-          <ac:spMkLst>
-            <pc:docMk/>
-            <pc:sldMk cId="1645475767" sldId="256"/>
-            <ac:spMk id="106" creationId="{4B49D07C-8A79-6007-E41D-E45A4FC9D8C6}"/>
-          </ac:spMkLst>
-        </pc:spChg>
-        <pc:spChg chg="add mod">
-          <ac:chgData name="Joseph Wonsil" userId="f7a5a8f17f3cf2df" providerId="LiveId" clId="{D6ABC174-D68B-445B-A75D-5908BB74AC88}" dt="2023-10-16T23:29:24.950" v="686" actId="1076"/>
-          <ac:spMkLst>
-            <pc:docMk/>
-            <pc:sldMk cId="1645475767" sldId="256"/>
-            <ac:spMk id="132" creationId="{85BD8B9C-80C0-4ECE-A347-E4D26F891B45}"/>
-          </ac:spMkLst>
-        </pc:spChg>
-        <pc:spChg chg="add mod">
-          <ac:chgData name="Joseph Wonsil" userId="f7a5a8f17f3cf2df" providerId="LiveId" clId="{D6ABC174-D68B-445B-A75D-5908BB74AC88}" dt="2023-10-16T23:29:24.950" v="686" actId="1076"/>
-          <ac:spMkLst>
-            <pc:docMk/>
-            <pc:sldMk cId="1645475767" sldId="256"/>
-            <ac:spMk id="138" creationId="{E242FAFA-CB49-296E-9F35-248943C2966E}"/>
-          </ac:spMkLst>
-        </pc:spChg>
-        <pc:spChg chg="add mod">
-          <ac:chgData name="Joseph Wonsil" userId="f7a5a8f17f3cf2df" providerId="LiveId" clId="{D6ABC174-D68B-445B-A75D-5908BB74AC88}" dt="2023-10-16T23:29:24.950" v="686" actId="1076"/>
-          <ac:spMkLst>
-            <pc:docMk/>
-            <pc:sldMk cId="1645475767" sldId="256"/>
-            <ac:spMk id="139" creationId="{802C46F5-7BD6-F450-D2B4-347C92B57CFE}"/>
-          </ac:spMkLst>
-        </pc:spChg>
-        <pc:spChg chg="add mod">
-          <ac:chgData name="Joseph Wonsil" userId="f7a5a8f17f3cf2df" providerId="LiveId" clId="{D6ABC174-D68B-445B-A75D-5908BB74AC88}" dt="2023-10-16T23:29:24.950" v="686" actId="1076"/>
-          <ac:spMkLst>
-            <pc:docMk/>
-            <pc:sldMk cId="1645475767" sldId="256"/>
-            <ac:spMk id="144" creationId="{3BA36D46-2F89-D8A4-A60C-17E29D68CFA5}"/>
-          </ac:spMkLst>
-        </pc:spChg>
-        <pc:spChg chg="add del mod">
-          <ac:chgData name="Joseph Wonsil" userId="f7a5a8f17f3cf2df" providerId="LiveId" clId="{D6ABC174-D68B-445B-A75D-5908BB74AC88}" dt="2023-10-16T23:26:08.719" v="661" actId="478"/>
-          <ac:spMkLst>
-            <pc:docMk/>
-            <pc:sldMk cId="1645475767" sldId="256"/>
-            <ac:spMk id="146" creationId="{028B6804-1C46-AD7E-A387-7A8C99F8563D}"/>
-          </ac:spMkLst>
-        </pc:spChg>
-        <pc:spChg chg="add mod">
-          <ac:chgData name="Joseph Wonsil" userId="f7a5a8f17f3cf2df" providerId="LiveId" clId="{D6ABC174-D68B-445B-A75D-5908BB74AC88}" dt="2023-10-16T23:29:24.950" v="686" actId="1076"/>
-          <ac:spMkLst>
-            <pc:docMk/>
-            <pc:sldMk cId="1645475767" sldId="256"/>
-            <ac:spMk id="157" creationId="{2EC089FA-274C-2CBC-86EB-EAA86F31FDEF}"/>
-          </ac:spMkLst>
-        </pc:spChg>
-        <pc:cxnChg chg="mod">
-          <ac:chgData name="Joseph Wonsil" userId="f7a5a8f17f3cf2df" providerId="LiveId" clId="{D6ABC174-D68B-445B-A75D-5908BB74AC88}" dt="2023-10-16T23:29:24.950" v="686" actId="1076"/>
-          <ac:cxnSpMkLst>
-            <pc:docMk/>
-            <pc:sldMk cId="1645475767" sldId="256"/>
-            <ac:cxnSpMk id="4" creationId="{1FAF49EF-246B-5065-399F-6F3D99F68D6C}"/>
-          </ac:cxnSpMkLst>
-        </pc:cxnChg>
-        <pc:cxnChg chg="mod">
-          <ac:chgData name="Joseph Wonsil" userId="f7a5a8f17f3cf2df" providerId="LiveId" clId="{D6ABC174-D68B-445B-A75D-5908BB74AC88}" dt="2023-10-16T23:29:24.950" v="686" actId="1076"/>
-          <ac:cxnSpMkLst>
-            <pc:docMk/>
-            <pc:sldMk cId="1645475767" sldId="256"/>
-            <ac:cxnSpMk id="7" creationId="{CFFEAC4B-C6E1-0754-849B-C9DE5A9020F3}"/>
-          </ac:cxnSpMkLst>
-        </pc:cxnChg>
-        <pc:cxnChg chg="mod">
-          <ac:chgData name="Joseph Wonsil" userId="f7a5a8f17f3cf2df" providerId="LiveId" clId="{D6ABC174-D68B-445B-A75D-5908BB74AC88}" dt="2023-10-16T23:29:24.950" v="686" actId="1076"/>
-          <ac:cxnSpMkLst>
-            <pc:docMk/>
-            <pc:sldMk cId="1645475767" sldId="256"/>
-            <ac:cxnSpMk id="8" creationId="{E3A3FFC5-3ECB-F504-1EB7-79E7359B9CFC}"/>
-          </ac:cxnSpMkLst>
-        </pc:cxnChg>
-        <pc:cxnChg chg="mod">
-          <ac:chgData name="Joseph Wonsil" userId="f7a5a8f17f3cf2df" providerId="LiveId" clId="{D6ABC174-D68B-445B-A75D-5908BB74AC88}" dt="2023-10-16T23:29:24.950" v="686" actId="1076"/>
-          <ac:cxnSpMkLst>
-            <pc:docMk/>
-            <pc:sldMk cId="1645475767" sldId="256"/>
-            <ac:cxnSpMk id="9" creationId="{0A563654-6AF8-5959-7EF7-1707843DF81A}"/>
-          </ac:cxnSpMkLst>
-        </pc:cxnChg>
-        <pc:cxnChg chg="add del mod">
-          <ac:chgData name="Joseph Wonsil" userId="f7a5a8f17f3cf2df" providerId="LiveId" clId="{D6ABC174-D68B-445B-A75D-5908BB74AC88}" dt="2023-10-16T21:32:04.752" v="27" actId="478"/>
-          <ac:cxnSpMkLst>
-            <pc:docMk/>
-            <pc:sldMk cId="1645475767" sldId="256"/>
-            <ac:cxnSpMk id="16" creationId="{6E8E699C-8362-620C-3B7B-67743EDBCA1F}"/>
-          </ac:cxnSpMkLst>
-        </pc:cxnChg>
-        <pc:cxnChg chg="add mod">
-          <ac:chgData name="Joseph Wonsil" userId="f7a5a8f17f3cf2df" providerId="LiveId" clId="{D6ABC174-D68B-445B-A75D-5908BB74AC88}" dt="2023-10-16T23:29:24.950" v="686" actId="1076"/>
-          <ac:cxnSpMkLst>
-            <pc:docMk/>
-            <pc:sldMk cId="1645475767" sldId="256"/>
-            <ac:cxnSpMk id="23" creationId="{23D61AF6-840C-7E29-57B3-7DB3D4B2CB5B}"/>
-          </ac:cxnSpMkLst>
-        </pc:cxnChg>
-        <pc:cxnChg chg="add mod">
-          <ac:chgData name="Joseph Wonsil" userId="f7a5a8f17f3cf2df" providerId="LiveId" clId="{D6ABC174-D68B-445B-A75D-5908BB74AC88}" dt="2023-10-16T23:29:24.950" v="686" actId="1076"/>
-          <ac:cxnSpMkLst>
-            <pc:docMk/>
-            <pc:sldMk cId="1645475767" sldId="256"/>
-            <ac:cxnSpMk id="30" creationId="{92CF7358-07D9-EA8C-0D7A-860C9F5C5ACF}"/>
-          </ac:cxnSpMkLst>
-        </pc:cxnChg>
-        <pc:cxnChg chg="mod">
-          <ac:chgData name="Joseph Wonsil" userId="f7a5a8f17f3cf2df" providerId="LiveId" clId="{D6ABC174-D68B-445B-A75D-5908BB74AC88}" dt="2023-10-16T23:29:24.950" v="686" actId="1076"/>
-          <ac:cxnSpMkLst>
-            <pc:docMk/>
-            <pc:sldMk cId="1645475767" sldId="256"/>
-            <ac:cxnSpMk id="34" creationId="{8C48BD3A-932B-C7D1-C21F-389E8FA1D750}"/>
-          </ac:cxnSpMkLst>
-        </pc:cxnChg>
-        <pc:cxnChg chg="add mod">
-          <ac:chgData name="Joseph Wonsil" userId="f7a5a8f17f3cf2df" providerId="LiveId" clId="{D6ABC174-D68B-445B-A75D-5908BB74AC88}" dt="2023-10-16T23:29:24.950" v="686" actId="1076"/>
-          <ac:cxnSpMkLst>
-            <pc:docMk/>
-            <pc:sldMk cId="1645475767" sldId="256"/>
-            <ac:cxnSpMk id="37" creationId="{6F20C18C-B4A8-7CAD-913D-7F0217BF73CC}"/>
-          </ac:cxnSpMkLst>
-        </pc:cxnChg>
-        <pc:cxnChg chg="add del mod">
-          <ac:chgData name="Joseph Wonsil" userId="f7a5a8f17f3cf2df" providerId="LiveId" clId="{D6ABC174-D68B-445B-A75D-5908BB74AC88}" dt="2023-10-16T23:10:16.876" v="98" actId="478"/>
-          <ac:cxnSpMkLst>
-            <pc:docMk/>
-            <pc:sldMk cId="1645475767" sldId="256"/>
-            <ac:cxnSpMk id="41" creationId="{002DE991-E2D2-AF8A-EA37-2D0B85C91A72}"/>
-          </ac:cxnSpMkLst>
-        </pc:cxnChg>
-        <pc:cxnChg chg="add mod">
-          <ac:chgData name="Joseph Wonsil" userId="f7a5a8f17f3cf2df" providerId="LiveId" clId="{D6ABC174-D68B-445B-A75D-5908BB74AC88}" dt="2023-10-16T23:29:24.950" v="686" actId="1076"/>
-          <ac:cxnSpMkLst>
-            <pc:docMk/>
-            <pc:sldMk cId="1645475767" sldId="256"/>
-            <ac:cxnSpMk id="46" creationId="{34027DC1-9608-8FC2-B855-03FC2D10CF3D}"/>
-          </ac:cxnSpMkLst>
-        </pc:cxnChg>
-        <pc:cxnChg chg="mod">
-          <ac:chgData name="Joseph Wonsil" userId="f7a5a8f17f3cf2df" providerId="LiveId" clId="{D6ABC174-D68B-445B-A75D-5908BB74AC88}" dt="2023-10-16T23:29:24.950" v="686" actId="1076"/>
-          <ac:cxnSpMkLst>
-            <pc:docMk/>
-            <pc:sldMk cId="1645475767" sldId="256"/>
-            <ac:cxnSpMk id="50" creationId="{3E940EC5-3D16-B53B-92BC-3B51950E358D}"/>
-          </ac:cxnSpMkLst>
-        </pc:cxnChg>
-        <pc:cxnChg chg="mod">
-          <ac:chgData name="Joseph Wonsil" userId="f7a5a8f17f3cf2df" providerId="LiveId" clId="{D6ABC174-D68B-445B-A75D-5908BB74AC88}" dt="2023-10-16T23:29:24.950" v="686" actId="1076"/>
-          <ac:cxnSpMkLst>
-            <pc:docMk/>
-            <pc:sldMk cId="1645475767" sldId="256"/>
-            <ac:cxnSpMk id="53" creationId="{1C2578E2-210F-BFA7-80C8-ADB6B3D34E24}"/>
-          </ac:cxnSpMkLst>
-        </pc:cxnChg>
-        <pc:cxnChg chg="mod">
-          <ac:chgData name="Joseph Wonsil" userId="f7a5a8f17f3cf2df" providerId="LiveId" clId="{D6ABC174-D68B-445B-A75D-5908BB74AC88}" dt="2023-10-16T23:29:24.950" v="686" actId="1076"/>
-          <ac:cxnSpMkLst>
-            <pc:docMk/>
-            <pc:sldMk cId="1645475767" sldId="256"/>
-            <ac:cxnSpMk id="56" creationId="{CE6983D4-3F57-B5C6-DA2B-A89A230613C8}"/>
-          </ac:cxnSpMkLst>
-        </pc:cxnChg>
-        <pc:cxnChg chg="mod">
-          <ac:chgData name="Joseph Wonsil" userId="f7a5a8f17f3cf2df" providerId="LiveId" clId="{D6ABC174-D68B-445B-A75D-5908BB74AC88}" dt="2023-10-16T23:29:24.950" v="686" actId="1076"/>
-          <ac:cxnSpMkLst>
-            <pc:docMk/>
-            <pc:sldMk cId="1645475767" sldId="256"/>
-            <ac:cxnSpMk id="62" creationId="{4467B832-EDA5-D418-B682-ECA109408340}"/>
-          </ac:cxnSpMkLst>
-        </pc:cxnChg>
-        <pc:cxnChg chg="add mod">
-          <ac:chgData name="Joseph Wonsil" userId="f7a5a8f17f3cf2df" providerId="LiveId" clId="{D6ABC174-D68B-445B-A75D-5908BB74AC88}" dt="2023-10-16T23:29:24.950" v="686" actId="1076"/>
-          <ac:cxnSpMkLst>
-            <pc:docMk/>
-            <pc:sldMk cId="1645475767" sldId="256"/>
-            <ac:cxnSpMk id="69" creationId="{145A7E76-DF91-F32D-9FB1-A172DA075F92}"/>
-          </ac:cxnSpMkLst>
-        </pc:cxnChg>
-        <pc:cxnChg chg="mod">
-          <ac:chgData name="Joseph Wonsil" userId="f7a5a8f17f3cf2df" providerId="LiveId" clId="{D6ABC174-D68B-445B-A75D-5908BB74AC88}" dt="2023-10-16T23:29:24.950" v="686" actId="1076"/>
-          <ac:cxnSpMkLst>
-            <pc:docMk/>
-            <pc:sldMk cId="1645475767" sldId="256"/>
-            <ac:cxnSpMk id="73" creationId="{71C4DB77-00EC-7C19-199C-316CA4BAC798}"/>
-          </ac:cxnSpMkLst>
-        </pc:cxnChg>
-        <pc:cxnChg chg="mod">
-          <ac:chgData name="Joseph Wonsil" userId="f7a5a8f17f3cf2df" providerId="LiveId" clId="{D6ABC174-D68B-445B-A75D-5908BB74AC88}" dt="2023-10-16T23:29:24.950" v="686" actId="1076"/>
-          <ac:cxnSpMkLst>
-            <pc:docMk/>
-            <pc:sldMk cId="1645475767" sldId="256"/>
-            <ac:cxnSpMk id="75" creationId="{FB24C36A-F777-3F4B-7F99-AC0F285C243D}"/>
-          </ac:cxnSpMkLst>
-        </pc:cxnChg>
-        <pc:cxnChg chg="mod">
-          <ac:chgData name="Joseph Wonsil" userId="f7a5a8f17f3cf2df" providerId="LiveId" clId="{D6ABC174-D68B-445B-A75D-5908BB74AC88}" dt="2023-10-16T23:29:24.950" v="686" actId="1076"/>
-          <ac:cxnSpMkLst>
-            <pc:docMk/>
-            <pc:sldMk cId="1645475767" sldId="256"/>
-            <ac:cxnSpMk id="77" creationId="{3AC8B372-20BA-0704-66B7-39F62AA3CBF9}"/>
-          </ac:cxnSpMkLst>
-        </pc:cxnChg>
-        <pc:cxnChg chg="add mod">
-          <ac:chgData name="Joseph Wonsil" userId="f7a5a8f17f3cf2df" providerId="LiveId" clId="{D6ABC174-D68B-445B-A75D-5908BB74AC88}" dt="2023-10-16T23:29:24.950" v="686" actId="1076"/>
-          <ac:cxnSpMkLst>
-            <pc:docMk/>
-            <pc:sldMk cId="1645475767" sldId="256"/>
-            <ac:cxnSpMk id="86" creationId="{EC053AFE-E056-79CC-7911-5BD8825293B3}"/>
-          </ac:cxnSpMkLst>
-        </pc:cxnChg>
-        <pc:cxnChg chg="add mod">
-          <ac:chgData name="Joseph Wonsil" userId="f7a5a8f17f3cf2df" providerId="LiveId" clId="{D6ABC174-D68B-445B-A75D-5908BB74AC88}" dt="2023-10-16T23:29:24.950" v="686" actId="1076"/>
-          <ac:cxnSpMkLst>
-            <pc:docMk/>
-            <pc:sldMk cId="1645475767" sldId="256"/>
-            <ac:cxnSpMk id="92" creationId="{E4EFC397-B69B-7C22-91DF-71E352AAA497}"/>
-          </ac:cxnSpMkLst>
-        </pc:cxnChg>
-        <pc:cxnChg chg="add mod">
-          <ac:chgData name="Joseph Wonsil" userId="f7a5a8f17f3cf2df" providerId="LiveId" clId="{D6ABC174-D68B-445B-A75D-5908BB74AC88}" dt="2023-10-16T23:29:24.950" v="686" actId="1076"/>
-          <ac:cxnSpMkLst>
-            <pc:docMk/>
-            <pc:sldMk cId="1645475767" sldId="256"/>
-            <ac:cxnSpMk id="140" creationId="{40F6DD3F-D4FB-8B03-9FE5-B051FC5E4D52}"/>
-          </ac:cxnSpMkLst>
-        </pc:cxnChg>
-        <pc:cxnChg chg="add mod">
-          <ac:chgData name="Joseph Wonsil" userId="f7a5a8f17f3cf2df" providerId="LiveId" clId="{D6ABC174-D68B-445B-A75D-5908BB74AC88}" dt="2023-10-16T23:29:24.950" v="686" actId="1076"/>
-          <ac:cxnSpMkLst>
-            <pc:docMk/>
-            <pc:sldMk cId="1645475767" sldId="256"/>
-            <ac:cxnSpMk id="145" creationId="{0C692CDF-0F7B-0069-67DF-3E6458131FC3}"/>
-          </ac:cxnSpMkLst>
-        </pc:cxnChg>
-      </pc:sldChg>
-    </pc:docChg>
-  </pc:docChgLst>
-  <pc:docChgLst>
     <pc:chgData name="Joseph Wonsil" userId="f7a5a8f17f3cf2df" providerId="LiveId" clId="{8C080609-7CCE-411B-84E6-72C44917ABCF}"/>
     <pc:docChg chg="undo custSel modSld">
       <pc:chgData name="Joseph Wonsil" userId="f7a5a8f17f3cf2df" providerId="LiveId" clId="{8C080609-7CCE-411B-84E6-72C44917ABCF}" dt="2023-10-18T23:36:36.285" v="1695" actId="478"/>
@@ -1917,6 +1213,710 @@
             <pc:docMk/>
             <pc:sldMk cId="1645475767" sldId="256"/>
             <ac:cxnSpMk id="293" creationId="{465BFAD8-046F-A3E1-6259-03C898568E09}"/>
+          </ac:cxnSpMkLst>
+        </pc:cxnChg>
+      </pc:sldChg>
+    </pc:docChg>
+  </pc:docChgLst>
+  <pc:docChgLst>
+    <pc:chgData name="Joseph Wonsil" userId="f7a5a8f17f3cf2df" providerId="LiveId" clId="{D6ABC174-D68B-445B-A75D-5908BB74AC88}"/>
+    <pc:docChg chg="undo custSel modSld">
+      <pc:chgData name="Joseph Wonsil" userId="f7a5a8f17f3cf2df" providerId="LiveId" clId="{D6ABC174-D68B-445B-A75D-5908BB74AC88}" dt="2023-10-16T23:29:24.950" v="686" actId="1076"/>
+      <pc:docMkLst>
+        <pc:docMk/>
+      </pc:docMkLst>
+      <pc:sldChg chg="addSp delSp modSp mod">
+        <pc:chgData name="Joseph Wonsil" userId="f7a5a8f17f3cf2df" providerId="LiveId" clId="{D6ABC174-D68B-445B-A75D-5908BB74AC88}" dt="2023-10-16T23:29:24.950" v="686" actId="1076"/>
+        <pc:sldMkLst>
+          <pc:docMk/>
+          <pc:sldMk cId="1645475767" sldId="256"/>
+        </pc:sldMkLst>
+        <pc:spChg chg="mod">
+          <ac:chgData name="Joseph Wonsil" userId="f7a5a8f17f3cf2df" providerId="LiveId" clId="{D6ABC174-D68B-445B-A75D-5908BB74AC88}" dt="2023-10-16T23:29:24.950" v="686" actId="1076"/>
+          <ac:spMkLst>
+            <pc:docMk/>
+            <pc:sldMk cId="1645475767" sldId="256"/>
+            <ac:spMk id="2" creationId="{461DAE0E-18AF-97FF-8732-1CF3DD2A0854}"/>
+          </ac:spMkLst>
+        </pc:spChg>
+        <pc:spChg chg="add mod">
+          <ac:chgData name="Joseph Wonsil" userId="f7a5a8f17f3cf2df" providerId="LiveId" clId="{D6ABC174-D68B-445B-A75D-5908BB74AC88}" dt="2023-10-16T23:29:24.950" v="686" actId="1076"/>
+          <ac:spMkLst>
+            <pc:docMk/>
+            <pc:sldMk cId="1645475767" sldId="256"/>
+            <ac:spMk id="3" creationId="{475EA8C8-F0A4-6F01-74CD-54546E0C2AEE}"/>
+          </ac:spMkLst>
+        </pc:spChg>
+        <pc:spChg chg="mod">
+          <ac:chgData name="Joseph Wonsil" userId="f7a5a8f17f3cf2df" providerId="LiveId" clId="{D6ABC174-D68B-445B-A75D-5908BB74AC88}" dt="2023-10-16T23:29:24.950" v="686" actId="1076"/>
+          <ac:spMkLst>
+            <pc:docMk/>
+            <pc:sldMk cId="1645475767" sldId="256"/>
+            <ac:spMk id="5" creationId="{EDD77D8E-AC62-8835-147A-8365BEE24A8B}"/>
+          </ac:spMkLst>
+        </pc:spChg>
+        <pc:spChg chg="mod">
+          <ac:chgData name="Joseph Wonsil" userId="f7a5a8f17f3cf2df" providerId="LiveId" clId="{D6ABC174-D68B-445B-A75D-5908BB74AC88}" dt="2023-10-16T23:29:24.950" v="686" actId="1076"/>
+          <ac:spMkLst>
+            <pc:docMk/>
+            <pc:sldMk cId="1645475767" sldId="256"/>
+            <ac:spMk id="6" creationId="{F392B7D7-3E0F-8DD1-67FB-1EF515E6A632}"/>
+          </ac:spMkLst>
+        </pc:spChg>
+        <pc:spChg chg="mod">
+          <ac:chgData name="Joseph Wonsil" userId="f7a5a8f17f3cf2df" providerId="LiveId" clId="{D6ABC174-D68B-445B-A75D-5908BB74AC88}" dt="2023-10-16T23:29:24.950" v="686" actId="1076"/>
+          <ac:spMkLst>
+            <pc:docMk/>
+            <pc:sldMk cId="1645475767" sldId="256"/>
+            <ac:spMk id="10" creationId="{5D155BFF-B441-4572-6BCC-1D6480ADC254}"/>
+          </ac:spMkLst>
+        </pc:spChg>
+        <pc:spChg chg="mod">
+          <ac:chgData name="Joseph Wonsil" userId="f7a5a8f17f3cf2df" providerId="LiveId" clId="{D6ABC174-D68B-445B-A75D-5908BB74AC88}" dt="2023-10-16T23:29:24.950" v="686" actId="1076"/>
+          <ac:spMkLst>
+            <pc:docMk/>
+            <pc:sldMk cId="1645475767" sldId="256"/>
+            <ac:spMk id="11" creationId="{89D3A37F-AE8C-286E-D005-973A429F2F60}"/>
+          </ac:spMkLst>
+        </pc:spChg>
+        <pc:spChg chg="mod">
+          <ac:chgData name="Joseph Wonsil" userId="f7a5a8f17f3cf2df" providerId="LiveId" clId="{D6ABC174-D68B-445B-A75D-5908BB74AC88}" dt="2023-10-16T23:29:24.950" v="686" actId="1076"/>
+          <ac:spMkLst>
+            <pc:docMk/>
+            <pc:sldMk cId="1645475767" sldId="256"/>
+            <ac:spMk id="13" creationId="{77E6E453-03D9-6363-9B2B-536E1D203421}"/>
+          </ac:spMkLst>
+        </pc:spChg>
+        <pc:spChg chg="mod">
+          <ac:chgData name="Joseph Wonsil" userId="f7a5a8f17f3cf2df" providerId="LiveId" clId="{D6ABC174-D68B-445B-A75D-5908BB74AC88}" dt="2023-10-16T23:29:24.950" v="686" actId="1076"/>
+          <ac:spMkLst>
+            <pc:docMk/>
+            <pc:sldMk cId="1645475767" sldId="256"/>
+            <ac:spMk id="14" creationId="{F7F39D2E-7806-1ED6-1633-3BF9C768F480}"/>
+          </ac:spMkLst>
+        </pc:spChg>
+        <pc:spChg chg="add mod">
+          <ac:chgData name="Joseph Wonsil" userId="f7a5a8f17f3cf2df" providerId="LiveId" clId="{D6ABC174-D68B-445B-A75D-5908BB74AC88}" dt="2023-10-16T23:29:24.950" v="686" actId="1076"/>
+          <ac:spMkLst>
+            <pc:docMk/>
+            <pc:sldMk cId="1645475767" sldId="256"/>
+            <ac:spMk id="15" creationId="{2082AF95-F57E-7714-98E1-6B18874A37D0}"/>
+          </ac:spMkLst>
+        </pc:spChg>
+        <pc:spChg chg="mod">
+          <ac:chgData name="Joseph Wonsil" userId="f7a5a8f17f3cf2df" providerId="LiveId" clId="{D6ABC174-D68B-445B-A75D-5908BB74AC88}" dt="2023-10-16T23:29:24.950" v="686" actId="1076"/>
+          <ac:spMkLst>
+            <pc:docMk/>
+            <pc:sldMk cId="1645475767" sldId="256"/>
+            <ac:spMk id="17" creationId="{63544155-B132-0D32-3BAA-3EC3DE1072D8}"/>
+          </ac:spMkLst>
+        </pc:spChg>
+        <pc:spChg chg="add del mod">
+          <ac:chgData name="Joseph Wonsil" userId="f7a5a8f17f3cf2df" providerId="LiveId" clId="{D6ABC174-D68B-445B-A75D-5908BB74AC88}" dt="2023-10-16T21:32:02.906" v="26" actId="478"/>
+          <ac:spMkLst>
+            <pc:docMk/>
+            <pc:sldMk cId="1645475767" sldId="256"/>
+            <ac:spMk id="18" creationId="{199C6CC3-53D2-D95F-05F9-68CA3527BA7F}"/>
+          </ac:spMkLst>
+        </pc:spChg>
+        <pc:spChg chg="mod">
+          <ac:chgData name="Joseph Wonsil" userId="f7a5a8f17f3cf2df" providerId="LiveId" clId="{D6ABC174-D68B-445B-A75D-5908BB74AC88}" dt="2023-10-16T23:29:24.950" v="686" actId="1076"/>
+          <ac:spMkLst>
+            <pc:docMk/>
+            <pc:sldMk cId="1645475767" sldId="256"/>
+            <ac:spMk id="19" creationId="{CDC98E58-B7BF-FC65-3CF4-7910AC6F1E87}"/>
+          </ac:spMkLst>
+        </pc:spChg>
+        <pc:spChg chg="add mod">
+          <ac:chgData name="Joseph Wonsil" userId="f7a5a8f17f3cf2df" providerId="LiveId" clId="{D6ABC174-D68B-445B-A75D-5908BB74AC88}" dt="2023-10-16T23:29:24.950" v="686" actId="1076"/>
+          <ac:spMkLst>
+            <pc:docMk/>
+            <pc:sldMk cId="1645475767" sldId="256"/>
+            <ac:spMk id="20" creationId="{F418ACC7-3AD4-0F3B-E0DB-D175E87A7239}"/>
+          </ac:spMkLst>
+        </pc:spChg>
+        <pc:spChg chg="mod">
+          <ac:chgData name="Joseph Wonsil" userId="f7a5a8f17f3cf2df" providerId="LiveId" clId="{D6ABC174-D68B-445B-A75D-5908BB74AC88}" dt="2023-10-16T23:29:24.950" v="686" actId="1076"/>
+          <ac:spMkLst>
+            <pc:docMk/>
+            <pc:sldMk cId="1645475767" sldId="256"/>
+            <ac:spMk id="21" creationId="{3C58F1C7-3BCD-294E-EA4C-FB19607A2A8B}"/>
+          </ac:spMkLst>
+        </pc:spChg>
+        <pc:spChg chg="add del mod">
+          <ac:chgData name="Joseph Wonsil" userId="f7a5a8f17f3cf2df" providerId="LiveId" clId="{D6ABC174-D68B-445B-A75D-5908BB74AC88}" dt="2023-10-16T21:29:14.438" v="23" actId="478"/>
+          <ac:spMkLst>
+            <pc:docMk/>
+            <pc:sldMk cId="1645475767" sldId="256"/>
+            <ac:spMk id="22" creationId="{E9D6ACCE-BADE-1C19-5BD8-11A7F1EDEA7B}"/>
+          </ac:spMkLst>
+        </pc:spChg>
+        <pc:spChg chg="mod">
+          <ac:chgData name="Joseph Wonsil" userId="f7a5a8f17f3cf2df" providerId="LiveId" clId="{D6ABC174-D68B-445B-A75D-5908BB74AC88}" dt="2023-10-16T23:29:24.950" v="686" actId="1076"/>
+          <ac:spMkLst>
+            <pc:docMk/>
+            <pc:sldMk cId="1645475767" sldId="256"/>
+            <ac:spMk id="24" creationId="{3DF15931-71E1-C90B-0673-3380DC81ED7C}"/>
+          </ac:spMkLst>
+        </pc:spChg>
+        <pc:spChg chg="add mod">
+          <ac:chgData name="Joseph Wonsil" userId="f7a5a8f17f3cf2df" providerId="LiveId" clId="{D6ABC174-D68B-445B-A75D-5908BB74AC88}" dt="2023-10-16T23:29:24.950" v="686" actId="1076"/>
+          <ac:spMkLst>
+            <pc:docMk/>
+            <pc:sldMk cId="1645475767" sldId="256"/>
+            <ac:spMk id="25" creationId="{E1A7F699-7971-B2D7-583B-A3C58DD464BF}"/>
+          </ac:spMkLst>
+        </pc:spChg>
+        <pc:spChg chg="add mod">
+          <ac:chgData name="Joseph Wonsil" userId="f7a5a8f17f3cf2df" providerId="LiveId" clId="{D6ABC174-D68B-445B-A75D-5908BB74AC88}" dt="2023-10-16T23:29:24.950" v="686" actId="1076"/>
+          <ac:spMkLst>
+            <pc:docMk/>
+            <pc:sldMk cId="1645475767" sldId="256"/>
+            <ac:spMk id="26" creationId="{1A397F50-31BF-2C16-56A3-490E4FF86B15}"/>
+          </ac:spMkLst>
+        </pc:spChg>
+        <pc:spChg chg="add mod">
+          <ac:chgData name="Joseph Wonsil" userId="f7a5a8f17f3cf2df" providerId="LiveId" clId="{D6ABC174-D68B-445B-A75D-5908BB74AC88}" dt="2023-10-16T23:29:24.950" v="686" actId="1076"/>
+          <ac:spMkLst>
+            <pc:docMk/>
+            <pc:sldMk cId="1645475767" sldId="256"/>
+            <ac:spMk id="27" creationId="{58A52717-D259-852F-EAFC-045F5DFD670C}"/>
+          </ac:spMkLst>
+        </pc:spChg>
+        <pc:spChg chg="mod">
+          <ac:chgData name="Joseph Wonsil" userId="f7a5a8f17f3cf2df" providerId="LiveId" clId="{D6ABC174-D68B-445B-A75D-5908BB74AC88}" dt="2023-10-16T23:29:24.950" v="686" actId="1076"/>
+          <ac:spMkLst>
+            <pc:docMk/>
+            <pc:sldMk cId="1645475767" sldId="256"/>
+            <ac:spMk id="28" creationId="{60C86E43-A887-CEA7-E6E6-67B122EE91E1}"/>
+          </ac:spMkLst>
+        </pc:spChg>
+        <pc:spChg chg="add del mod">
+          <ac:chgData name="Joseph Wonsil" userId="f7a5a8f17f3cf2df" providerId="LiveId" clId="{D6ABC174-D68B-445B-A75D-5908BB74AC88}" dt="2023-10-16T23:07:12.271" v="48" actId="478"/>
+          <ac:spMkLst>
+            <pc:docMk/>
+            <pc:sldMk cId="1645475767" sldId="256"/>
+            <ac:spMk id="29" creationId="{E55653A5-FDB2-CA9B-B199-C0A0E77B8895}"/>
+          </ac:spMkLst>
+        </pc:spChg>
+        <pc:spChg chg="add del mod">
+          <ac:chgData name="Joseph Wonsil" userId="f7a5a8f17f3cf2df" providerId="LiveId" clId="{D6ABC174-D68B-445B-A75D-5908BB74AC88}" dt="2023-10-16T23:14:04.912" v="198" actId="478"/>
+          <ac:spMkLst>
+            <pc:docMk/>
+            <pc:sldMk cId="1645475767" sldId="256"/>
+            <ac:spMk id="31" creationId="{EAF11AAC-02EB-71D5-395A-B2960947DE2A}"/>
+          </ac:spMkLst>
+        </pc:spChg>
+        <pc:spChg chg="mod">
+          <ac:chgData name="Joseph Wonsil" userId="f7a5a8f17f3cf2df" providerId="LiveId" clId="{D6ABC174-D68B-445B-A75D-5908BB74AC88}" dt="2023-10-16T23:29:24.950" v="686" actId="1076"/>
+          <ac:spMkLst>
+            <pc:docMk/>
+            <pc:sldMk cId="1645475767" sldId="256"/>
+            <ac:spMk id="32" creationId="{D4A062A0-410E-0FF1-9B6D-20281611B271}"/>
+          </ac:spMkLst>
+        </pc:spChg>
+        <pc:spChg chg="mod">
+          <ac:chgData name="Joseph Wonsil" userId="f7a5a8f17f3cf2df" providerId="LiveId" clId="{D6ABC174-D68B-445B-A75D-5908BB74AC88}" dt="2023-10-16T23:29:24.950" v="686" actId="1076"/>
+          <ac:spMkLst>
+            <pc:docMk/>
+            <pc:sldMk cId="1645475767" sldId="256"/>
+            <ac:spMk id="33" creationId="{B616FDAC-239F-3BA5-52A9-57EC0735B18A}"/>
+          </ac:spMkLst>
+        </pc:spChg>
+        <pc:spChg chg="add mod">
+          <ac:chgData name="Joseph Wonsil" userId="f7a5a8f17f3cf2df" providerId="LiveId" clId="{D6ABC174-D68B-445B-A75D-5908BB74AC88}" dt="2023-10-16T23:29:24.950" v="686" actId="1076"/>
+          <ac:spMkLst>
+            <pc:docMk/>
+            <pc:sldMk cId="1645475767" sldId="256"/>
+            <ac:spMk id="35" creationId="{79DFB4C1-7173-2B01-1064-8D6762B11BF5}"/>
+          </ac:spMkLst>
+        </pc:spChg>
+        <pc:spChg chg="add mod">
+          <ac:chgData name="Joseph Wonsil" userId="f7a5a8f17f3cf2df" providerId="LiveId" clId="{D6ABC174-D68B-445B-A75D-5908BB74AC88}" dt="2023-10-16T23:29:24.950" v="686" actId="1076"/>
+          <ac:spMkLst>
+            <pc:docMk/>
+            <pc:sldMk cId="1645475767" sldId="256"/>
+            <ac:spMk id="36" creationId="{B350F5B9-E2F8-D410-A3BA-F93D66DB605C}"/>
+          </ac:spMkLst>
+        </pc:spChg>
+        <pc:spChg chg="add del mod">
+          <ac:chgData name="Joseph Wonsil" userId="f7a5a8f17f3cf2df" providerId="LiveId" clId="{D6ABC174-D68B-445B-A75D-5908BB74AC88}" dt="2023-10-16T23:14:06.512" v="200" actId="478"/>
+          <ac:spMkLst>
+            <pc:docMk/>
+            <pc:sldMk cId="1645475767" sldId="256"/>
+            <ac:spMk id="38" creationId="{2E7A7201-8032-B266-461D-AF27F7AC8D30}"/>
+          </ac:spMkLst>
+        </pc:spChg>
+        <pc:spChg chg="add mod">
+          <ac:chgData name="Joseph Wonsil" userId="f7a5a8f17f3cf2df" providerId="LiveId" clId="{D6ABC174-D68B-445B-A75D-5908BB74AC88}" dt="2023-10-16T23:29:24.950" v="686" actId="1076"/>
+          <ac:spMkLst>
+            <pc:docMk/>
+            <pc:sldMk cId="1645475767" sldId="256"/>
+            <ac:spMk id="39" creationId="{6DC816CB-8782-D01C-BC59-A0FB21EA3108}"/>
+          </ac:spMkLst>
+        </pc:spChg>
+        <pc:spChg chg="add mod">
+          <ac:chgData name="Joseph Wonsil" userId="f7a5a8f17f3cf2df" providerId="LiveId" clId="{D6ABC174-D68B-445B-A75D-5908BB74AC88}" dt="2023-10-16T23:29:24.950" v="686" actId="1076"/>
+          <ac:spMkLst>
+            <pc:docMk/>
+            <pc:sldMk cId="1645475767" sldId="256"/>
+            <ac:spMk id="40" creationId="{FA25254E-DFA7-64F8-8FB4-6A5D4F0738C7}"/>
+          </ac:spMkLst>
+        </pc:spChg>
+        <pc:spChg chg="mod">
+          <ac:chgData name="Joseph Wonsil" userId="f7a5a8f17f3cf2df" providerId="LiveId" clId="{D6ABC174-D68B-445B-A75D-5908BB74AC88}" dt="2023-10-16T23:29:24.950" v="686" actId="1076"/>
+          <ac:spMkLst>
+            <pc:docMk/>
+            <pc:sldMk cId="1645475767" sldId="256"/>
+            <ac:spMk id="42" creationId="{62A6E74D-C00B-6C92-47F2-6164F95E0268}"/>
+          </ac:spMkLst>
+        </pc:spChg>
+        <pc:spChg chg="mod">
+          <ac:chgData name="Joseph Wonsil" userId="f7a5a8f17f3cf2df" providerId="LiveId" clId="{D6ABC174-D68B-445B-A75D-5908BB74AC88}" dt="2023-10-16T23:29:24.950" v="686" actId="1076"/>
+          <ac:spMkLst>
+            <pc:docMk/>
+            <pc:sldMk cId="1645475767" sldId="256"/>
+            <ac:spMk id="43" creationId="{B0ECA40D-A1F1-0CE3-96F9-10D673EB3C97}"/>
+          </ac:spMkLst>
+        </pc:spChg>
+        <pc:spChg chg="add del mod">
+          <ac:chgData name="Joseph Wonsil" userId="f7a5a8f17f3cf2df" providerId="LiveId" clId="{D6ABC174-D68B-445B-A75D-5908BB74AC88}" dt="2023-10-16T23:10:15.850" v="97" actId="478"/>
+          <ac:spMkLst>
+            <pc:docMk/>
+            <pc:sldMk cId="1645475767" sldId="256"/>
+            <ac:spMk id="44" creationId="{E43FD57E-4882-063D-6529-A05C3A8A72E9}"/>
+          </ac:spMkLst>
+        </pc:spChg>
+        <pc:spChg chg="mod">
+          <ac:chgData name="Joseph Wonsil" userId="f7a5a8f17f3cf2df" providerId="LiveId" clId="{D6ABC174-D68B-445B-A75D-5908BB74AC88}" dt="2023-10-16T23:29:24.950" v="686" actId="1076"/>
+          <ac:spMkLst>
+            <pc:docMk/>
+            <pc:sldMk cId="1645475767" sldId="256"/>
+            <ac:spMk id="49" creationId="{842C1335-EDA0-BED9-1A06-5454B66B2CE0}"/>
+          </ac:spMkLst>
+        </pc:spChg>
+        <pc:spChg chg="mod">
+          <ac:chgData name="Joseph Wonsil" userId="f7a5a8f17f3cf2df" providerId="LiveId" clId="{D6ABC174-D68B-445B-A75D-5908BB74AC88}" dt="2023-10-16T23:29:24.950" v="686" actId="1076"/>
+          <ac:spMkLst>
+            <pc:docMk/>
+            <pc:sldMk cId="1645475767" sldId="256"/>
+            <ac:spMk id="52" creationId="{7317D925-AE7B-290C-67A6-493750A3352F}"/>
+          </ac:spMkLst>
+        </pc:spChg>
+        <pc:spChg chg="mod">
+          <ac:chgData name="Joseph Wonsil" userId="f7a5a8f17f3cf2df" providerId="LiveId" clId="{D6ABC174-D68B-445B-A75D-5908BB74AC88}" dt="2023-10-16T23:29:24.950" v="686" actId="1076"/>
+          <ac:spMkLst>
+            <pc:docMk/>
+            <pc:sldMk cId="1645475767" sldId="256"/>
+            <ac:spMk id="55" creationId="{A5E815BE-843F-B791-FF94-453526BE2EF2}"/>
+          </ac:spMkLst>
+        </pc:spChg>
+        <pc:spChg chg="add del mod">
+          <ac:chgData name="Joseph Wonsil" userId="f7a5a8f17f3cf2df" providerId="LiveId" clId="{D6ABC174-D68B-445B-A75D-5908BB74AC88}" dt="2023-10-16T23:14:07.497" v="201" actId="478"/>
+          <ac:spMkLst>
+            <pc:docMk/>
+            <pc:sldMk cId="1645475767" sldId="256"/>
+            <ac:spMk id="59" creationId="{B98D6BE7-F304-CBBC-2A63-84EEC4898CC8}"/>
+          </ac:spMkLst>
+        </pc:spChg>
+        <pc:spChg chg="mod">
+          <ac:chgData name="Joseph Wonsil" userId="f7a5a8f17f3cf2df" providerId="LiveId" clId="{D6ABC174-D68B-445B-A75D-5908BB74AC88}" dt="2023-10-16T23:29:24.950" v="686" actId="1076"/>
+          <ac:spMkLst>
+            <pc:docMk/>
+            <pc:sldMk cId="1645475767" sldId="256"/>
+            <ac:spMk id="60" creationId="{35FA7E34-1A13-B6DF-79C2-60F41A23F37B}"/>
+          </ac:spMkLst>
+        </pc:spChg>
+        <pc:spChg chg="mod">
+          <ac:chgData name="Joseph Wonsil" userId="f7a5a8f17f3cf2df" providerId="LiveId" clId="{D6ABC174-D68B-445B-A75D-5908BB74AC88}" dt="2023-10-16T23:29:24.950" v="686" actId="1076"/>
+          <ac:spMkLst>
+            <pc:docMk/>
+            <pc:sldMk cId="1645475767" sldId="256"/>
+            <ac:spMk id="61" creationId="{7ECA03CF-DD24-9307-D184-41182C04B82A}"/>
+          </ac:spMkLst>
+        </pc:spChg>
+        <pc:spChg chg="add mod">
+          <ac:chgData name="Joseph Wonsil" userId="f7a5a8f17f3cf2df" providerId="LiveId" clId="{D6ABC174-D68B-445B-A75D-5908BB74AC88}" dt="2023-10-16T23:29:24.950" v="686" actId="1076"/>
+          <ac:spMkLst>
+            <pc:docMk/>
+            <pc:sldMk cId="1645475767" sldId="256"/>
+            <ac:spMk id="63" creationId="{07A62DDE-C94D-4783-4BFD-408E0B156DED}"/>
+          </ac:spMkLst>
+        </pc:spChg>
+        <pc:spChg chg="add mod">
+          <ac:chgData name="Joseph Wonsil" userId="f7a5a8f17f3cf2df" providerId="LiveId" clId="{D6ABC174-D68B-445B-A75D-5908BB74AC88}" dt="2023-10-16T23:29:24.950" v="686" actId="1076"/>
+          <ac:spMkLst>
+            <pc:docMk/>
+            <pc:sldMk cId="1645475767" sldId="256"/>
+            <ac:spMk id="68" creationId="{9CD63190-6F0C-7B53-9050-C772D436F95B}"/>
+          </ac:spMkLst>
+        </pc:spChg>
+        <pc:spChg chg="mod">
+          <ac:chgData name="Joseph Wonsil" userId="f7a5a8f17f3cf2df" providerId="LiveId" clId="{D6ABC174-D68B-445B-A75D-5908BB74AC88}" dt="2023-10-16T23:29:24.950" v="686" actId="1076"/>
+          <ac:spMkLst>
+            <pc:docMk/>
+            <pc:sldMk cId="1645475767" sldId="256"/>
+            <ac:spMk id="70" creationId="{EEB73B9F-8EE1-8959-6128-F66F9F2B6A19}"/>
+          </ac:spMkLst>
+        </pc:spChg>
+        <pc:spChg chg="mod">
+          <ac:chgData name="Joseph Wonsil" userId="f7a5a8f17f3cf2df" providerId="LiveId" clId="{D6ABC174-D68B-445B-A75D-5908BB74AC88}" dt="2023-10-16T23:29:24.950" v="686" actId="1076"/>
+          <ac:spMkLst>
+            <pc:docMk/>
+            <pc:sldMk cId="1645475767" sldId="256"/>
+            <ac:spMk id="71" creationId="{2A34F01A-7639-BB9B-04EC-3D4D626FAB55}"/>
+          </ac:spMkLst>
+        </pc:spChg>
+        <pc:spChg chg="mod">
+          <ac:chgData name="Joseph Wonsil" userId="f7a5a8f17f3cf2df" providerId="LiveId" clId="{D6ABC174-D68B-445B-A75D-5908BB74AC88}" dt="2023-10-16T23:29:24.950" v="686" actId="1076"/>
+          <ac:spMkLst>
+            <pc:docMk/>
+            <pc:sldMk cId="1645475767" sldId="256"/>
+            <ac:spMk id="74" creationId="{52E3ADAE-159A-D64F-DF75-180DC743C4CA}"/>
+          </ac:spMkLst>
+        </pc:spChg>
+        <pc:spChg chg="add del mod">
+          <ac:chgData name="Joseph Wonsil" userId="f7a5a8f17f3cf2df" providerId="LiveId" clId="{D6ABC174-D68B-445B-A75D-5908BB74AC88}" dt="2023-10-16T23:14:08.549" v="202" actId="478"/>
+          <ac:spMkLst>
+            <pc:docMk/>
+            <pc:sldMk cId="1645475767" sldId="256"/>
+            <ac:spMk id="80" creationId="{5F751107-4977-75F1-7373-E5D7DF7E77ED}"/>
+          </ac:spMkLst>
+        </pc:spChg>
+        <pc:spChg chg="add mod">
+          <ac:chgData name="Joseph Wonsil" userId="f7a5a8f17f3cf2df" providerId="LiveId" clId="{D6ABC174-D68B-445B-A75D-5908BB74AC88}" dt="2023-10-16T23:29:24.950" v="686" actId="1076"/>
+          <ac:spMkLst>
+            <pc:docMk/>
+            <pc:sldMk cId="1645475767" sldId="256"/>
+            <ac:spMk id="84" creationId="{D34F5F8D-B16A-EDE4-A61F-9D0E7E4C7BBC}"/>
+          </ac:spMkLst>
+        </pc:spChg>
+        <pc:spChg chg="add mod">
+          <ac:chgData name="Joseph Wonsil" userId="f7a5a8f17f3cf2df" providerId="LiveId" clId="{D6ABC174-D68B-445B-A75D-5908BB74AC88}" dt="2023-10-16T23:29:24.950" v="686" actId="1076"/>
+          <ac:spMkLst>
+            <pc:docMk/>
+            <pc:sldMk cId="1645475767" sldId="256"/>
+            <ac:spMk id="85" creationId="{84E65B77-934D-4C57-DE5D-9702D4AA5BCB}"/>
+          </ac:spMkLst>
+        </pc:spChg>
+        <pc:spChg chg="add mod">
+          <ac:chgData name="Joseph Wonsil" userId="f7a5a8f17f3cf2df" providerId="LiveId" clId="{D6ABC174-D68B-445B-A75D-5908BB74AC88}" dt="2023-10-16T23:29:24.950" v="686" actId="1076"/>
+          <ac:spMkLst>
+            <pc:docMk/>
+            <pc:sldMk cId="1645475767" sldId="256"/>
+            <ac:spMk id="90" creationId="{8A8D6037-92ED-5E61-EE2A-60DD15DDB033}"/>
+          </ac:spMkLst>
+        </pc:spChg>
+        <pc:spChg chg="add mod">
+          <ac:chgData name="Joseph Wonsil" userId="f7a5a8f17f3cf2df" providerId="LiveId" clId="{D6ABC174-D68B-445B-A75D-5908BB74AC88}" dt="2023-10-16T23:29:24.950" v="686" actId="1076"/>
+          <ac:spMkLst>
+            <pc:docMk/>
+            <pc:sldMk cId="1645475767" sldId="256"/>
+            <ac:spMk id="91" creationId="{659BA44D-74DE-FF8E-EC99-D7D1DC21885A}"/>
+          </ac:spMkLst>
+        </pc:spChg>
+        <pc:spChg chg="add del mod">
+          <ac:chgData name="Joseph Wonsil" userId="f7a5a8f17f3cf2df" providerId="LiveId" clId="{D6ABC174-D68B-445B-A75D-5908BB74AC88}" dt="2023-10-16T23:14:09.806" v="203" actId="478"/>
+          <ac:spMkLst>
+            <pc:docMk/>
+            <pc:sldMk cId="1645475767" sldId="256"/>
+            <ac:spMk id="96" creationId="{76E25628-5BF4-71B1-546D-359ED2818B78}"/>
+          </ac:spMkLst>
+        </pc:spChg>
+        <pc:spChg chg="add del mod">
+          <ac:chgData name="Joseph Wonsil" userId="f7a5a8f17f3cf2df" providerId="LiveId" clId="{D6ABC174-D68B-445B-A75D-5908BB74AC88}" dt="2023-10-16T23:14:10.795" v="204" actId="478"/>
+          <ac:spMkLst>
+            <pc:docMk/>
+            <pc:sldMk cId="1645475767" sldId="256"/>
+            <ac:spMk id="97" creationId="{D9C21539-62BA-46C9-E496-58354AAAEE37}"/>
+          </ac:spMkLst>
+        </pc:spChg>
+        <pc:spChg chg="add mod">
+          <ac:chgData name="Joseph Wonsil" userId="f7a5a8f17f3cf2df" providerId="LiveId" clId="{D6ABC174-D68B-445B-A75D-5908BB74AC88}" dt="2023-10-16T23:29:24.950" v="686" actId="1076"/>
+          <ac:spMkLst>
+            <pc:docMk/>
+            <pc:sldMk cId="1645475767" sldId="256"/>
+            <ac:spMk id="100" creationId="{E92B3433-66A4-7341-0A10-1B6541AA2707}"/>
+          </ac:spMkLst>
+        </pc:spChg>
+        <pc:spChg chg="add mod">
+          <ac:chgData name="Joseph Wonsil" userId="f7a5a8f17f3cf2df" providerId="LiveId" clId="{D6ABC174-D68B-445B-A75D-5908BB74AC88}" dt="2023-10-16T23:29:24.950" v="686" actId="1076"/>
+          <ac:spMkLst>
+            <pc:docMk/>
+            <pc:sldMk cId="1645475767" sldId="256"/>
+            <ac:spMk id="101" creationId="{1DE6908C-CB8C-CAF2-6CD7-D732B0AB1E33}"/>
+          </ac:spMkLst>
+        </pc:spChg>
+        <pc:spChg chg="add mod">
+          <ac:chgData name="Joseph Wonsil" userId="f7a5a8f17f3cf2df" providerId="LiveId" clId="{D6ABC174-D68B-445B-A75D-5908BB74AC88}" dt="2023-10-16T23:29:24.950" v="686" actId="1076"/>
+          <ac:spMkLst>
+            <pc:docMk/>
+            <pc:sldMk cId="1645475767" sldId="256"/>
+            <ac:spMk id="102" creationId="{BAB78B8E-574B-3156-CD83-4D165FEDCC4F}"/>
+          </ac:spMkLst>
+        </pc:spChg>
+        <pc:spChg chg="add mod">
+          <ac:chgData name="Joseph Wonsil" userId="f7a5a8f17f3cf2df" providerId="LiveId" clId="{D6ABC174-D68B-445B-A75D-5908BB74AC88}" dt="2023-10-16T23:29:24.950" v="686" actId="1076"/>
+          <ac:spMkLst>
+            <pc:docMk/>
+            <pc:sldMk cId="1645475767" sldId="256"/>
+            <ac:spMk id="103" creationId="{0C69731E-2E67-A043-504E-23C966E68671}"/>
+          </ac:spMkLst>
+        </pc:spChg>
+        <pc:spChg chg="mod">
+          <ac:chgData name="Joseph Wonsil" userId="f7a5a8f17f3cf2df" providerId="LiveId" clId="{D6ABC174-D68B-445B-A75D-5908BB74AC88}" dt="2023-10-16T23:29:24.950" v="686" actId="1076"/>
+          <ac:spMkLst>
+            <pc:docMk/>
+            <pc:sldMk cId="1645475767" sldId="256"/>
+            <ac:spMk id="104" creationId="{6B62EFFA-4EC9-3E5B-73F6-0D19114CAFC9}"/>
+          </ac:spMkLst>
+        </pc:spChg>
+        <pc:spChg chg="add mod">
+          <ac:chgData name="Joseph Wonsil" userId="f7a5a8f17f3cf2df" providerId="LiveId" clId="{D6ABC174-D68B-445B-A75D-5908BB74AC88}" dt="2023-10-16T23:29:24.950" v="686" actId="1076"/>
+          <ac:spMkLst>
+            <pc:docMk/>
+            <pc:sldMk cId="1645475767" sldId="256"/>
+            <ac:spMk id="105" creationId="{2ACDEB4D-3118-62F1-B8A8-ADB24DBACF82}"/>
+          </ac:spMkLst>
+        </pc:spChg>
+        <pc:spChg chg="add mod">
+          <ac:chgData name="Joseph Wonsil" userId="f7a5a8f17f3cf2df" providerId="LiveId" clId="{D6ABC174-D68B-445B-A75D-5908BB74AC88}" dt="2023-10-16T23:29:24.950" v="686" actId="1076"/>
+          <ac:spMkLst>
+            <pc:docMk/>
+            <pc:sldMk cId="1645475767" sldId="256"/>
+            <ac:spMk id="106" creationId="{4B49D07C-8A79-6007-E41D-E45A4FC9D8C6}"/>
+          </ac:spMkLst>
+        </pc:spChg>
+        <pc:spChg chg="add mod">
+          <ac:chgData name="Joseph Wonsil" userId="f7a5a8f17f3cf2df" providerId="LiveId" clId="{D6ABC174-D68B-445B-A75D-5908BB74AC88}" dt="2023-10-16T23:29:24.950" v="686" actId="1076"/>
+          <ac:spMkLst>
+            <pc:docMk/>
+            <pc:sldMk cId="1645475767" sldId="256"/>
+            <ac:spMk id="132" creationId="{85BD8B9C-80C0-4ECE-A347-E4D26F891B45}"/>
+          </ac:spMkLst>
+        </pc:spChg>
+        <pc:spChg chg="add mod">
+          <ac:chgData name="Joseph Wonsil" userId="f7a5a8f17f3cf2df" providerId="LiveId" clId="{D6ABC174-D68B-445B-A75D-5908BB74AC88}" dt="2023-10-16T23:29:24.950" v="686" actId="1076"/>
+          <ac:spMkLst>
+            <pc:docMk/>
+            <pc:sldMk cId="1645475767" sldId="256"/>
+            <ac:spMk id="138" creationId="{E242FAFA-CB49-296E-9F35-248943C2966E}"/>
+          </ac:spMkLst>
+        </pc:spChg>
+        <pc:spChg chg="add mod">
+          <ac:chgData name="Joseph Wonsil" userId="f7a5a8f17f3cf2df" providerId="LiveId" clId="{D6ABC174-D68B-445B-A75D-5908BB74AC88}" dt="2023-10-16T23:29:24.950" v="686" actId="1076"/>
+          <ac:spMkLst>
+            <pc:docMk/>
+            <pc:sldMk cId="1645475767" sldId="256"/>
+            <ac:spMk id="139" creationId="{802C46F5-7BD6-F450-D2B4-347C92B57CFE}"/>
+          </ac:spMkLst>
+        </pc:spChg>
+        <pc:spChg chg="add mod">
+          <ac:chgData name="Joseph Wonsil" userId="f7a5a8f17f3cf2df" providerId="LiveId" clId="{D6ABC174-D68B-445B-A75D-5908BB74AC88}" dt="2023-10-16T23:29:24.950" v="686" actId="1076"/>
+          <ac:spMkLst>
+            <pc:docMk/>
+            <pc:sldMk cId="1645475767" sldId="256"/>
+            <ac:spMk id="144" creationId="{3BA36D46-2F89-D8A4-A60C-17E29D68CFA5}"/>
+          </ac:spMkLst>
+        </pc:spChg>
+        <pc:spChg chg="add del mod">
+          <ac:chgData name="Joseph Wonsil" userId="f7a5a8f17f3cf2df" providerId="LiveId" clId="{D6ABC174-D68B-445B-A75D-5908BB74AC88}" dt="2023-10-16T23:26:08.719" v="661" actId="478"/>
+          <ac:spMkLst>
+            <pc:docMk/>
+            <pc:sldMk cId="1645475767" sldId="256"/>
+            <ac:spMk id="146" creationId="{028B6804-1C46-AD7E-A387-7A8C99F8563D}"/>
+          </ac:spMkLst>
+        </pc:spChg>
+        <pc:spChg chg="add mod">
+          <ac:chgData name="Joseph Wonsil" userId="f7a5a8f17f3cf2df" providerId="LiveId" clId="{D6ABC174-D68B-445B-A75D-5908BB74AC88}" dt="2023-10-16T23:29:24.950" v="686" actId="1076"/>
+          <ac:spMkLst>
+            <pc:docMk/>
+            <pc:sldMk cId="1645475767" sldId="256"/>
+            <ac:spMk id="157" creationId="{2EC089FA-274C-2CBC-86EB-EAA86F31FDEF}"/>
+          </ac:spMkLst>
+        </pc:spChg>
+        <pc:cxnChg chg="mod">
+          <ac:chgData name="Joseph Wonsil" userId="f7a5a8f17f3cf2df" providerId="LiveId" clId="{D6ABC174-D68B-445B-A75D-5908BB74AC88}" dt="2023-10-16T23:29:24.950" v="686" actId="1076"/>
+          <ac:cxnSpMkLst>
+            <pc:docMk/>
+            <pc:sldMk cId="1645475767" sldId="256"/>
+            <ac:cxnSpMk id="4" creationId="{1FAF49EF-246B-5065-399F-6F3D99F68D6C}"/>
+          </ac:cxnSpMkLst>
+        </pc:cxnChg>
+        <pc:cxnChg chg="mod">
+          <ac:chgData name="Joseph Wonsil" userId="f7a5a8f17f3cf2df" providerId="LiveId" clId="{D6ABC174-D68B-445B-A75D-5908BB74AC88}" dt="2023-10-16T23:29:24.950" v="686" actId="1076"/>
+          <ac:cxnSpMkLst>
+            <pc:docMk/>
+            <pc:sldMk cId="1645475767" sldId="256"/>
+            <ac:cxnSpMk id="7" creationId="{CFFEAC4B-C6E1-0754-849B-C9DE5A9020F3}"/>
+          </ac:cxnSpMkLst>
+        </pc:cxnChg>
+        <pc:cxnChg chg="mod">
+          <ac:chgData name="Joseph Wonsil" userId="f7a5a8f17f3cf2df" providerId="LiveId" clId="{D6ABC174-D68B-445B-A75D-5908BB74AC88}" dt="2023-10-16T23:29:24.950" v="686" actId="1076"/>
+          <ac:cxnSpMkLst>
+            <pc:docMk/>
+            <pc:sldMk cId="1645475767" sldId="256"/>
+            <ac:cxnSpMk id="8" creationId="{E3A3FFC5-3ECB-F504-1EB7-79E7359B9CFC}"/>
+          </ac:cxnSpMkLst>
+        </pc:cxnChg>
+        <pc:cxnChg chg="mod">
+          <ac:chgData name="Joseph Wonsil" userId="f7a5a8f17f3cf2df" providerId="LiveId" clId="{D6ABC174-D68B-445B-A75D-5908BB74AC88}" dt="2023-10-16T23:29:24.950" v="686" actId="1076"/>
+          <ac:cxnSpMkLst>
+            <pc:docMk/>
+            <pc:sldMk cId="1645475767" sldId="256"/>
+            <ac:cxnSpMk id="9" creationId="{0A563654-6AF8-5959-7EF7-1707843DF81A}"/>
+          </ac:cxnSpMkLst>
+        </pc:cxnChg>
+        <pc:cxnChg chg="add del mod">
+          <ac:chgData name="Joseph Wonsil" userId="f7a5a8f17f3cf2df" providerId="LiveId" clId="{D6ABC174-D68B-445B-A75D-5908BB74AC88}" dt="2023-10-16T21:32:04.752" v="27" actId="478"/>
+          <ac:cxnSpMkLst>
+            <pc:docMk/>
+            <pc:sldMk cId="1645475767" sldId="256"/>
+            <ac:cxnSpMk id="16" creationId="{6E8E699C-8362-620C-3B7B-67743EDBCA1F}"/>
+          </ac:cxnSpMkLst>
+        </pc:cxnChg>
+        <pc:cxnChg chg="add mod">
+          <ac:chgData name="Joseph Wonsil" userId="f7a5a8f17f3cf2df" providerId="LiveId" clId="{D6ABC174-D68B-445B-A75D-5908BB74AC88}" dt="2023-10-16T23:29:24.950" v="686" actId="1076"/>
+          <ac:cxnSpMkLst>
+            <pc:docMk/>
+            <pc:sldMk cId="1645475767" sldId="256"/>
+            <ac:cxnSpMk id="23" creationId="{23D61AF6-840C-7E29-57B3-7DB3D4B2CB5B}"/>
+          </ac:cxnSpMkLst>
+        </pc:cxnChg>
+        <pc:cxnChg chg="add mod">
+          <ac:chgData name="Joseph Wonsil" userId="f7a5a8f17f3cf2df" providerId="LiveId" clId="{D6ABC174-D68B-445B-A75D-5908BB74AC88}" dt="2023-10-16T23:29:24.950" v="686" actId="1076"/>
+          <ac:cxnSpMkLst>
+            <pc:docMk/>
+            <pc:sldMk cId="1645475767" sldId="256"/>
+            <ac:cxnSpMk id="30" creationId="{92CF7358-07D9-EA8C-0D7A-860C9F5C5ACF}"/>
+          </ac:cxnSpMkLst>
+        </pc:cxnChg>
+        <pc:cxnChg chg="mod">
+          <ac:chgData name="Joseph Wonsil" userId="f7a5a8f17f3cf2df" providerId="LiveId" clId="{D6ABC174-D68B-445B-A75D-5908BB74AC88}" dt="2023-10-16T23:29:24.950" v="686" actId="1076"/>
+          <ac:cxnSpMkLst>
+            <pc:docMk/>
+            <pc:sldMk cId="1645475767" sldId="256"/>
+            <ac:cxnSpMk id="34" creationId="{8C48BD3A-932B-C7D1-C21F-389E8FA1D750}"/>
+          </ac:cxnSpMkLst>
+        </pc:cxnChg>
+        <pc:cxnChg chg="add mod">
+          <ac:chgData name="Joseph Wonsil" userId="f7a5a8f17f3cf2df" providerId="LiveId" clId="{D6ABC174-D68B-445B-A75D-5908BB74AC88}" dt="2023-10-16T23:29:24.950" v="686" actId="1076"/>
+          <ac:cxnSpMkLst>
+            <pc:docMk/>
+            <pc:sldMk cId="1645475767" sldId="256"/>
+            <ac:cxnSpMk id="37" creationId="{6F20C18C-B4A8-7CAD-913D-7F0217BF73CC}"/>
+          </ac:cxnSpMkLst>
+        </pc:cxnChg>
+        <pc:cxnChg chg="add del mod">
+          <ac:chgData name="Joseph Wonsil" userId="f7a5a8f17f3cf2df" providerId="LiveId" clId="{D6ABC174-D68B-445B-A75D-5908BB74AC88}" dt="2023-10-16T23:10:16.876" v="98" actId="478"/>
+          <ac:cxnSpMkLst>
+            <pc:docMk/>
+            <pc:sldMk cId="1645475767" sldId="256"/>
+            <ac:cxnSpMk id="41" creationId="{002DE991-E2D2-AF8A-EA37-2D0B85C91A72}"/>
+          </ac:cxnSpMkLst>
+        </pc:cxnChg>
+        <pc:cxnChg chg="add mod">
+          <ac:chgData name="Joseph Wonsil" userId="f7a5a8f17f3cf2df" providerId="LiveId" clId="{D6ABC174-D68B-445B-A75D-5908BB74AC88}" dt="2023-10-16T23:29:24.950" v="686" actId="1076"/>
+          <ac:cxnSpMkLst>
+            <pc:docMk/>
+            <pc:sldMk cId="1645475767" sldId="256"/>
+            <ac:cxnSpMk id="46" creationId="{34027DC1-9608-8FC2-B855-03FC2D10CF3D}"/>
+          </ac:cxnSpMkLst>
+        </pc:cxnChg>
+        <pc:cxnChg chg="mod">
+          <ac:chgData name="Joseph Wonsil" userId="f7a5a8f17f3cf2df" providerId="LiveId" clId="{D6ABC174-D68B-445B-A75D-5908BB74AC88}" dt="2023-10-16T23:29:24.950" v="686" actId="1076"/>
+          <ac:cxnSpMkLst>
+            <pc:docMk/>
+            <pc:sldMk cId="1645475767" sldId="256"/>
+            <ac:cxnSpMk id="50" creationId="{3E940EC5-3D16-B53B-92BC-3B51950E358D}"/>
+          </ac:cxnSpMkLst>
+        </pc:cxnChg>
+        <pc:cxnChg chg="mod">
+          <ac:chgData name="Joseph Wonsil" userId="f7a5a8f17f3cf2df" providerId="LiveId" clId="{D6ABC174-D68B-445B-A75D-5908BB74AC88}" dt="2023-10-16T23:29:24.950" v="686" actId="1076"/>
+          <ac:cxnSpMkLst>
+            <pc:docMk/>
+            <pc:sldMk cId="1645475767" sldId="256"/>
+            <ac:cxnSpMk id="53" creationId="{1C2578E2-210F-BFA7-80C8-ADB6B3D34E24}"/>
+          </ac:cxnSpMkLst>
+        </pc:cxnChg>
+        <pc:cxnChg chg="mod">
+          <ac:chgData name="Joseph Wonsil" userId="f7a5a8f17f3cf2df" providerId="LiveId" clId="{D6ABC174-D68B-445B-A75D-5908BB74AC88}" dt="2023-10-16T23:29:24.950" v="686" actId="1076"/>
+          <ac:cxnSpMkLst>
+            <pc:docMk/>
+            <pc:sldMk cId="1645475767" sldId="256"/>
+            <ac:cxnSpMk id="56" creationId="{CE6983D4-3F57-B5C6-DA2B-A89A230613C8}"/>
+          </ac:cxnSpMkLst>
+        </pc:cxnChg>
+        <pc:cxnChg chg="mod">
+          <ac:chgData name="Joseph Wonsil" userId="f7a5a8f17f3cf2df" providerId="LiveId" clId="{D6ABC174-D68B-445B-A75D-5908BB74AC88}" dt="2023-10-16T23:29:24.950" v="686" actId="1076"/>
+          <ac:cxnSpMkLst>
+            <pc:docMk/>
+            <pc:sldMk cId="1645475767" sldId="256"/>
+            <ac:cxnSpMk id="62" creationId="{4467B832-EDA5-D418-B682-ECA109408340}"/>
+          </ac:cxnSpMkLst>
+        </pc:cxnChg>
+        <pc:cxnChg chg="add mod">
+          <ac:chgData name="Joseph Wonsil" userId="f7a5a8f17f3cf2df" providerId="LiveId" clId="{D6ABC174-D68B-445B-A75D-5908BB74AC88}" dt="2023-10-16T23:29:24.950" v="686" actId="1076"/>
+          <ac:cxnSpMkLst>
+            <pc:docMk/>
+            <pc:sldMk cId="1645475767" sldId="256"/>
+            <ac:cxnSpMk id="69" creationId="{145A7E76-DF91-F32D-9FB1-A172DA075F92}"/>
+          </ac:cxnSpMkLst>
+        </pc:cxnChg>
+        <pc:cxnChg chg="mod">
+          <ac:chgData name="Joseph Wonsil" userId="f7a5a8f17f3cf2df" providerId="LiveId" clId="{D6ABC174-D68B-445B-A75D-5908BB74AC88}" dt="2023-10-16T23:29:24.950" v="686" actId="1076"/>
+          <ac:cxnSpMkLst>
+            <pc:docMk/>
+            <pc:sldMk cId="1645475767" sldId="256"/>
+            <ac:cxnSpMk id="73" creationId="{71C4DB77-00EC-7C19-199C-316CA4BAC798}"/>
+          </ac:cxnSpMkLst>
+        </pc:cxnChg>
+        <pc:cxnChg chg="mod">
+          <ac:chgData name="Joseph Wonsil" userId="f7a5a8f17f3cf2df" providerId="LiveId" clId="{D6ABC174-D68B-445B-A75D-5908BB74AC88}" dt="2023-10-16T23:29:24.950" v="686" actId="1076"/>
+          <ac:cxnSpMkLst>
+            <pc:docMk/>
+            <pc:sldMk cId="1645475767" sldId="256"/>
+            <ac:cxnSpMk id="75" creationId="{FB24C36A-F777-3F4B-7F99-AC0F285C243D}"/>
+          </ac:cxnSpMkLst>
+        </pc:cxnChg>
+        <pc:cxnChg chg="mod">
+          <ac:chgData name="Joseph Wonsil" userId="f7a5a8f17f3cf2df" providerId="LiveId" clId="{D6ABC174-D68B-445B-A75D-5908BB74AC88}" dt="2023-10-16T23:29:24.950" v="686" actId="1076"/>
+          <ac:cxnSpMkLst>
+            <pc:docMk/>
+            <pc:sldMk cId="1645475767" sldId="256"/>
+            <ac:cxnSpMk id="77" creationId="{3AC8B372-20BA-0704-66B7-39F62AA3CBF9}"/>
+          </ac:cxnSpMkLst>
+        </pc:cxnChg>
+        <pc:cxnChg chg="add mod">
+          <ac:chgData name="Joseph Wonsil" userId="f7a5a8f17f3cf2df" providerId="LiveId" clId="{D6ABC174-D68B-445B-A75D-5908BB74AC88}" dt="2023-10-16T23:29:24.950" v="686" actId="1076"/>
+          <ac:cxnSpMkLst>
+            <pc:docMk/>
+            <pc:sldMk cId="1645475767" sldId="256"/>
+            <ac:cxnSpMk id="86" creationId="{EC053AFE-E056-79CC-7911-5BD8825293B3}"/>
+          </ac:cxnSpMkLst>
+        </pc:cxnChg>
+        <pc:cxnChg chg="add mod">
+          <ac:chgData name="Joseph Wonsil" userId="f7a5a8f17f3cf2df" providerId="LiveId" clId="{D6ABC174-D68B-445B-A75D-5908BB74AC88}" dt="2023-10-16T23:29:24.950" v="686" actId="1076"/>
+          <ac:cxnSpMkLst>
+            <pc:docMk/>
+            <pc:sldMk cId="1645475767" sldId="256"/>
+            <ac:cxnSpMk id="92" creationId="{E4EFC397-B69B-7C22-91DF-71E352AAA497}"/>
+          </ac:cxnSpMkLst>
+        </pc:cxnChg>
+        <pc:cxnChg chg="add mod">
+          <ac:chgData name="Joseph Wonsil" userId="f7a5a8f17f3cf2df" providerId="LiveId" clId="{D6ABC174-D68B-445B-A75D-5908BB74AC88}" dt="2023-10-16T23:29:24.950" v="686" actId="1076"/>
+          <ac:cxnSpMkLst>
+            <pc:docMk/>
+            <pc:sldMk cId="1645475767" sldId="256"/>
+            <ac:cxnSpMk id="140" creationId="{40F6DD3F-D4FB-8B03-9FE5-B051FC5E4D52}"/>
+          </ac:cxnSpMkLst>
+        </pc:cxnChg>
+        <pc:cxnChg chg="add mod">
+          <ac:chgData name="Joseph Wonsil" userId="f7a5a8f17f3cf2df" providerId="LiveId" clId="{D6ABC174-D68B-445B-A75D-5908BB74AC88}" dt="2023-10-16T23:29:24.950" v="686" actId="1076"/>
+          <ac:cxnSpMkLst>
+            <pc:docMk/>
+            <pc:sldMk cId="1645475767" sldId="256"/>
+            <ac:cxnSpMk id="145" creationId="{0C692CDF-0F7B-0069-67DF-3E6458131FC3}"/>
           </ac:cxnSpMkLst>
         </pc:cxnChg>
       </pc:sldChg>
@@ -5720,7 +5720,7 @@
           <a:p>
             <a:fld id="{4DAAF268-B108-415A-8D22-4C329ED559E0}" type="datetimeFigureOut">
               <a:rPr lang="en-US" smtClean="0"/>
-              <a:t>10/23/2023</a:t>
+              <a:t>10/30/23</a:t>
             </a:fld>
             <a:endParaRPr lang="en-US"/>
           </a:p>
@@ -5890,7 +5890,7 @@
           <a:p>
             <a:fld id="{4DAAF268-B108-415A-8D22-4C329ED559E0}" type="datetimeFigureOut">
               <a:rPr lang="en-US" smtClean="0"/>
-              <a:t>10/23/2023</a:t>
+              <a:t>10/30/23</a:t>
             </a:fld>
             <a:endParaRPr lang="en-US"/>
           </a:p>
@@ -6070,7 +6070,7 @@
           <a:p>
             <a:fld id="{4DAAF268-B108-415A-8D22-4C329ED559E0}" type="datetimeFigureOut">
               <a:rPr lang="en-US" smtClean="0"/>
-              <a:t>10/23/2023</a:t>
+              <a:t>10/30/23</a:t>
             </a:fld>
             <a:endParaRPr lang="en-US"/>
           </a:p>
@@ -6240,7 +6240,7 @@
           <a:p>
             <a:fld id="{4DAAF268-B108-415A-8D22-4C329ED559E0}" type="datetimeFigureOut">
               <a:rPr lang="en-US" smtClean="0"/>
-              <a:t>10/23/2023</a:t>
+              <a:t>10/30/23</a:t>
             </a:fld>
             <a:endParaRPr lang="en-US"/>
           </a:p>
@@ -6484,7 +6484,7 @@
           <a:p>
             <a:fld id="{4DAAF268-B108-415A-8D22-4C329ED559E0}" type="datetimeFigureOut">
               <a:rPr lang="en-US" smtClean="0"/>
-              <a:t>10/23/2023</a:t>
+              <a:t>10/30/23</a:t>
             </a:fld>
             <a:endParaRPr lang="en-US"/>
           </a:p>
@@ -6716,7 +6716,7 @@
           <a:p>
             <a:fld id="{4DAAF268-B108-415A-8D22-4C329ED559E0}" type="datetimeFigureOut">
               <a:rPr lang="en-US" smtClean="0"/>
-              <a:t>10/23/2023</a:t>
+              <a:t>10/30/23</a:t>
             </a:fld>
             <a:endParaRPr lang="en-US"/>
           </a:p>
@@ -7083,7 +7083,7 @@
           <a:p>
             <a:fld id="{4DAAF268-B108-415A-8D22-4C329ED559E0}" type="datetimeFigureOut">
               <a:rPr lang="en-US" smtClean="0"/>
-              <a:t>10/23/2023</a:t>
+              <a:t>10/30/23</a:t>
             </a:fld>
             <a:endParaRPr lang="en-US"/>
           </a:p>
@@ -7201,7 +7201,7 @@
           <a:p>
             <a:fld id="{4DAAF268-B108-415A-8D22-4C329ED559E0}" type="datetimeFigureOut">
               <a:rPr lang="en-US" smtClean="0"/>
-              <a:t>10/23/2023</a:t>
+              <a:t>10/30/23</a:t>
             </a:fld>
             <a:endParaRPr lang="en-US"/>
           </a:p>
@@ -7296,7 +7296,7 @@
           <a:p>
             <a:fld id="{4DAAF268-B108-415A-8D22-4C329ED559E0}" type="datetimeFigureOut">
               <a:rPr lang="en-US" smtClean="0"/>
-              <a:t>10/23/2023</a:t>
+              <a:t>10/30/23</a:t>
             </a:fld>
             <a:endParaRPr lang="en-US"/>
           </a:p>
@@ -7573,7 +7573,7 @@
           <a:p>
             <a:fld id="{4DAAF268-B108-415A-8D22-4C329ED559E0}" type="datetimeFigureOut">
               <a:rPr lang="en-US" smtClean="0"/>
-              <a:t>10/23/2023</a:t>
+              <a:t>10/30/23</a:t>
             </a:fld>
             <a:endParaRPr lang="en-US"/>
           </a:p>
@@ -7830,7 +7830,7 @@
           <a:p>
             <a:fld id="{4DAAF268-B108-415A-8D22-4C329ED559E0}" type="datetimeFigureOut">
               <a:rPr lang="en-US" smtClean="0"/>
-              <a:t>10/23/2023</a:t>
+              <a:t>10/30/23</a:t>
             </a:fld>
             <a:endParaRPr lang="en-US"/>
           </a:p>
@@ -8043,7 +8043,7 @@
           <a:p>
             <a:fld id="{4DAAF268-B108-415A-8D22-4C329ED559E0}" type="datetimeFigureOut">
               <a:rPr lang="en-US" smtClean="0"/>
-              <a:t>10/23/2023</a:t>
+              <a:t>10/30/23</a:t>
             </a:fld>
             <a:endParaRPr lang="en-US"/>
           </a:p>
@@ -8463,7 +8463,7 @@
         <p:spPr>
           <a:xfrm>
             <a:off x="12814640" y="382682"/>
-            <a:ext cx="7246236" cy="12977611"/>
+            <a:ext cx="7424990" cy="13453410"/>
           </a:xfrm>
           <a:prstGeom prst="rect">
             <a:avLst/>
@@ -8488,543 +8488,543 @@
           <a:lstStyle/>
           <a:p>
             <a:r>
-              <a:rPr lang="en-US" sz="1214" dirty="0"/>
+              <a:rPr lang="en-US" sz="1250" dirty="0"/>
               <a:t>/pr/venv/lib/python3.11/site-packages/numpy/core/_multiarray_umath.cpython-311-x86_64-linux-gnu.so</a:t>
             </a:r>
           </a:p>
           <a:p>
             <a:r>
-              <a:rPr lang="en-US" sz="1214" dirty="0"/>
+              <a:rPr lang="en-US" sz="1250" dirty="0"/>
               <a:t>/home/pr/venv/lib/python3.11/site-packages/numpy.libs/libopenblas64_p-r0-0cf96a72.3.23.dev.so</a:t>
             </a:r>
           </a:p>
           <a:p>
             <a:r>
-              <a:rPr lang="en-US" sz="1214" dirty="0"/>
+              <a:rPr lang="en-US" sz="1250" dirty="0"/>
               <a:t>/home/pr/</a:t>
             </a:r>
             <a:r>
-              <a:rPr lang="en-US" sz="1214" dirty="0" err="1"/>
+              <a:rPr lang="en-US" sz="1250" dirty="0" err="1"/>
               <a:t>venv</a:t>
             </a:r>
             <a:r>
-              <a:rPr lang="en-US" sz="1214" dirty="0"/>
+              <a:rPr lang="en-US" sz="1250" dirty="0"/>
               <a:t>/lib/python3.11/site-packages/</a:t>
             </a:r>
             <a:r>
-              <a:rPr lang="en-US" sz="1214" dirty="0" err="1"/>
+              <a:rPr lang="en-US" sz="1250" dirty="0" err="1"/>
               <a:t>numpy.libs</a:t>
             </a:r>
             <a:r>
-              <a:rPr lang="en-US" sz="1214" dirty="0"/>
+              <a:rPr lang="en-US" sz="1250" dirty="0"/>
               <a:t>/libgfortran-040039e1.so.5.0.0</a:t>
             </a:r>
           </a:p>
           <a:p>
             <a:r>
-              <a:rPr lang="en-US" sz="1214" dirty="0"/>
+              <a:rPr lang="en-US" sz="1250" dirty="0"/>
               <a:t>/home/pr/</a:t>
             </a:r>
             <a:r>
-              <a:rPr lang="en-US" sz="1214" dirty="0" err="1"/>
+              <a:rPr lang="en-US" sz="1250" dirty="0" err="1"/>
               <a:t>venv</a:t>
             </a:r>
             <a:r>
-              <a:rPr lang="en-US" sz="1214" dirty="0"/>
+              <a:rPr lang="en-US" sz="1250" dirty="0"/>
               <a:t>/lib/python3.11/site-packages/</a:t>
             </a:r>
             <a:r>
-              <a:rPr lang="en-US" sz="1214" dirty="0" err="1"/>
+              <a:rPr lang="en-US" sz="1250" dirty="0" err="1"/>
               <a:t>numpy.libs</a:t>
             </a:r>
             <a:r>
-              <a:rPr lang="en-US" sz="1214" dirty="0"/>
+              <a:rPr lang="en-US" sz="1250" dirty="0"/>
               <a:t>/libquadmath-96973f99.so.0.0.0</a:t>
             </a:r>
           </a:p>
           <a:p>
             <a:r>
-              <a:rPr lang="en-US" sz="1214" dirty="0"/>
+              <a:rPr lang="en-US" sz="1250" dirty="0"/>
               <a:t>/pr/venv/lib/python3.11/site-packages/numpy/core/_multiarray_tests.cpython-311-x86_64-linux-gnu.so</a:t>
             </a:r>
           </a:p>
           <a:p>
             <a:r>
-              <a:rPr lang="en-US" sz="1214" dirty="0"/>
+              <a:rPr lang="en-US" sz="1250" dirty="0"/>
               <a:t>/pr/venv/lib/python3.11/site-packages/numpy/linalg/_umath_linalg.cpython-311-x86_64-linux-gnu.so</a:t>
             </a:r>
           </a:p>
           <a:p>
             <a:r>
-              <a:rPr lang="en-US" sz="1214" dirty="0"/>
+              <a:rPr lang="en-US" sz="1250" dirty="0"/>
               <a:t>/pr/venv/lib/python3.11/site-packages/numpy/fft/_pocketfft_internal.cpython-311-x86_64-linux-gnu.so</a:t>
             </a:r>
           </a:p>
           <a:p>
             <a:r>
-              <a:rPr lang="en-US" sz="1214" dirty="0"/>
+              <a:rPr lang="en-US" sz="1250" dirty="0"/>
               <a:t>/pr/venv/lib/python3.11/site-packages/numpy/random/mtrand.cpython-311-x86_64-linux-gnu.so</a:t>
             </a:r>
           </a:p>
           <a:p>
             <a:r>
-              <a:rPr lang="en-US" sz="1214" dirty="0"/>
+              <a:rPr lang="en-US" sz="1250" dirty="0"/>
               <a:t>/pr/venv/lib/python3.11/site-packages/numpy/random/bit_generator.cpython-311-x86_64-linux-gnu.so</a:t>
             </a:r>
           </a:p>
           <a:p>
             <a:r>
-              <a:rPr lang="en-US" sz="1214" dirty="0"/>
+              <a:rPr lang="en-US" sz="1250" dirty="0"/>
               <a:t>/pr/venv/lib/python3.11/site-packages/numpy/random/_common.cpython-311-x86_64-linux-gnu.so</a:t>
             </a:r>
           </a:p>
           <a:p>
             <a:r>
-              <a:rPr lang="en-US" sz="1214" dirty="0"/>
+              <a:rPr lang="en-US" sz="1250" dirty="0"/>
               <a:t>/pr/venv/lib/python3.11/site-packages/numpy/random/_bounded_integers.cpython-311-x86_64-linux-gnu.so</a:t>
             </a:r>
           </a:p>
           <a:p>
             <a:r>
-              <a:rPr lang="en-US" sz="1214" dirty="0"/>
+              <a:rPr lang="en-US" sz="1250" dirty="0"/>
               <a:t>/pr/venv/lib/python3.11/site-packages/numpy/random/_mt19937.cpython-311-x86_64-linux-gnu.so</a:t>
             </a:r>
           </a:p>
           <a:p>
             <a:r>
-              <a:rPr lang="en-US" sz="1214" dirty="0"/>
+              <a:rPr lang="en-US" sz="1250" dirty="0"/>
               <a:t>/pr/venv/lib/python3.11/site-packages/numpy/random/_philox.cpython-311-x86_64-linux-gnu.so</a:t>
             </a:r>
           </a:p>
           <a:p>
             <a:r>
-              <a:rPr lang="en-US" sz="1214" dirty="0"/>
+              <a:rPr lang="en-US" sz="1250" dirty="0"/>
               <a:t>/pr/venv/lib/python3.11/site-packages/numpy/random/_pcg64.cpython-311-x86_64-linux-gnu.so</a:t>
             </a:r>
           </a:p>
           <a:p>
             <a:r>
-              <a:rPr lang="en-US" sz="1214" dirty="0"/>
+              <a:rPr lang="en-US" sz="1250" dirty="0"/>
               <a:t>/pr/venv/lib/python3.11/site-packages/numpy/random/_sfc64.cpython-311-x86_64-linux-gnu.so</a:t>
             </a:r>
           </a:p>
           <a:p>
             <a:r>
-              <a:rPr lang="en-US" sz="1214" dirty="0"/>
+              <a:rPr lang="en-US" sz="1250" dirty="0"/>
               <a:t>/pr/venv/lib/python3.11/site-packages/numpy/random/_generator.cpython-311-x86_64-linux-gnu.so</a:t>
             </a:r>
           </a:p>
           <a:p>
             <a:r>
-              <a:rPr lang="en-US" sz="1214" dirty="0"/>
+              <a:rPr lang="en-US" sz="1250" dirty="0"/>
               <a:t>/pr/venv/lib/python3.11/site-packages/pandas/_libs/pandas_parser.cpython-311-x86_64-linux-gnu.so</a:t>
             </a:r>
           </a:p>
           <a:p>
             <a:r>
-              <a:rPr lang="en-US" sz="1214" dirty="0"/>
+              <a:rPr lang="en-US" sz="1250" dirty="0"/>
               <a:t>/pr/venv/lib/python3.11/site-packages/pandas/_libs/pandas_datetime.cpython-311-x86_64-linux-gnu.so</a:t>
             </a:r>
           </a:p>
           <a:p>
             <a:r>
-              <a:rPr lang="en-US" sz="1214" dirty="0"/>
+              <a:rPr lang="en-US" sz="1250" dirty="0"/>
               <a:t>/pr/venv/lib/python3.11/site-packages/pandas/_libs/interval.cpython-311-x86_64-linux-gnu.so</a:t>
             </a:r>
           </a:p>
           <a:p>
             <a:r>
-              <a:rPr lang="en-US" sz="1214" dirty="0"/>
+              <a:rPr lang="en-US" sz="1250" dirty="0"/>
               <a:t>/pr/venv/lib/python3.11/site-packages/pandas/_libs/hashtable.cpython-311-x86_64-linux-gnu.so</a:t>
             </a:r>
           </a:p>
           <a:p>
             <a:r>
-              <a:rPr lang="en-US" sz="1214" dirty="0"/>
+              <a:rPr lang="en-US" sz="1250" dirty="0"/>
               <a:t>/pr/venv/lib/python3.11/site-packages/pandas/_libs/missing.cpython-311-x86_64-linux-gnu.so</a:t>
             </a:r>
           </a:p>
           <a:p>
             <a:r>
-              <a:rPr lang="en-US" sz="1214" dirty="0"/>
+              <a:rPr lang="en-US" sz="1250" dirty="0"/>
               <a:t>/venv/lib/python3.11/site-packages/pandas/_libs/tslibs/dtypes.cpython-311-x86_64-linux-gnu.so</a:t>
             </a:r>
           </a:p>
           <a:p>
             <a:r>
-              <a:rPr lang="en-US" sz="1214" dirty="0"/>
+              <a:rPr lang="en-US" sz="1250" dirty="0"/>
               <a:t>/venv/lib/python3.11/site-packages/pandas/_libs/tslibs/np_datetime.cpython-311-x86_64-linux-gnu.so</a:t>
             </a:r>
           </a:p>
           <a:p>
             <a:r>
-              <a:rPr lang="en-US" sz="1214" dirty="0"/>
+              <a:rPr lang="en-US" sz="1250" dirty="0"/>
               <a:t>/venv/lib/python3.11/site-packages/pandas/_libs/tslibs/conversion.cpython-311-x86_64-linux-gnu.so</a:t>
             </a:r>
           </a:p>
           <a:p>
             <a:r>
-              <a:rPr lang="en-US" sz="1214" dirty="0"/>
+              <a:rPr lang="en-US" sz="1250" dirty="0"/>
               <a:t>/venv/lib/python3.11/site-packages/pandas/_libs/tslibs/base.cpython-311-x86_64-linux-gnu.so</a:t>
             </a:r>
           </a:p>
           <a:p>
             <a:r>
-              <a:rPr lang="en-US" sz="1214" dirty="0"/>
+              <a:rPr lang="en-US" sz="1250" dirty="0"/>
               <a:t>/venv/lib/python3.11/site-packages/pandas/_libs/tslibs/offsets.cpython-311-x86_64-linux-gnu.so</a:t>
             </a:r>
           </a:p>
           <a:p>
             <a:r>
-              <a:rPr lang="en-US" sz="1214" dirty="0"/>
+              <a:rPr lang="en-US" sz="1250" dirty="0"/>
               <a:t>/venv/lib/python3.11/site-packages/pandas/_libs/tslibs/timestamps.cpython-311-x86_64-linux-gnu.so</a:t>
             </a:r>
           </a:p>
           <a:p>
             <a:r>
-              <a:rPr lang="en-US" sz="1214" dirty="0"/>
+              <a:rPr lang="en-US" sz="1250" dirty="0"/>
               <a:t>/venv/lib/python3.11/site-packages/pandas/_libs/tslibs/nattype.cpython-311-x86_64-linux-gnu.so</a:t>
             </a:r>
           </a:p>
           <a:p>
             <a:r>
-              <a:rPr lang="en-US" sz="1214" dirty="0"/>
+              <a:rPr lang="en-US" sz="1250" dirty="0"/>
               <a:t>/venv/lib/python3.11/site-packages/pandas/_libs/tslibs/timedeltas.cpython-311-x86_64-linux-gnu.so</a:t>
             </a:r>
           </a:p>
           <a:p>
             <a:r>
-              <a:rPr lang="en-US" sz="1214" dirty="0"/>
+              <a:rPr lang="en-US" sz="1250" dirty="0"/>
               <a:t>/venv/lib/python3.11/site-packages/pandas/_libs/tslibs/timezones.cpython-311-x86_64-linux-gnu.so</a:t>
             </a:r>
           </a:p>
           <a:p>
             <a:r>
-              <a:rPr lang="en-US" sz="1214" dirty="0"/>
+              <a:rPr lang="en-US" sz="1250" dirty="0"/>
               <a:t>/venv/lib/python3.11/site-packages/pandas/_libs/tslibs/fields.cpython-311-x86_64-linux-gnu.so</a:t>
             </a:r>
           </a:p>
           <a:p>
             <a:r>
-              <a:rPr lang="en-US" sz="1214" dirty="0"/>
+              <a:rPr lang="en-US" sz="1250" dirty="0"/>
               <a:t>/venv/lib/python3.11/site-packages/pandas/_libs/tslibs/ccalendar.cpython-311-x86_64-linux-gnu.so</a:t>
             </a:r>
           </a:p>
           <a:p>
             <a:r>
-              <a:rPr lang="en-US" sz="1214" dirty="0"/>
+              <a:rPr lang="en-US" sz="1250" dirty="0"/>
               <a:t>/venv/lib/python3.11/site-packages/pandas/_libs/tslibs/tzconversion.cpython-311-x86_64-linux-gnu.so</a:t>
             </a:r>
           </a:p>
           <a:p>
             <a:r>
-              <a:rPr lang="en-US" sz="1214" dirty="0"/>
+              <a:rPr lang="en-US" sz="1250" dirty="0"/>
               <a:t>/pr/venv/lib/python3.11/site-packages/pandas/_libs/properties.cpython-311-x86_64-linux-gnu.so</a:t>
             </a:r>
           </a:p>
           <a:p>
             <a:r>
-              <a:rPr lang="en-US" sz="1214" dirty="0"/>
+              <a:rPr lang="en-US" sz="1250" dirty="0"/>
               <a:t>/venv/lib/python3.11/site-packages/pandas/_libs/tslibs/parsing.cpython-311-x86_64-linux-gnu.so</a:t>
             </a:r>
           </a:p>
           <a:p>
             <a:r>
-              <a:rPr lang="en-US" sz="1214" dirty="0"/>
+              <a:rPr lang="en-US" sz="1250" dirty="0"/>
               <a:t>/venv/lib/python3.11/site-packages/pandas/_libs/tslibs/strptime.cpython-311-x86_64-linux-gnu.so</a:t>
             </a:r>
           </a:p>
           <a:p>
             <a:r>
-              <a:rPr lang="en-US" sz="1214" dirty="0"/>
+              <a:rPr lang="en-US" sz="1250" dirty="0"/>
               <a:t>/venv/lib/python3.11/site-packages/pandas/_libs/tslibs/period.cpython-311-x86_64-linux-gnu.so</a:t>
             </a:r>
           </a:p>
           <a:p>
             <a:r>
-              <a:rPr lang="en-US" sz="1214" dirty="0"/>
+              <a:rPr lang="en-US" sz="1250" dirty="0"/>
               <a:t>/venv/lib/python3.11/site-packages/pandas/_libs/tslibs/vectorized.cpython-311-x86_64-linux-gnu.so</a:t>
             </a:r>
           </a:p>
           <a:p>
             <a:r>
-              <a:rPr lang="en-US" sz="1214" dirty="0"/>
+              <a:rPr lang="en-US" sz="1250" dirty="0"/>
               <a:t>/pr/venv/lib/python3.11/site-packages/pandas/_libs/ops_dispatch.cpython-311-x86_64-linux-gnu.so</a:t>
             </a:r>
           </a:p>
           <a:p>
             <a:r>
-              <a:rPr lang="en-US" sz="1214" dirty="0"/>
+              <a:rPr lang="en-US" sz="1250" dirty="0"/>
               <a:t>/pr/venv/lib/python3.11/site-packages/pandas/_libs/algos.cpython-311-x86_64-linux-gnu.so</a:t>
             </a:r>
           </a:p>
           <a:p>
             <a:r>
-              <a:rPr lang="en-US" sz="1214" dirty="0"/>
+              <a:rPr lang="en-US" sz="1250" dirty="0"/>
               <a:t>/pr/venv/lib/python3.11/site-packages/pandas/_libs/lib.cpython-311-x86_64-linux-gnu.so</a:t>
             </a:r>
           </a:p>
           <a:p>
             <a:r>
-              <a:rPr lang="en-US" sz="1214" dirty="0"/>
+              <a:rPr lang="en-US" sz="1250" dirty="0"/>
               <a:t>/pr/venv/lib/python3.11/site-packages/pandas/_libs/ops.cpython-311-x86_64-linux-gnu.so</a:t>
             </a:r>
           </a:p>
           <a:p>
             <a:r>
-              <a:rPr lang="en-US" sz="1214" dirty="0"/>
+              <a:rPr lang="en-US" sz="1250" dirty="0"/>
               <a:t>/pr/venv/lib/python3.11/site-packages/pandas/_libs/arrays.cpython-311-x86_64-linux-gnu.so</a:t>
             </a:r>
           </a:p>
           <a:p>
             <a:r>
-              <a:rPr lang="en-US" sz="1214" dirty="0"/>
+              <a:rPr lang="en-US" sz="1250" dirty="0"/>
               <a:t>/pr/venv/lib/python3.11/site-packages/pandas/_libs/tslib.cpython-311-x86_64-linux-gnu.so</a:t>
             </a:r>
           </a:p>
           <a:p>
             <a:r>
-              <a:rPr lang="en-US" sz="1214" dirty="0"/>
+              <a:rPr lang="en-US" sz="1250" dirty="0"/>
               <a:t>/pr/venv/lib/python3.11/site-packages/pandas/_libs/sparse.cpython-311-x86_64-linux-gnu.so</a:t>
             </a:r>
           </a:p>
           <a:p>
             <a:r>
-              <a:rPr lang="en-US" sz="1214" dirty="0"/>
+              <a:rPr lang="en-US" sz="1250" dirty="0"/>
               <a:t>/pr/venv/lib/python3.11/site-packages/pandas/_libs/indexing.cpython-311-x86_64-linux-gnu.so</a:t>
             </a:r>
           </a:p>
           <a:p>
             <a:r>
-              <a:rPr lang="en-US" sz="1214" dirty="0"/>
+              <a:rPr lang="en-US" sz="1250" dirty="0"/>
               <a:t>/pr/venv/lib/python3.11/site-packages/pandas/_libs/index.cpython-311-x86_64-linux-gnu.so</a:t>
             </a:r>
           </a:p>
           <a:p>
             <a:r>
-              <a:rPr lang="en-US" sz="1214" dirty="0"/>
+              <a:rPr lang="en-US" sz="1250" dirty="0"/>
               <a:t>/pr/venv/lib/python3.11/site-packages/pandas/_libs/internals.cpython-311-x86_64-linux-gnu.so</a:t>
             </a:r>
           </a:p>
           <a:p>
             <a:r>
-              <a:rPr lang="en-US" sz="1214" dirty="0"/>
+              <a:rPr lang="en-US" sz="1250" dirty="0"/>
               <a:t>/pr/venv/lib/python3.11/site-packages/pandas/_libs/join.cpython-311-x86_64-linux-gnu.so</a:t>
             </a:r>
           </a:p>
           <a:p>
             <a:r>
-              <a:rPr lang="en-US" sz="1214" dirty="0"/>
+              <a:rPr lang="en-US" sz="1250" dirty="0"/>
               <a:t>/pr/venv/lib/python3.11/site-packages/pandas/_libs/writers.cpython-311-x86_64-linux-gnu.so</a:t>
             </a:r>
           </a:p>
           <a:p>
             <a:r>
-              <a:rPr lang="en-US" sz="1214" dirty="0"/>
+              <a:rPr lang="en-US" sz="1250" dirty="0"/>
               <a:t>/venv/lib/python3.11/site-packages/pandas/_libs/window/aggregations.cpython-311-x86_64-linux-gnu.so</a:t>
             </a:r>
           </a:p>
           <a:p>
             <a:r>
-              <a:rPr lang="en-US" sz="1214" dirty="0"/>
+              <a:rPr lang="en-US" sz="1250" dirty="0"/>
               <a:t>/venv/lib/python3.11/site-packages/pandas/_libs/window/indexers.cpython-311-x86_64-linux-gnu.so</a:t>
             </a:r>
           </a:p>
           <a:p>
             <a:r>
-              <a:rPr lang="en-US" sz="1214" dirty="0"/>
+              <a:rPr lang="en-US" sz="1250" dirty="0"/>
               <a:t>/pr/venv/lib/python3.11/site-packages/pandas/_libs/reshape.cpython-311-x86_64-linux-gnu.so</a:t>
             </a:r>
           </a:p>
           <a:p>
             <a:r>
-              <a:rPr lang="en-US" sz="1214" dirty="0"/>
+              <a:rPr lang="en-US" sz="1250" dirty="0"/>
               <a:t>/pr/venv/lib/python3.11/site-packages/pandas/_libs/groupby.cpython-311-x86_64-linux-gnu.so</a:t>
             </a:r>
           </a:p>
           <a:p>
             <a:r>
-              <a:rPr lang="en-US" sz="1214" dirty="0"/>
+              <a:rPr lang="en-US" sz="1250" dirty="0"/>
               <a:t>/pr/venv/lib/python3.11/site-packages/pandas/_libs/json.cpython-311-x86_64-linux-gnu.so</a:t>
             </a:r>
           </a:p>
           <a:p>
             <a:r>
-              <a:rPr lang="en-US" sz="1214" dirty="0"/>
+              <a:rPr lang="en-US" sz="1250" dirty="0"/>
               <a:t>/pr/venv/lib/python3.11/site-packages/pandas/_libs/parsers.cpython-311-x86_64-linux-gnu.so</a:t>
             </a:r>
           </a:p>
           <a:p>
             <a:r>
-              <a:rPr lang="en-US" sz="1214" dirty="0"/>
+              <a:rPr lang="en-US" sz="1250" dirty="0"/>
               <a:t>/pr/venv/lib/python3.11/site-packages/pandas/_libs/testing.cpython-311-x86_64-linux-gnu.so</a:t>
             </a:r>
           </a:p>
           <a:p>
             <a:r>
-              <a:rPr lang="en-US" sz="1214" dirty="0"/>
+              <a:rPr lang="en-US" sz="1250" dirty="0"/>
               <a:t>/home/pr/venv/lib/python3.11/site-packages/matplotlib/_c_internal_utils.cpython-311-x86_64-linux-gnu.so</a:t>
             </a:r>
           </a:p>
           <a:p>
             <a:r>
-              <a:rPr lang="en-US" sz="1214" dirty="0"/>
+              <a:rPr lang="en-US" sz="1250" dirty="0"/>
               <a:t>/home/pr/venv/lib/python3.11/site-packages/PIL/_imaging.cpython-311-x86_64-linux-gnu.so</a:t>
             </a:r>
           </a:p>
           <a:p>
             <a:r>
-              <a:rPr lang="en-US" sz="1214" dirty="0"/>
+              <a:rPr lang="en-US" sz="1250" dirty="0"/>
               <a:t>/home/pr/</a:t>
             </a:r>
             <a:r>
-              <a:rPr lang="en-US" sz="1214" dirty="0" err="1"/>
+              <a:rPr lang="en-US" sz="1250" dirty="0" err="1"/>
               <a:t>venv</a:t>
             </a:r>
             <a:r>
-              <a:rPr lang="en-US" sz="1214" dirty="0"/>
+              <a:rPr lang="en-US" sz="1250" dirty="0"/>
               <a:t>/lib/python3.11/site-packages/</a:t>
             </a:r>
             <a:r>
-              <a:rPr lang="en-US" sz="1214" dirty="0" err="1"/>
+              <a:rPr lang="en-US" sz="1250" dirty="0" err="1"/>
               <a:t>Pillow.libs</a:t>
             </a:r>
             <a:r>
-              <a:rPr lang="en-US" sz="1214" dirty="0"/>
+              <a:rPr lang="en-US" sz="1250" dirty="0"/>
               <a:t>/libtiff-91af027d.so.6.0.2</a:t>
             </a:r>
           </a:p>
           <a:p>
             <a:r>
-              <a:rPr lang="en-US" sz="1214" dirty="0"/>
+              <a:rPr lang="en-US" sz="1250" dirty="0"/>
               <a:t>/home/pr/</a:t>
             </a:r>
             <a:r>
-              <a:rPr lang="en-US" sz="1214" dirty="0" err="1"/>
+              <a:rPr lang="en-US" sz="1250" dirty="0" err="1"/>
               <a:t>venv</a:t>
             </a:r>
             <a:r>
-              <a:rPr lang="en-US" sz="1214" dirty="0"/>
+              <a:rPr lang="en-US" sz="1250" dirty="0"/>
               <a:t>/lib/python3.11/site-packages/</a:t>
             </a:r>
             <a:r>
-              <a:rPr lang="en-US" sz="1214" dirty="0" err="1"/>
+              <a:rPr lang="en-US" sz="1250" dirty="0" err="1"/>
               <a:t>Pillow.libs</a:t>
             </a:r>
             <a:r>
-              <a:rPr lang="en-US" sz="1214" dirty="0"/>
+              <a:rPr lang="en-US" sz="1250" dirty="0"/>
               <a:t>/libjpeg-32b76cef.so.62.4.0</a:t>
             </a:r>
           </a:p>
           <a:p>
             <a:r>
-              <a:rPr lang="en-US" sz="1214" dirty="0"/>
+              <a:rPr lang="en-US" sz="1250" dirty="0"/>
               <a:t>/home/pr/</a:t>
             </a:r>
             <a:r>
-              <a:rPr lang="en-US" sz="1214" dirty="0" err="1"/>
+              <a:rPr lang="en-US" sz="1250" dirty="0" err="1"/>
               <a:t>venv</a:t>
             </a:r>
             <a:r>
-              <a:rPr lang="en-US" sz="1214" dirty="0"/>
+              <a:rPr lang="en-US" sz="1250" dirty="0"/>
               <a:t>/lib/python3.11/site-packages/</a:t>
             </a:r>
             <a:r>
-              <a:rPr lang="en-US" sz="1214" dirty="0" err="1"/>
+              <a:rPr lang="en-US" sz="1250" dirty="0" err="1"/>
               <a:t>Pillow.libs</a:t>
             </a:r>
             <a:r>
-              <a:rPr lang="en-US" sz="1214" dirty="0"/>
+              <a:rPr lang="en-US" sz="1250" dirty="0"/>
               <a:t>/libopenjp2-20e347f0.so.2.5.0</a:t>
             </a:r>
           </a:p>
           <a:p>
             <a:r>
-              <a:rPr lang="en-US" sz="1214" dirty="0"/>
+              <a:rPr lang="en-US" sz="1250" dirty="0"/>
               <a:t>/home/pr/</a:t>
             </a:r>
             <a:r>
-              <a:rPr lang="en-US" sz="1214" dirty="0" err="1"/>
+              <a:rPr lang="en-US" sz="1250" dirty="0" err="1"/>
               <a:t>venv</a:t>
             </a:r>
             <a:r>
-              <a:rPr lang="en-US" sz="1214" dirty="0"/>
+              <a:rPr lang="en-US" sz="1250" dirty="0"/>
               <a:t>/lib/python3.11/site-packages/</a:t>
             </a:r>
             <a:r>
-              <a:rPr lang="en-US" sz="1214" dirty="0" err="1"/>
+              <a:rPr lang="en-US" sz="1250" dirty="0" err="1"/>
               <a:t>Pillow.libs</a:t>
             </a:r>
             <a:r>
-              <a:rPr lang="en-US" sz="1214" dirty="0"/>
+              <a:rPr lang="en-US" sz="1250" dirty="0"/>
               <a:t>/libxcb-f0538cc0.so.1.1.0</a:t>
             </a:r>
           </a:p>
           <a:p>
             <a:r>
-              <a:rPr lang="en-US" sz="1214" dirty="0"/>
+              <a:rPr lang="en-US" sz="1250" dirty="0"/>
               <a:t>/home/pr/</a:t>
             </a:r>
             <a:r>
-              <a:rPr lang="en-US" sz="1214" dirty="0" err="1"/>
+              <a:rPr lang="en-US" sz="1250" dirty="0" err="1"/>
               <a:t>venv</a:t>
             </a:r>
             <a:r>
-              <a:rPr lang="en-US" sz="1214" dirty="0"/>
+              <a:rPr lang="en-US" sz="1250" dirty="0"/>
               <a:t>/lib/python3.11/site-packages/</a:t>
             </a:r>
             <a:r>
-              <a:rPr lang="en-US" sz="1214" dirty="0" err="1"/>
+              <a:rPr lang="en-US" sz="1250" dirty="0" err="1"/>
               <a:t>Pillow.libs</a:t>
             </a:r>
             <a:r>
-              <a:rPr lang="en-US" sz="1214" dirty="0"/>
+              <a:rPr lang="en-US" sz="1250" dirty="0"/>
               <a:t>/liblzma-1e44b93d.so.5.4.4</a:t>
             </a:r>
           </a:p>
           <a:p>
             <a:r>
-              <a:rPr lang="en-US" sz="1214" dirty="0"/>
+              <a:rPr lang="en-US" sz="1250" dirty="0"/>
               <a:t>/home/pr/</a:t>
             </a:r>
             <a:r>
-              <a:rPr lang="en-US" sz="1214" dirty="0" err="1"/>
+              <a:rPr lang="en-US" sz="1250" dirty="0" err="1"/>
               <a:t>venv</a:t>
             </a:r>
             <a:r>
-              <a:rPr lang="en-US" sz="1214" dirty="0"/>
+              <a:rPr lang="en-US" sz="1250" dirty="0"/>
               <a:t>/lib/python3.11/site-packages/</a:t>
             </a:r>
             <a:r>
-              <a:rPr lang="en-US" sz="1214" dirty="0" err="1"/>
+              <a:rPr lang="en-US" sz="1250" dirty="0" err="1"/>
               <a:t>Pillow.libs</a:t>
             </a:r>
             <a:r>
-              <a:rPr lang="en-US" sz="1214" dirty="0"/>
+              <a:rPr lang="en-US" sz="1250" dirty="0"/>
               <a:t>/libXau-154567c4.so.6.0.0</a:t>
             </a:r>
           </a:p>
           <a:p>
             <a:r>
-              <a:rPr lang="en-US" sz="1214" dirty="0"/>
+              <a:rPr lang="en-US" sz="1250" dirty="0"/>
               <a:t>/home/pr/venv/lib/python3.11/site-packages/matplotlib/_path.cpython-311-x86_64-linux-gnu.so</a:t>
             </a:r>
           </a:p>
           <a:p>
             <a:r>
-              <a:rPr lang="en-US" sz="1214" dirty="0"/>
+              <a:rPr lang="en-US" sz="1250" dirty="0"/>
               <a:t>/home/pr/venv/lib/python3.11/site-packages/matplotlib/ft2font.cpython-311-x86_64-linux-gnu.so</a:t>
             </a:r>
           </a:p>
           <a:p>
             <a:r>
-              <a:rPr lang="en-US" sz="1214" dirty="0"/>
+              <a:rPr lang="en-US" sz="1250" dirty="0"/>
               <a:t>/home/pr/venv/lib/python3.11/site-packages/kiwisolver/_cext.cpython-311-x86_64-linux-gnu.so</a:t>
             </a:r>
           </a:p>
           <a:p>
             <a:r>
-              <a:rPr lang="en-US" sz="1214" dirty="0"/>
+              <a:rPr lang="en-US" sz="1250" dirty="0"/>
               <a:t>/home/pr/venv/lib/python3.11/site-packages/matplotlib/_image.cpython-311-x86_64-linux-gnu.so</a:t>
             </a:r>
           </a:p>
@@ -9075,15 +9075,15 @@
           <a:p>
             <a:pPr algn="ctr"/>
             <a:r>
-              <a:rPr lang="en-US" sz="1214" dirty="0"/>
+              <a:rPr lang="en-US" sz="1400" dirty="0"/>
               <a:t>process </a:t>
             </a:r>
             <a:r>
-              <a:rPr lang="en-US" sz="1214" dirty="0" err="1"/>
+              <a:rPr lang="en-US" sz="1400" dirty="0" err="1"/>
               <a:t>pid</a:t>
             </a:r>
             <a:r>
-              <a:rPr lang="en-US" sz="1214" dirty="0"/>
+              <a:rPr lang="en-US" sz="1400" dirty="0"/>
               <a:t>: 227899</a:t>
             </a:r>
           </a:p>
@@ -9104,7 +9104,7 @@
         <p:spPr>
           <a:xfrm>
             <a:off x="2266107" y="816252"/>
-            <a:ext cx="1289913" cy="279179"/>
+            <a:ext cx="1289913" cy="338554"/>
           </a:xfrm>
           <a:prstGeom prst="rect">
             <a:avLst/>
@@ -9119,7 +9119,7 @@
           <a:p>
             <a:pPr algn="ctr"/>
             <a:r>
-              <a:rPr lang="en-US" sz="1214" dirty="0"/>
+              <a:rPr lang="en-US" sz="1600" dirty="0"/>
               <a:t>load</a:t>
             </a:r>
           </a:p>
@@ -9144,7 +9144,7 @@
         <p:spPr>
           <a:xfrm>
             <a:off x="2423640" y="1097464"/>
-            <a:ext cx="2966636" cy="10135"/>
+            <a:ext cx="2516939" cy="12713"/>
           </a:xfrm>
           <a:prstGeom prst="straightConnector1">
             <a:avLst/>
@@ -9212,7 +9212,7 @@
           <a:lstStyle/>
           <a:p>
             <a:pPr algn="ctr"/>
-            <a:endParaRPr lang="en-US" sz="1214" dirty="0"/>
+            <a:endParaRPr lang="en-US" sz="1400" dirty="0"/>
           </a:p>
         </p:txBody>
       </p:sp>
@@ -9260,7 +9260,7 @@
           <a:lstStyle/>
           <a:p>
             <a:pPr algn="ctr"/>
-            <a:endParaRPr lang="en-US" sz="1214" dirty="0"/>
+            <a:endParaRPr lang="en-US" sz="1400" dirty="0"/>
           </a:p>
         </p:txBody>
       </p:sp>
@@ -9308,7 +9308,7 @@
           <a:lstStyle/>
           <a:p>
             <a:pPr algn="ctr"/>
-            <a:endParaRPr lang="en-US" sz="1214" dirty="0"/>
+            <a:endParaRPr lang="en-US" sz="1400" dirty="0"/>
           </a:p>
         </p:txBody>
       </p:sp>
@@ -9356,7 +9356,7 @@
           <a:lstStyle/>
           <a:p>
             <a:pPr algn="ctr"/>
-            <a:endParaRPr lang="en-US" sz="1214" dirty="0"/>
+            <a:endParaRPr lang="en-US" sz="1400" dirty="0"/>
           </a:p>
         </p:txBody>
       </p:sp>
@@ -9404,7 +9404,7 @@
           <a:lstStyle/>
           <a:p>
             <a:pPr algn="ctr"/>
-            <a:endParaRPr lang="en-US" sz="1214" dirty="0"/>
+            <a:endParaRPr lang="en-US" sz="1400" dirty="0"/>
           </a:p>
         </p:txBody>
       </p:sp>
@@ -9452,7 +9452,7 @@
           <a:lstStyle/>
           <a:p>
             <a:pPr algn="ctr"/>
-            <a:endParaRPr lang="en-US" sz="1214" dirty="0"/>
+            <a:endParaRPr lang="en-US" sz="1400" dirty="0"/>
           </a:p>
         </p:txBody>
       </p:sp>
@@ -9500,7 +9500,7 @@
           <a:lstStyle/>
           <a:p>
             <a:pPr algn="ctr"/>
-            <a:endParaRPr lang="en-US" sz="1214" dirty="0"/>
+            <a:endParaRPr lang="en-US" sz="1400" dirty="0"/>
           </a:p>
         </p:txBody>
       </p:sp>
@@ -9548,7 +9548,7 @@
           <a:lstStyle/>
           <a:p>
             <a:pPr algn="ctr"/>
-            <a:endParaRPr lang="en-US" sz="1214" dirty="0"/>
+            <a:endParaRPr lang="en-US" sz="1400" dirty="0"/>
           </a:p>
         </p:txBody>
       </p:sp>
@@ -9566,8 +9566,8 @@
         </p:nvSpPr>
         <p:spPr>
           <a:xfrm>
-            <a:off x="1532450" y="382682"/>
-            <a:ext cx="2747082" cy="339804"/>
+            <a:off x="1532450" y="256726"/>
+            <a:ext cx="3521858" cy="465760"/>
           </a:xfrm>
           <a:prstGeom prst="rect">
             <a:avLst/>
@@ -9598,15 +9598,15 @@
           <a:p>
             <a:pPr algn="ctr"/>
             <a:r>
-              <a:rPr lang="en-US" sz="1214" dirty="0"/>
+              <a:rPr lang="en-US" sz="1600" dirty="0"/>
               <a:t>/home/pr/</a:t>
             </a:r>
             <a:r>
-              <a:rPr lang="en-US" sz="1214" dirty="0" err="1"/>
+              <a:rPr lang="en-US" sz="1600" dirty="0" err="1"/>
               <a:t>venv</a:t>
             </a:r>
             <a:r>
-              <a:rPr lang="en-US" sz="1214" dirty="0"/>
+              <a:rPr lang="en-US" sz="1600" dirty="0"/>
               <a:t>/bin/python3 analysis.py</a:t>
             </a:r>
           </a:p>
@@ -9626,8 +9626,8 @@
         </p:nvSpPr>
         <p:spPr>
           <a:xfrm>
-            <a:off x="5390276" y="979638"/>
-            <a:ext cx="1852029" cy="255921"/>
+            <a:off x="4940579" y="965218"/>
+            <a:ext cx="2483177" cy="289918"/>
           </a:xfrm>
           <a:prstGeom prst="rect">
             <a:avLst/>
@@ -9653,15 +9653,15 @@
           <a:p>
             <a:pPr algn="ctr"/>
             <a:r>
-              <a:rPr lang="en-US" sz="1214" dirty="0"/>
+              <a:rPr lang="en-US" sz="1600" dirty="0"/>
               <a:t>/root/</a:t>
             </a:r>
             <a:r>
-              <a:rPr lang="en-US" sz="1214" dirty="0" err="1"/>
+              <a:rPr lang="en-US" sz="1600" dirty="0" err="1"/>
               <a:t>usr</a:t>
             </a:r>
             <a:r>
-              <a:rPr lang="en-US" sz="1214" dirty="0"/>
+              <a:rPr lang="en-US" sz="1600" dirty="0"/>
               <a:t>/bin/python3.11</a:t>
             </a:r>
           </a:p>
@@ -9681,8 +9681,8 @@
         </p:nvSpPr>
         <p:spPr>
           <a:xfrm>
-            <a:off x="5401156" y="1422808"/>
-            <a:ext cx="1841150" cy="231179"/>
+            <a:off x="4901223" y="1378074"/>
+            <a:ext cx="2483177" cy="305923"/>
           </a:xfrm>
           <a:prstGeom prst="rect">
             <a:avLst/>
@@ -9708,15 +9708,15 @@
           <a:p>
             <a:pPr algn="ctr"/>
             <a:r>
-              <a:rPr lang="en-US" sz="1214" dirty="0"/>
+              <a:rPr lang="en-US" sz="1600" dirty="0"/>
               <a:t>/root/</a:t>
             </a:r>
             <a:r>
-              <a:rPr lang="en-US" sz="1214" dirty="0" err="1"/>
+              <a:rPr lang="en-US" sz="1600" dirty="0" err="1"/>
               <a:t>usr</a:t>
             </a:r>
             <a:r>
-              <a:rPr lang="en-US" sz="1214" dirty="0"/>
+              <a:rPr lang="en-US" sz="1600" dirty="0"/>
               <a:t>/bin/python3.11</a:t>
             </a:r>
           </a:p>
@@ -9741,7 +9741,7 @@
         <p:spPr>
           <a:xfrm>
             <a:off x="2408715" y="1530586"/>
-            <a:ext cx="2992441" cy="7812"/>
+            <a:ext cx="2492508" cy="450"/>
           </a:xfrm>
           <a:prstGeom prst="straightConnector1">
             <a:avLst/>
@@ -9809,7 +9809,7 @@
           <a:lstStyle/>
           <a:p>
             <a:pPr algn="ctr"/>
-            <a:endParaRPr lang="en-US" sz="1214" dirty="0"/>
+            <a:endParaRPr lang="en-US" sz="1400" dirty="0"/>
           </a:p>
         </p:txBody>
       </p:sp>
@@ -9857,7 +9857,7 @@
           <a:lstStyle/>
           <a:p>
             <a:pPr algn="ctr"/>
-            <a:endParaRPr lang="en-US" sz="1214" dirty="0"/>
+            <a:endParaRPr lang="en-US" sz="1400" dirty="0"/>
           </a:p>
         </p:txBody>
       </p:sp>
@@ -9875,7 +9875,7 @@
         </p:nvSpPr>
         <p:spPr>
           <a:xfrm>
-            <a:off x="5401162" y="3298318"/>
+            <a:off x="4917228" y="3298318"/>
             <a:ext cx="2042733" cy="61636"/>
           </a:xfrm>
           <a:prstGeom prst="rect">
@@ -9905,7 +9905,7 @@
           <a:lstStyle/>
           <a:p>
             <a:pPr algn="ctr"/>
-            <a:endParaRPr lang="en-US" sz="1214" dirty="0"/>
+            <a:endParaRPr lang="en-US" sz="1400" dirty="0"/>
           </a:p>
         </p:txBody>
       </p:sp>
@@ -9924,7 +9924,7 @@
         <p:spPr>
           <a:xfrm>
             <a:off x="2261587" y="1243014"/>
-            <a:ext cx="1289913" cy="279179"/>
+            <a:ext cx="1289913" cy="338554"/>
           </a:xfrm>
           <a:prstGeom prst="rect">
             <a:avLst/>
@@ -9939,7 +9939,7 @@
           <a:p>
             <a:pPr algn="ctr"/>
             <a:r>
-              <a:rPr lang="en-US" sz="1214" dirty="0"/>
+              <a:rPr lang="en-US" sz="1600" dirty="0"/>
               <a:t>execute</a:t>
             </a:r>
           </a:p>
@@ -9959,8 +9959,8 @@
         </p:nvSpPr>
         <p:spPr>
           <a:xfrm>
-            <a:off x="5415981" y="1815123"/>
-            <a:ext cx="1920663" cy="241699"/>
+            <a:off x="4916574" y="1823767"/>
+            <a:ext cx="2483176" cy="327395"/>
           </a:xfrm>
           <a:prstGeom prst="rect">
             <a:avLst/>
@@ -9985,57 +9985,12 @@
           <a:lstStyle/>
           <a:p>
             <a:r>
-              <a:rPr lang="en-US" sz="1214" dirty="0"/>
+              <a:rPr lang="en-US" sz="1600" dirty="0"/>
               <a:t>/home/pr/exp0/analysis.py</a:t>
             </a:r>
           </a:p>
         </p:txBody>
       </p:sp>
-      <p:cxnSp>
-        <p:nvCxnSpPr>
-          <p:cNvPr id="8" name="Straight Arrow Connector 3">
-            <a:extLst>
-              <a:ext uri="{FF2B5EF4-FFF2-40B4-BE49-F238E27FC236}">
-                <a16:creationId xmlns:a16="http://schemas.microsoft.com/office/drawing/2014/main" id="{E951C48F-4908-E58B-881A-C58C22950263}"/>
-              </a:ext>
-            </a:extLst>
-          </p:cNvPr>
-          <p:cNvCxnSpPr>
-            <a:cxnSpLocks/>
-            <a:stCxn id="95" idx="3"/>
-            <a:endCxn id="7" idx="1"/>
-          </p:cNvCxnSpPr>
-          <p:nvPr/>
-        </p:nvCxnSpPr>
-        <p:spPr>
-          <a:xfrm>
-            <a:off x="2408715" y="1934697"/>
-            <a:ext cx="3007266" cy="1276"/>
-          </a:xfrm>
-          <a:prstGeom prst="bentConnector3">
-            <a:avLst>
-              <a:gd name="adj1" fmla="val 50000"/>
-            </a:avLst>
-          </a:prstGeom>
-          <a:ln w="19050">
-            <a:tailEnd type="triangle"/>
-          </a:ln>
-        </p:spPr>
-        <p:style>
-          <a:lnRef idx="1">
-            <a:schemeClr val="accent1"/>
-          </a:lnRef>
-          <a:fillRef idx="0">
-            <a:schemeClr val="accent1"/>
-          </a:fillRef>
-          <a:effectRef idx="0">
-            <a:schemeClr val="accent1"/>
-          </a:effectRef>
-          <a:fontRef idx="minor">
-            <a:schemeClr val="tx1"/>
-          </a:fontRef>
-        </p:style>
-      </p:cxnSp>
       <p:sp>
         <p:nvSpPr>
           <p:cNvPr id="10" name="TextBox 9">
@@ -10051,7 +10006,7 @@
         <p:spPr>
           <a:xfrm>
             <a:off x="2276413" y="1645849"/>
-            <a:ext cx="1289913" cy="279179"/>
+            <a:ext cx="1289913" cy="338554"/>
           </a:xfrm>
           <a:prstGeom prst="rect">
             <a:avLst/>
@@ -10066,7 +10021,7 @@
           <a:p>
             <a:pPr algn="ctr"/>
             <a:r>
-              <a:rPr lang="en-US" sz="1214" dirty="0"/>
+              <a:rPr lang="en-US" sz="1600" dirty="0"/>
               <a:t>read</a:t>
             </a:r>
           </a:p>
@@ -10130,7 +10085,7 @@
         <p:spPr>
           <a:xfrm>
             <a:off x="2276413" y="2097952"/>
-            <a:ext cx="1289913" cy="279179"/>
+            <a:ext cx="1289913" cy="338554"/>
           </a:xfrm>
           <a:prstGeom prst="rect">
             <a:avLst/>
@@ -10145,7 +10100,7 @@
           <a:p>
             <a:pPr algn="ctr"/>
             <a:r>
-              <a:rPr lang="en-US" sz="1214" dirty="0"/>
+              <a:rPr lang="en-US" sz="1600" dirty="0"/>
               <a:t>load</a:t>
             </a:r>
           </a:p>
@@ -10195,7 +10150,7 @@
           <a:lstStyle/>
           <a:p>
             <a:pPr algn="ctr"/>
-            <a:endParaRPr lang="en-US" sz="1214" dirty="0"/>
+            <a:endParaRPr lang="en-US" sz="1400" dirty="0"/>
           </a:p>
         </p:txBody>
       </p:sp>
@@ -10243,7 +10198,7 @@
           <a:lstStyle/>
           <a:p>
             <a:pPr algn="ctr"/>
-            <a:endParaRPr lang="en-US" sz="1214" dirty="0"/>
+            <a:endParaRPr lang="en-US" sz="1400" dirty="0"/>
           </a:p>
         </p:txBody>
       </p:sp>
@@ -10261,8 +10216,8 @@
         </p:nvSpPr>
         <p:spPr>
           <a:xfrm>
-            <a:off x="5415982" y="2731603"/>
-            <a:ext cx="1770248" cy="233196"/>
+            <a:off x="4916574" y="2712672"/>
+            <a:ext cx="2316329" cy="294466"/>
           </a:xfrm>
           <a:prstGeom prst="rect">
             <a:avLst/>
@@ -10287,57 +10242,12 @@
           <a:lstStyle/>
           <a:p>
             <a:r>
-              <a:rPr lang="en-US" sz="1214" dirty="0"/>
+              <a:rPr lang="en-US" sz="1600" dirty="0"/>
               <a:t>/home/pr/exp0/data.csv</a:t>
             </a:r>
           </a:p>
         </p:txBody>
       </p:sp>
-      <p:cxnSp>
-        <p:nvCxnSpPr>
-          <p:cNvPr id="35" name="Straight Arrow Connector 3">
-            <a:extLst>
-              <a:ext uri="{FF2B5EF4-FFF2-40B4-BE49-F238E27FC236}">
-                <a16:creationId xmlns:a16="http://schemas.microsoft.com/office/drawing/2014/main" id="{C9591AAC-0FAE-7ECC-ED47-C6F1A7989FF2}"/>
-              </a:ext>
-            </a:extLst>
-          </p:cNvPr>
-          <p:cNvCxnSpPr>
-            <a:cxnSpLocks/>
-            <a:stCxn id="97" idx="3"/>
-            <a:endCxn id="29" idx="1"/>
-          </p:cNvCxnSpPr>
-          <p:nvPr/>
-        </p:nvCxnSpPr>
-        <p:spPr>
-          <a:xfrm flipV="1">
-            <a:off x="2408715" y="2848201"/>
-            <a:ext cx="3007267" cy="1589"/>
-          </a:xfrm>
-          <a:prstGeom prst="bentConnector3">
-            <a:avLst>
-              <a:gd name="adj1" fmla="val 50000"/>
-            </a:avLst>
-          </a:prstGeom>
-          <a:ln w="19050">
-            <a:tailEnd type="triangle"/>
-          </a:ln>
-        </p:spPr>
-        <p:style>
-          <a:lnRef idx="1">
-            <a:schemeClr val="accent1"/>
-          </a:lnRef>
-          <a:fillRef idx="0">
-            <a:schemeClr val="accent1"/>
-          </a:fillRef>
-          <a:effectRef idx="0">
-            <a:schemeClr val="accent1"/>
-          </a:effectRef>
-          <a:fontRef idx="minor">
-            <a:schemeClr val="tx1"/>
-          </a:fontRef>
-        </p:style>
-      </p:cxnSp>
       <p:sp>
         <p:nvSpPr>
           <p:cNvPr id="38" name="TextBox 37">
@@ -10353,7 +10263,7 @@
         <p:spPr>
           <a:xfrm>
             <a:off x="2276413" y="2553826"/>
-            <a:ext cx="1289913" cy="279179"/>
+            <a:ext cx="1289913" cy="338554"/>
           </a:xfrm>
           <a:prstGeom prst="rect">
             <a:avLst/>
@@ -10368,7 +10278,7 @@
           <a:p>
             <a:pPr algn="ctr"/>
             <a:r>
-              <a:rPr lang="en-US" sz="1214" dirty="0"/>
+              <a:rPr lang="en-US" sz="1600" dirty="0"/>
               <a:t>read</a:t>
             </a:r>
           </a:p>
@@ -10388,8 +10298,8 @@
         </p:nvSpPr>
         <p:spPr>
           <a:xfrm>
-            <a:off x="5418730" y="3176913"/>
-            <a:ext cx="2327159" cy="244803"/>
+            <a:off x="4916574" y="3152614"/>
+            <a:ext cx="3079769" cy="294465"/>
           </a:xfrm>
           <a:prstGeom prst="rect">
             <a:avLst/>
@@ -10414,57 +10324,12 @@
           <a:lstStyle/>
           <a:p>
             <a:r>
-              <a:rPr lang="en-US" sz="1214" dirty="0"/>
+              <a:rPr lang="en-US" sz="1600" dirty="0"/>
               <a:t>/home/pr/exp0/data_cleaned.csv</a:t>
             </a:r>
           </a:p>
         </p:txBody>
       </p:sp>
-      <p:cxnSp>
-        <p:nvCxnSpPr>
-          <p:cNvPr id="40" name="Straight Arrow Connector 3">
-            <a:extLst>
-              <a:ext uri="{FF2B5EF4-FFF2-40B4-BE49-F238E27FC236}">
-                <a16:creationId xmlns:a16="http://schemas.microsoft.com/office/drawing/2014/main" id="{ADCCB6E1-FDC7-7C03-BFF5-6EB4EA21D7B9}"/>
-              </a:ext>
-            </a:extLst>
-          </p:cNvPr>
-          <p:cNvCxnSpPr>
-            <a:cxnSpLocks/>
-            <a:stCxn id="105" idx="3"/>
-            <a:endCxn id="39" idx="1"/>
-          </p:cNvCxnSpPr>
-          <p:nvPr/>
-        </p:nvCxnSpPr>
-        <p:spPr>
-          <a:xfrm flipV="1">
-            <a:off x="2432497" y="3299315"/>
-            <a:ext cx="2986233" cy="3793"/>
-          </a:xfrm>
-          <a:prstGeom prst="bentConnector3">
-            <a:avLst>
-              <a:gd name="adj1" fmla="val 50000"/>
-            </a:avLst>
-          </a:prstGeom>
-          <a:ln w="19050">
-            <a:tailEnd type="triangle"/>
-          </a:ln>
-        </p:spPr>
-        <p:style>
-          <a:lnRef idx="1">
-            <a:schemeClr val="accent1"/>
-          </a:lnRef>
-          <a:fillRef idx="0">
-            <a:schemeClr val="accent1"/>
-          </a:fillRef>
-          <a:effectRef idx="0">
-            <a:schemeClr val="accent1"/>
-          </a:effectRef>
-          <a:fontRef idx="minor">
-            <a:schemeClr val="tx1"/>
-          </a:fontRef>
-        </p:style>
-      </p:cxnSp>
       <p:sp>
         <p:nvSpPr>
           <p:cNvPr id="41" name="TextBox 40">
@@ -10480,7 +10345,7 @@
         <p:spPr>
           <a:xfrm>
             <a:off x="2279162" y="3010743"/>
-            <a:ext cx="1289913" cy="279179"/>
+            <a:ext cx="1289913" cy="338554"/>
           </a:xfrm>
           <a:prstGeom prst="rect">
             <a:avLst/>
@@ -10495,57 +10360,12 @@
           <a:p>
             <a:pPr algn="ctr"/>
             <a:r>
-              <a:rPr lang="en-US" sz="1214" dirty="0"/>
+              <a:rPr lang="en-US" sz="1600" dirty="0"/>
               <a:t>write</a:t>
             </a:r>
           </a:p>
         </p:txBody>
       </p:sp>
-      <p:cxnSp>
-        <p:nvCxnSpPr>
-          <p:cNvPr id="58" name="Straight Arrow Connector 3">
-            <a:extLst>
-              <a:ext uri="{FF2B5EF4-FFF2-40B4-BE49-F238E27FC236}">
-                <a16:creationId xmlns:a16="http://schemas.microsoft.com/office/drawing/2014/main" id="{1CF87D94-6C9C-E0F1-4D5E-28AFB89A572E}"/>
-              </a:ext>
-            </a:extLst>
-          </p:cNvPr>
-          <p:cNvCxnSpPr>
-            <a:cxnSpLocks/>
-            <a:stCxn id="110" idx="3"/>
-            <a:endCxn id="62" idx="1"/>
-          </p:cNvCxnSpPr>
-          <p:nvPr/>
-        </p:nvCxnSpPr>
-        <p:spPr>
-          <a:xfrm>
-            <a:off x="2423541" y="3752164"/>
-            <a:ext cx="2995189" cy="536"/>
-          </a:xfrm>
-          <a:prstGeom prst="bentConnector3">
-            <a:avLst>
-              <a:gd name="adj1" fmla="val 50000"/>
-            </a:avLst>
-          </a:prstGeom>
-          <a:ln w="19050">
-            <a:tailEnd type="triangle"/>
-          </a:ln>
-        </p:spPr>
-        <p:style>
-          <a:lnRef idx="1">
-            <a:schemeClr val="accent1"/>
-          </a:lnRef>
-          <a:fillRef idx="0">
-            <a:schemeClr val="accent1"/>
-          </a:fillRef>
-          <a:effectRef idx="0">
-            <a:schemeClr val="accent1"/>
-          </a:effectRef>
-          <a:fontRef idx="minor">
-            <a:schemeClr val="tx1"/>
-          </a:fontRef>
-        </p:style>
-      </p:cxnSp>
       <p:sp>
         <p:nvSpPr>
           <p:cNvPr id="60" name="TextBox 59">
@@ -10561,7 +10381,7 @@
         <p:spPr>
           <a:xfrm>
             <a:off x="2276413" y="3460402"/>
-            <a:ext cx="1289913" cy="279179"/>
+            <a:ext cx="1289913" cy="338554"/>
           </a:xfrm>
           <a:prstGeom prst="rect">
             <a:avLst/>
@@ -10576,7 +10396,7 @@
           <a:p>
             <a:pPr algn="ctr"/>
             <a:r>
-              <a:rPr lang="en-US" sz="1214" dirty="0"/>
+              <a:rPr lang="en-US" sz="1600" dirty="0"/>
               <a:t>read</a:t>
             </a:r>
           </a:p>
@@ -10596,8 +10416,8 @@
         </p:nvSpPr>
         <p:spPr>
           <a:xfrm>
-            <a:off x="5418730" y="3630298"/>
-            <a:ext cx="2327159" cy="244803"/>
+            <a:off x="4934795" y="3575323"/>
+            <a:ext cx="3061547" cy="299779"/>
           </a:xfrm>
           <a:prstGeom prst="rect">
             <a:avLst/>
@@ -10622,7 +10442,7 @@
           <a:lstStyle/>
           <a:p>
             <a:r>
-              <a:rPr lang="en-US" sz="1214" dirty="0"/>
+              <a:rPr lang="en-US" sz="1600" dirty="0"/>
               <a:t>/home/pr/exp0/data_cleaned.csv</a:t>
             </a:r>
           </a:p>
@@ -10645,9 +10465,9 @@
           <p:nvPr/>
         </p:nvCxnSpPr>
         <p:spPr>
-          <a:xfrm flipV="1">
-            <a:off x="2432497" y="4167264"/>
-            <a:ext cx="2981767" cy="18102"/>
+          <a:xfrm>
+            <a:off x="2432497" y="4185366"/>
+            <a:ext cx="1863540" cy="3463"/>
           </a:xfrm>
           <a:prstGeom prst="straightConnector1">
             <a:avLst/>
@@ -10686,7 +10506,7 @@
         <p:spPr>
           <a:xfrm>
             <a:off x="2276413" y="3862056"/>
-            <a:ext cx="1289913" cy="279179"/>
+            <a:ext cx="1289913" cy="338554"/>
           </a:xfrm>
           <a:prstGeom prst="rect">
             <a:avLst/>
@@ -10701,7 +10521,7 @@
           <a:p>
             <a:pPr algn="ctr"/>
             <a:r>
-              <a:rPr lang="en-US" sz="1214" dirty="0"/>
+              <a:rPr lang="en-US" sz="1600" dirty="0"/>
               <a:t>load</a:t>
             </a:r>
           </a:p>
@@ -10721,8 +10541,8 @@
         </p:nvSpPr>
         <p:spPr>
           <a:xfrm>
-            <a:off x="5414264" y="4044862"/>
-            <a:ext cx="7294564" cy="244803"/>
+            <a:off x="4296037" y="4055629"/>
+            <a:ext cx="8314493" cy="266399"/>
           </a:xfrm>
           <a:prstGeom prst="rect">
             <a:avLst/>
@@ -10747,7 +10567,7 @@
           <a:lstStyle/>
           <a:p>
             <a:r>
-              <a:rPr lang="en-US" sz="1214" dirty="0"/>
+              <a:rPr lang="en-US" sz="1400" dirty="0"/>
               <a:t>/pr/venv/lib/python3.11/site-packages/matplotlib/backends/_backend_agg.cpython-311-x86_64-linux-gnu.so</a:t>
             </a:r>
           </a:p>
@@ -10797,7 +10617,7 @@
           <a:lstStyle/>
           <a:p>
             <a:pPr algn="ctr"/>
-            <a:endParaRPr lang="en-US" sz="1214" dirty="0"/>
+            <a:endParaRPr lang="en-US" sz="1400" dirty="0"/>
           </a:p>
         </p:txBody>
       </p:sp>
@@ -10845,7 +10665,7 @@
           <a:lstStyle/>
           <a:p>
             <a:pPr algn="ctr"/>
-            <a:endParaRPr lang="en-US" sz="1214" dirty="0"/>
+            <a:endParaRPr lang="en-US" sz="1400" dirty="0"/>
           </a:p>
         </p:txBody>
       </p:sp>
@@ -10893,7 +10713,7 @@
           <a:lstStyle/>
           <a:p>
             <a:pPr algn="ctr"/>
-            <a:endParaRPr lang="en-US" sz="1214" dirty="0"/>
+            <a:endParaRPr lang="en-US" sz="1400" dirty="0"/>
           </a:p>
         </p:txBody>
       </p:sp>
@@ -10941,7 +10761,7 @@
           <a:lstStyle/>
           <a:p>
             <a:pPr algn="ctr"/>
-            <a:endParaRPr lang="en-US" sz="1214" dirty="0"/>
+            <a:endParaRPr lang="en-US" sz="1400" dirty="0"/>
           </a:p>
         </p:txBody>
       </p:sp>
@@ -10989,7 +10809,7 @@
           <a:lstStyle/>
           <a:p>
             <a:pPr algn="ctr"/>
-            <a:endParaRPr lang="en-US" sz="1214" dirty="0"/>
+            <a:endParaRPr lang="en-US" sz="1400" dirty="0"/>
           </a:p>
         </p:txBody>
       </p:sp>
@@ -11007,8 +10827,8 @@
         </p:nvSpPr>
         <p:spPr>
           <a:xfrm>
-            <a:off x="5418731" y="4498247"/>
-            <a:ext cx="1767500" cy="234893"/>
+            <a:off x="4934795" y="4458555"/>
+            <a:ext cx="2298106" cy="307777"/>
           </a:xfrm>
           <a:prstGeom prst="rect">
             <a:avLst/>
@@ -11033,36 +10853,69 @@
           <a:lstStyle/>
           <a:p>
             <a:r>
-              <a:rPr lang="en-US" sz="1214" dirty="0"/>
+              <a:rPr lang="en-US" sz="1600" dirty="0"/>
               <a:t>/home/pr/exp0/plot.png</a:t>
+            </a:r>
+          </a:p>
+        </p:txBody>
+      </p:sp>
+      <p:sp>
+        <p:nvSpPr>
+          <p:cNvPr id="122" name="TextBox 121">
+            <a:extLst>
+              <a:ext uri="{FF2B5EF4-FFF2-40B4-BE49-F238E27FC236}">
+                <a16:creationId xmlns:a16="http://schemas.microsoft.com/office/drawing/2014/main" id="{BBC9C585-BAA8-1EF3-3008-10B22F750D21}"/>
+              </a:ext>
+            </a:extLst>
+          </p:cNvPr>
+          <p:cNvSpPr txBox="1"/>
+          <p:nvPr/>
+        </p:nvSpPr>
+        <p:spPr>
+          <a:xfrm>
+            <a:off x="2279162" y="4322167"/>
+            <a:ext cx="1289913" cy="338554"/>
+          </a:xfrm>
+          <a:prstGeom prst="rect">
+            <a:avLst/>
+          </a:prstGeom>
+          <a:noFill/>
+        </p:spPr>
+        <p:txBody>
+          <a:bodyPr wrap="square" rtlCol="0">
+            <a:spAutoFit/>
+          </a:bodyPr>
+          <a:lstStyle/>
+          <a:p>
+            <a:pPr algn="ctr"/>
+            <a:r>
+              <a:rPr lang="en-US" sz="1600" dirty="0"/>
+              <a:t>write</a:t>
             </a:r>
           </a:p>
         </p:txBody>
       </p:sp>
       <p:cxnSp>
         <p:nvCxnSpPr>
-          <p:cNvPr id="121" name="Straight Arrow Connector 3">
+          <p:cNvPr id="55" name="Straight Arrow Connector 54">
             <a:extLst>
               <a:ext uri="{FF2B5EF4-FFF2-40B4-BE49-F238E27FC236}">
-                <a16:creationId xmlns:a16="http://schemas.microsoft.com/office/drawing/2014/main" id="{2080A063-85C6-F5B7-A57B-5F56FDF3B73E}"/>
+                <a16:creationId xmlns:a16="http://schemas.microsoft.com/office/drawing/2014/main" id="{0DAEBAA7-A4FC-8FF8-C302-7310EEE7ABE5}"/>
               </a:ext>
             </a:extLst>
           </p:cNvPr>
           <p:cNvCxnSpPr>
             <a:cxnSpLocks/>
-            <a:endCxn id="120" idx="1"/>
           </p:cNvCxnSpPr>
           <p:nvPr/>
         </p:nvCxnSpPr>
         <p:spPr>
-          <a:xfrm>
-            <a:off x="2432497" y="4614532"/>
-            <a:ext cx="2986234" cy="1162"/>
+          <a:xfrm flipV="1">
+            <a:off x="2423539" y="4612444"/>
+            <a:ext cx="2511256" cy="25644"/>
           </a:xfrm>
-          <a:prstGeom prst="bentConnector3">
-            <a:avLst>
-              <a:gd name="adj1" fmla="val 50000"/>
-            </a:avLst>
+          <a:prstGeom prst="straightConnector1">
+            <a:avLst/>
           </a:prstGeom>
           <a:ln w="19050">
             <a:tailEnd type="triangle"/>
@@ -11083,42 +10936,170 @@
           </a:fontRef>
         </p:style>
       </p:cxnSp>
-      <p:sp>
-        <p:nvSpPr>
-          <p:cNvPr id="122" name="TextBox 121">
+      <p:cxnSp>
+        <p:nvCxnSpPr>
+          <p:cNvPr id="61" name="Straight Arrow Connector 60">
             <a:extLst>
               <a:ext uri="{FF2B5EF4-FFF2-40B4-BE49-F238E27FC236}">
-                <a16:creationId xmlns:a16="http://schemas.microsoft.com/office/drawing/2014/main" id="{BBC9C585-BAA8-1EF3-3008-10B22F750D21}"/>
+                <a16:creationId xmlns:a16="http://schemas.microsoft.com/office/drawing/2014/main" id="{AF5E2A2A-333B-90E8-3A9F-B11F6D89C296}"/>
               </a:ext>
             </a:extLst>
           </p:cNvPr>
-          <p:cNvSpPr txBox="1"/>
+          <p:cNvCxnSpPr>
+            <a:cxnSpLocks/>
+          </p:cNvCxnSpPr>
           <p:nvPr/>
-        </p:nvSpPr>
+        </p:nvCxnSpPr>
         <p:spPr>
           <a:xfrm>
-            <a:off x="2279162" y="4322167"/>
-            <a:ext cx="1289913" cy="279179"/>
+            <a:off x="2409907" y="2843894"/>
+            <a:ext cx="2511256" cy="0"/>
           </a:xfrm>
-          <a:prstGeom prst="rect">
+          <a:prstGeom prst="straightConnector1">
             <a:avLst/>
           </a:prstGeom>
-          <a:noFill/>
+          <a:ln w="19050">
+            <a:tailEnd type="triangle"/>
+          </a:ln>
         </p:spPr>
-        <p:txBody>
-          <a:bodyPr wrap="square" rtlCol="0">
-            <a:spAutoFit/>
-          </a:bodyPr>
-          <a:lstStyle/>
-          <a:p>
-            <a:pPr algn="ctr"/>
-            <a:r>
-              <a:rPr lang="en-US" sz="1214" dirty="0"/>
-              <a:t>write</a:t>
-            </a:r>
-          </a:p>
-        </p:txBody>
-      </p:sp>
+        <p:style>
+          <a:lnRef idx="1">
+            <a:schemeClr val="accent1"/>
+          </a:lnRef>
+          <a:fillRef idx="0">
+            <a:schemeClr val="accent1"/>
+          </a:fillRef>
+          <a:effectRef idx="0">
+            <a:schemeClr val="accent1"/>
+          </a:effectRef>
+          <a:fontRef idx="minor">
+            <a:schemeClr val="tx1"/>
+          </a:fontRef>
+        </p:style>
+      </p:cxnSp>
+      <p:cxnSp>
+        <p:nvCxnSpPr>
+          <p:cNvPr id="63" name="Straight Arrow Connector 62">
+            <a:extLst>
+              <a:ext uri="{FF2B5EF4-FFF2-40B4-BE49-F238E27FC236}">
+                <a16:creationId xmlns:a16="http://schemas.microsoft.com/office/drawing/2014/main" id="{E0CB56B6-74ED-6483-CE69-24BD3073CF7D}"/>
+              </a:ext>
+            </a:extLst>
+          </p:cNvPr>
+          <p:cNvCxnSpPr>
+            <a:cxnSpLocks/>
+          </p:cNvCxnSpPr>
+          <p:nvPr/>
+        </p:nvCxnSpPr>
+        <p:spPr>
+          <a:xfrm>
+            <a:off x="2423541" y="3318520"/>
+            <a:ext cx="2511256" cy="0"/>
+          </a:xfrm>
+          <a:prstGeom prst="straightConnector1">
+            <a:avLst/>
+          </a:prstGeom>
+          <a:ln w="19050">
+            <a:tailEnd type="triangle"/>
+          </a:ln>
+        </p:spPr>
+        <p:style>
+          <a:lnRef idx="1">
+            <a:schemeClr val="accent1"/>
+          </a:lnRef>
+          <a:fillRef idx="0">
+            <a:schemeClr val="accent1"/>
+          </a:fillRef>
+          <a:effectRef idx="0">
+            <a:schemeClr val="accent1"/>
+          </a:effectRef>
+          <a:fontRef idx="minor">
+            <a:schemeClr val="tx1"/>
+          </a:fontRef>
+        </p:style>
+      </p:cxnSp>
+      <p:cxnSp>
+        <p:nvCxnSpPr>
+          <p:cNvPr id="75" name="Straight Arrow Connector 3">
+            <a:extLst>
+              <a:ext uri="{FF2B5EF4-FFF2-40B4-BE49-F238E27FC236}">
+                <a16:creationId xmlns:a16="http://schemas.microsoft.com/office/drawing/2014/main" id="{42D5074A-85D0-69F3-AE91-4B72366B6C66}"/>
+              </a:ext>
+            </a:extLst>
+          </p:cNvPr>
+          <p:cNvCxnSpPr>
+            <a:cxnSpLocks/>
+          </p:cNvCxnSpPr>
+          <p:nvPr/>
+        </p:nvCxnSpPr>
+        <p:spPr>
+          <a:xfrm>
+            <a:off x="2408715" y="2002295"/>
+            <a:ext cx="2492508" cy="450"/>
+          </a:xfrm>
+          <a:prstGeom prst="straightConnector1">
+            <a:avLst/>
+          </a:prstGeom>
+          <a:ln w="19050">
+            <a:tailEnd type="triangle"/>
+          </a:ln>
+        </p:spPr>
+        <p:style>
+          <a:lnRef idx="1">
+            <a:schemeClr val="accent1"/>
+          </a:lnRef>
+          <a:fillRef idx="0">
+            <a:schemeClr val="accent1"/>
+          </a:fillRef>
+          <a:effectRef idx="0">
+            <a:schemeClr val="accent1"/>
+          </a:effectRef>
+          <a:fontRef idx="minor">
+            <a:schemeClr val="tx1"/>
+          </a:fontRef>
+        </p:style>
+      </p:cxnSp>
+      <p:cxnSp>
+        <p:nvCxnSpPr>
+          <p:cNvPr id="77" name="Straight Arrow Connector 76">
+            <a:extLst>
+              <a:ext uri="{FF2B5EF4-FFF2-40B4-BE49-F238E27FC236}">
+                <a16:creationId xmlns:a16="http://schemas.microsoft.com/office/drawing/2014/main" id="{E378AC13-2378-CE96-D00C-31390BC1A93B}"/>
+              </a:ext>
+            </a:extLst>
+          </p:cNvPr>
+          <p:cNvCxnSpPr>
+            <a:cxnSpLocks/>
+          </p:cNvCxnSpPr>
+          <p:nvPr/>
+        </p:nvCxnSpPr>
+        <p:spPr>
+          <a:xfrm>
+            <a:off x="2408715" y="3721346"/>
+            <a:ext cx="2511256" cy="0"/>
+          </a:xfrm>
+          <a:prstGeom prst="straightConnector1">
+            <a:avLst/>
+          </a:prstGeom>
+          <a:ln w="19050">
+            <a:tailEnd type="triangle"/>
+          </a:ln>
+        </p:spPr>
+        <p:style>
+          <a:lnRef idx="1">
+            <a:schemeClr val="accent1"/>
+          </a:lnRef>
+          <a:fillRef idx="0">
+            <a:schemeClr val="accent1"/>
+          </a:fillRef>
+          <a:effectRef idx="0">
+            <a:schemeClr val="accent1"/>
+          </a:effectRef>
+          <a:fontRef idx="minor">
+            <a:schemeClr val="tx1"/>
+          </a:fontRef>
+        </p:style>
+      </p:cxnSp>
     </p:spTree>
     <p:extLst>
       <p:ext uri="{BB962C8B-B14F-4D97-AF65-F5344CB8AC3E}">

</xml_diff>

<commit_message>
updates from user study
</commit_message>
<xml_diff>
--- a/example_workflow_0/provenance/workflow_0_graph.pptx
+++ b/example_workflow_0/provenance/workflow_0_graph.pptx
@@ -5720,7 +5720,7 @@
           <a:p>
             <a:fld id="{4DAAF268-B108-415A-8D22-4C329ED559E0}" type="datetimeFigureOut">
               <a:rPr lang="en-US" smtClean="0"/>
-              <a:t>10/30/23</a:t>
+              <a:t>11/16/23</a:t>
             </a:fld>
             <a:endParaRPr lang="en-US"/>
           </a:p>
@@ -5890,7 +5890,7 @@
           <a:p>
             <a:fld id="{4DAAF268-B108-415A-8D22-4C329ED559E0}" type="datetimeFigureOut">
               <a:rPr lang="en-US" smtClean="0"/>
-              <a:t>10/30/23</a:t>
+              <a:t>11/16/23</a:t>
             </a:fld>
             <a:endParaRPr lang="en-US"/>
           </a:p>
@@ -6070,7 +6070,7 @@
           <a:p>
             <a:fld id="{4DAAF268-B108-415A-8D22-4C329ED559E0}" type="datetimeFigureOut">
               <a:rPr lang="en-US" smtClean="0"/>
-              <a:t>10/30/23</a:t>
+              <a:t>11/16/23</a:t>
             </a:fld>
             <a:endParaRPr lang="en-US"/>
           </a:p>
@@ -6240,7 +6240,7 @@
           <a:p>
             <a:fld id="{4DAAF268-B108-415A-8D22-4C329ED559E0}" type="datetimeFigureOut">
               <a:rPr lang="en-US" smtClean="0"/>
-              <a:t>10/30/23</a:t>
+              <a:t>11/16/23</a:t>
             </a:fld>
             <a:endParaRPr lang="en-US"/>
           </a:p>
@@ -6484,7 +6484,7 @@
           <a:p>
             <a:fld id="{4DAAF268-B108-415A-8D22-4C329ED559E0}" type="datetimeFigureOut">
               <a:rPr lang="en-US" smtClean="0"/>
-              <a:t>10/30/23</a:t>
+              <a:t>11/16/23</a:t>
             </a:fld>
             <a:endParaRPr lang="en-US"/>
           </a:p>
@@ -6716,7 +6716,7 @@
           <a:p>
             <a:fld id="{4DAAF268-B108-415A-8D22-4C329ED559E0}" type="datetimeFigureOut">
               <a:rPr lang="en-US" smtClean="0"/>
-              <a:t>10/30/23</a:t>
+              <a:t>11/16/23</a:t>
             </a:fld>
             <a:endParaRPr lang="en-US"/>
           </a:p>
@@ -7083,7 +7083,7 @@
           <a:p>
             <a:fld id="{4DAAF268-B108-415A-8D22-4C329ED559E0}" type="datetimeFigureOut">
               <a:rPr lang="en-US" smtClean="0"/>
-              <a:t>10/30/23</a:t>
+              <a:t>11/16/23</a:t>
             </a:fld>
             <a:endParaRPr lang="en-US"/>
           </a:p>
@@ -7201,7 +7201,7 @@
           <a:p>
             <a:fld id="{4DAAF268-B108-415A-8D22-4C329ED559E0}" type="datetimeFigureOut">
               <a:rPr lang="en-US" smtClean="0"/>
-              <a:t>10/30/23</a:t>
+              <a:t>11/16/23</a:t>
             </a:fld>
             <a:endParaRPr lang="en-US"/>
           </a:p>
@@ -7296,7 +7296,7 @@
           <a:p>
             <a:fld id="{4DAAF268-B108-415A-8D22-4C329ED559E0}" type="datetimeFigureOut">
               <a:rPr lang="en-US" smtClean="0"/>
-              <a:t>10/30/23</a:t>
+              <a:t>11/16/23</a:t>
             </a:fld>
             <a:endParaRPr lang="en-US"/>
           </a:p>
@@ -7573,7 +7573,7 @@
           <a:p>
             <a:fld id="{4DAAF268-B108-415A-8D22-4C329ED559E0}" type="datetimeFigureOut">
               <a:rPr lang="en-US" smtClean="0"/>
-              <a:t>10/30/23</a:t>
+              <a:t>11/16/23</a:t>
             </a:fld>
             <a:endParaRPr lang="en-US"/>
           </a:p>
@@ -7830,7 +7830,7 @@
           <a:p>
             <a:fld id="{4DAAF268-B108-415A-8D22-4C329ED559E0}" type="datetimeFigureOut">
               <a:rPr lang="en-US" smtClean="0"/>
-              <a:t>10/30/23</a:t>
+              <a:t>11/16/23</a:t>
             </a:fld>
             <a:endParaRPr lang="en-US"/>
           </a:p>
@@ -8043,7 +8043,7 @@
           <a:p>
             <a:fld id="{4DAAF268-B108-415A-8D22-4C329ED559E0}" type="datetimeFigureOut">
               <a:rPr lang="en-US" smtClean="0"/>
-              <a:t>10/30/23</a:t>
+              <a:t>11/16/23</a:t>
             </a:fld>
             <a:endParaRPr lang="en-US"/>
           </a:p>
@@ -8462,8 +8462,8 @@
         </p:nvSpPr>
         <p:spPr>
           <a:xfrm>
-            <a:off x="12814640" y="382682"/>
-            <a:ext cx="7424990" cy="13453410"/>
+            <a:off x="12814639" y="382682"/>
+            <a:ext cx="7903739" cy="13453410"/>
           </a:xfrm>
           <a:prstGeom prst="rect">
             <a:avLst/>
@@ -8489,18 +8489,6 @@
           <a:p>
             <a:r>
               <a:rPr lang="en-US" sz="1250" dirty="0"/>
-              <a:t>/pr/venv/lib/python3.11/site-packages/numpy/core/_multiarray_umath.cpython-311-x86_64-linux-gnu.so</a:t>
-            </a:r>
-          </a:p>
-          <a:p>
-            <a:r>
-              <a:rPr lang="en-US" sz="1250" dirty="0"/>
-              <a:t>/home/pr/venv/lib/python3.11/site-packages/numpy.libs/libopenblas64_p-r0-0cf96a72.3.23.dev.so</a:t>
-            </a:r>
-          </a:p>
-          <a:p>
-            <a:r>
-              <a:rPr lang="en-US" sz="1250" dirty="0"/>
               <a:t>/home/pr/</a:t>
             </a:r>
             <a:r>
@@ -8513,11 +8501,11 @@
             </a:r>
             <a:r>
               <a:rPr lang="en-US" sz="1250" dirty="0" err="1"/>
-              <a:t>numpy.libs</a:t>
-            </a:r>
-            <a:r>
-              <a:rPr lang="en-US" sz="1250" dirty="0"/>
-              <a:t>/libgfortran-040039e1.so.5.0.0</a:t>
+              <a:t>numpy</a:t>
+            </a:r>
+            <a:r>
+              <a:rPr lang="en-US" sz="1250" dirty="0"/>
+              <a:t>/core/_multiarray_umath.cpython-311-x86_64-linux-gnu.so</a:t>
             </a:r>
           </a:p>
           <a:p>
@@ -8539,337 +8527,7 @@
             </a:r>
             <a:r>
               <a:rPr lang="en-US" sz="1250" dirty="0"/>
-              <a:t>/libquadmath-96973f99.so.0.0.0</a:t>
-            </a:r>
-          </a:p>
-          <a:p>
-            <a:r>
-              <a:rPr lang="en-US" sz="1250" dirty="0"/>
-              <a:t>/pr/venv/lib/python3.11/site-packages/numpy/core/_multiarray_tests.cpython-311-x86_64-linux-gnu.so</a:t>
-            </a:r>
-          </a:p>
-          <a:p>
-            <a:r>
-              <a:rPr lang="en-US" sz="1250" dirty="0"/>
-              <a:t>/pr/venv/lib/python3.11/site-packages/numpy/linalg/_umath_linalg.cpython-311-x86_64-linux-gnu.so</a:t>
-            </a:r>
-          </a:p>
-          <a:p>
-            <a:r>
-              <a:rPr lang="en-US" sz="1250" dirty="0"/>
-              <a:t>/pr/venv/lib/python3.11/site-packages/numpy/fft/_pocketfft_internal.cpython-311-x86_64-linux-gnu.so</a:t>
-            </a:r>
-          </a:p>
-          <a:p>
-            <a:r>
-              <a:rPr lang="en-US" sz="1250" dirty="0"/>
-              <a:t>/pr/venv/lib/python3.11/site-packages/numpy/random/mtrand.cpython-311-x86_64-linux-gnu.so</a:t>
-            </a:r>
-          </a:p>
-          <a:p>
-            <a:r>
-              <a:rPr lang="en-US" sz="1250" dirty="0"/>
-              <a:t>/pr/venv/lib/python3.11/site-packages/numpy/random/bit_generator.cpython-311-x86_64-linux-gnu.so</a:t>
-            </a:r>
-          </a:p>
-          <a:p>
-            <a:r>
-              <a:rPr lang="en-US" sz="1250" dirty="0"/>
-              <a:t>/pr/venv/lib/python3.11/site-packages/numpy/random/_common.cpython-311-x86_64-linux-gnu.so</a:t>
-            </a:r>
-          </a:p>
-          <a:p>
-            <a:r>
-              <a:rPr lang="en-US" sz="1250" dirty="0"/>
-              <a:t>/pr/venv/lib/python3.11/site-packages/numpy/random/_bounded_integers.cpython-311-x86_64-linux-gnu.so</a:t>
-            </a:r>
-          </a:p>
-          <a:p>
-            <a:r>
-              <a:rPr lang="en-US" sz="1250" dirty="0"/>
-              <a:t>/pr/venv/lib/python3.11/site-packages/numpy/random/_mt19937.cpython-311-x86_64-linux-gnu.so</a:t>
-            </a:r>
-          </a:p>
-          <a:p>
-            <a:r>
-              <a:rPr lang="en-US" sz="1250" dirty="0"/>
-              <a:t>/pr/venv/lib/python3.11/site-packages/numpy/random/_philox.cpython-311-x86_64-linux-gnu.so</a:t>
-            </a:r>
-          </a:p>
-          <a:p>
-            <a:r>
-              <a:rPr lang="en-US" sz="1250" dirty="0"/>
-              <a:t>/pr/venv/lib/python3.11/site-packages/numpy/random/_pcg64.cpython-311-x86_64-linux-gnu.so</a:t>
-            </a:r>
-          </a:p>
-          <a:p>
-            <a:r>
-              <a:rPr lang="en-US" sz="1250" dirty="0"/>
-              <a:t>/pr/venv/lib/python3.11/site-packages/numpy/random/_sfc64.cpython-311-x86_64-linux-gnu.so</a:t>
-            </a:r>
-          </a:p>
-          <a:p>
-            <a:r>
-              <a:rPr lang="en-US" sz="1250" dirty="0"/>
-              <a:t>/pr/venv/lib/python3.11/site-packages/numpy/random/_generator.cpython-311-x86_64-linux-gnu.so</a:t>
-            </a:r>
-          </a:p>
-          <a:p>
-            <a:r>
-              <a:rPr lang="en-US" sz="1250" dirty="0"/>
-              <a:t>/pr/venv/lib/python3.11/site-packages/pandas/_libs/pandas_parser.cpython-311-x86_64-linux-gnu.so</a:t>
-            </a:r>
-          </a:p>
-          <a:p>
-            <a:r>
-              <a:rPr lang="en-US" sz="1250" dirty="0"/>
-              <a:t>/pr/venv/lib/python3.11/site-packages/pandas/_libs/pandas_datetime.cpython-311-x86_64-linux-gnu.so</a:t>
-            </a:r>
-          </a:p>
-          <a:p>
-            <a:r>
-              <a:rPr lang="en-US" sz="1250" dirty="0"/>
-              <a:t>/pr/venv/lib/python3.11/site-packages/pandas/_libs/interval.cpython-311-x86_64-linux-gnu.so</a:t>
-            </a:r>
-          </a:p>
-          <a:p>
-            <a:r>
-              <a:rPr lang="en-US" sz="1250" dirty="0"/>
-              <a:t>/pr/venv/lib/python3.11/site-packages/pandas/_libs/hashtable.cpython-311-x86_64-linux-gnu.so</a:t>
-            </a:r>
-          </a:p>
-          <a:p>
-            <a:r>
-              <a:rPr lang="en-US" sz="1250" dirty="0"/>
-              <a:t>/pr/venv/lib/python3.11/site-packages/pandas/_libs/missing.cpython-311-x86_64-linux-gnu.so</a:t>
-            </a:r>
-          </a:p>
-          <a:p>
-            <a:r>
-              <a:rPr lang="en-US" sz="1250" dirty="0"/>
-              <a:t>/venv/lib/python3.11/site-packages/pandas/_libs/tslibs/dtypes.cpython-311-x86_64-linux-gnu.so</a:t>
-            </a:r>
-          </a:p>
-          <a:p>
-            <a:r>
-              <a:rPr lang="en-US" sz="1250" dirty="0"/>
-              <a:t>/venv/lib/python3.11/site-packages/pandas/_libs/tslibs/np_datetime.cpython-311-x86_64-linux-gnu.so</a:t>
-            </a:r>
-          </a:p>
-          <a:p>
-            <a:r>
-              <a:rPr lang="en-US" sz="1250" dirty="0"/>
-              <a:t>/venv/lib/python3.11/site-packages/pandas/_libs/tslibs/conversion.cpython-311-x86_64-linux-gnu.so</a:t>
-            </a:r>
-          </a:p>
-          <a:p>
-            <a:r>
-              <a:rPr lang="en-US" sz="1250" dirty="0"/>
-              <a:t>/venv/lib/python3.11/site-packages/pandas/_libs/tslibs/base.cpython-311-x86_64-linux-gnu.so</a:t>
-            </a:r>
-          </a:p>
-          <a:p>
-            <a:r>
-              <a:rPr lang="en-US" sz="1250" dirty="0"/>
-              <a:t>/venv/lib/python3.11/site-packages/pandas/_libs/tslibs/offsets.cpython-311-x86_64-linux-gnu.so</a:t>
-            </a:r>
-          </a:p>
-          <a:p>
-            <a:r>
-              <a:rPr lang="en-US" sz="1250" dirty="0"/>
-              <a:t>/venv/lib/python3.11/site-packages/pandas/_libs/tslibs/timestamps.cpython-311-x86_64-linux-gnu.so</a:t>
-            </a:r>
-          </a:p>
-          <a:p>
-            <a:r>
-              <a:rPr lang="en-US" sz="1250" dirty="0"/>
-              <a:t>/venv/lib/python3.11/site-packages/pandas/_libs/tslibs/nattype.cpython-311-x86_64-linux-gnu.so</a:t>
-            </a:r>
-          </a:p>
-          <a:p>
-            <a:r>
-              <a:rPr lang="en-US" sz="1250" dirty="0"/>
-              <a:t>/venv/lib/python3.11/site-packages/pandas/_libs/tslibs/timedeltas.cpython-311-x86_64-linux-gnu.so</a:t>
-            </a:r>
-          </a:p>
-          <a:p>
-            <a:r>
-              <a:rPr lang="en-US" sz="1250" dirty="0"/>
-              <a:t>/venv/lib/python3.11/site-packages/pandas/_libs/tslibs/timezones.cpython-311-x86_64-linux-gnu.so</a:t>
-            </a:r>
-          </a:p>
-          <a:p>
-            <a:r>
-              <a:rPr lang="en-US" sz="1250" dirty="0"/>
-              <a:t>/venv/lib/python3.11/site-packages/pandas/_libs/tslibs/fields.cpython-311-x86_64-linux-gnu.so</a:t>
-            </a:r>
-          </a:p>
-          <a:p>
-            <a:r>
-              <a:rPr lang="en-US" sz="1250" dirty="0"/>
-              <a:t>/venv/lib/python3.11/site-packages/pandas/_libs/tslibs/ccalendar.cpython-311-x86_64-linux-gnu.so</a:t>
-            </a:r>
-          </a:p>
-          <a:p>
-            <a:r>
-              <a:rPr lang="en-US" sz="1250" dirty="0"/>
-              <a:t>/venv/lib/python3.11/site-packages/pandas/_libs/tslibs/tzconversion.cpython-311-x86_64-linux-gnu.so</a:t>
-            </a:r>
-          </a:p>
-          <a:p>
-            <a:r>
-              <a:rPr lang="en-US" sz="1250" dirty="0"/>
-              <a:t>/pr/venv/lib/python3.11/site-packages/pandas/_libs/properties.cpython-311-x86_64-linux-gnu.so</a:t>
-            </a:r>
-          </a:p>
-          <a:p>
-            <a:r>
-              <a:rPr lang="en-US" sz="1250" dirty="0"/>
-              <a:t>/venv/lib/python3.11/site-packages/pandas/_libs/tslibs/parsing.cpython-311-x86_64-linux-gnu.so</a:t>
-            </a:r>
-          </a:p>
-          <a:p>
-            <a:r>
-              <a:rPr lang="en-US" sz="1250" dirty="0"/>
-              <a:t>/venv/lib/python3.11/site-packages/pandas/_libs/tslibs/strptime.cpython-311-x86_64-linux-gnu.so</a:t>
-            </a:r>
-          </a:p>
-          <a:p>
-            <a:r>
-              <a:rPr lang="en-US" sz="1250" dirty="0"/>
-              <a:t>/venv/lib/python3.11/site-packages/pandas/_libs/tslibs/period.cpython-311-x86_64-linux-gnu.so</a:t>
-            </a:r>
-          </a:p>
-          <a:p>
-            <a:r>
-              <a:rPr lang="en-US" sz="1250" dirty="0"/>
-              <a:t>/venv/lib/python3.11/site-packages/pandas/_libs/tslibs/vectorized.cpython-311-x86_64-linux-gnu.so</a:t>
-            </a:r>
-          </a:p>
-          <a:p>
-            <a:r>
-              <a:rPr lang="en-US" sz="1250" dirty="0"/>
-              <a:t>/pr/venv/lib/python3.11/site-packages/pandas/_libs/ops_dispatch.cpython-311-x86_64-linux-gnu.so</a:t>
-            </a:r>
-          </a:p>
-          <a:p>
-            <a:r>
-              <a:rPr lang="en-US" sz="1250" dirty="0"/>
-              <a:t>/pr/venv/lib/python3.11/site-packages/pandas/_libs/algos.cpython-311-x86_64-linux-gnu.so</a:t>
-            </a:r>
-          </a:p>
-          <a:p>
-            <a:r>
-              <a:rPr lang="en-US" sz="1250" dirty="0"/>
-              <a:t>/pr/venv/lib/python3.11/site-packages/pandas/_libs/lib.cpython-311-x86_64-linux-gnu.so</a:t>
-            </a:r>
-          </a:p>
-          <a:p>
-            <a:r>
-              <a:rPr lang="en-US" sz="1250" dirty="0"/>
-              <a:t>/pr/venv/lib/python3.11/site-packages/pandas/_libs/ops.cpython-311-x86_64-linux-gnu.so</a:t>
-            </a:r>
-          </a:p>
-          <a:p>
-            <a:r>
-              <a:rPr lang="en-US" sz="1250" dirty="0"/>
-              <a:t>/pr/venv/lib/python3.11/site-packages/pandas/_libs/arrays.cpython-311-x86_64-linux-gnu.so</a:t>
-            </a:r>
-          </a:p>
-          <a:p>
-            <a:r>
-              <a:rPr lang="en-US" sz="1250" dirty="0"/>
-              <a:t>/pr/venv/lib/python3.11/site-packages/pandas/_libs/tslib.cpython-311-x86_64-linux-gnu.so</a:t>
-            </a:r>
-          </a:p>
-          <a:p>
-            <a:r>
-              <a:rPr lang="en-US" sz="1250" dirty="0"/>
-              <a:t>/pr/venv/lib/python3.11/site-packages/pandas/_libs/sparse.cpython-311-x86_64-linux-gnu.so</a:t>
-            </a:r>
-          </a:p>
-          <a:p>
-            <a:r>
-              <a:rPr lang="en-US" sz="1250" dirty="0"/>
-              <a:t>/pr/venv/lib/python3.11/site-packages/pandas/_libs/indexing.cpython-311-x86_64-linux-gnu.so</a:t>
-            </a:r>
-          </a:p>
-          <a:p>
-            <a:r>
-              <a:rPr lang="en-US" sz="1250" dirty="0"/>
-              <a:t>/pr/venv/lib/python3.11/site-packages/pandas/_libs/index.cpython-311-x86_64-linux-gnu.so</a:t>
-            </a:r>
-          </a:p>
-          <a:p>
-            <a:r>
-              <a:rPr lang="en-US" sz="1250" dirty="0"/>
-              <a:t>/pr/venv/lib/python3.11/site-packages/pandas/_libs/internals.cpython-311-x86_64-linux-gnu.so</a:t>
-            </a:r>
-          </a:p>
-          <a:p>
-            <a:r>
-              <a:rPr lang="en-US" sz="1250" dirty="0"/>
-              <a:t>/pr/venv/lib/python3.11/site-packages/pandas/_libs/join.cpython-311-x86_64-linux-gnu.so</a:t>
-            </a:r>
-          </a:p>
-          <a:p>
-            <a:r>
-              <a:rPr lang="en-US" sz="1250" dirty="0"/>
-              <a:t>/pr/venv/lib/python3.11/site-packages/pandas/_libs/writers.cpython-311-x86_64-linux-gnu.so</a:t>
-            </a:r>
-          </a:p>
-          <a:p>
-            <a:r>
-              <a:rPr lang="en-US" sz="1250" dirty="0"/>
-              <a:t>/venv/lib/python3.11/site-packages/pandas/_libs/window/aggregations.cpython-311-x86_64-linux-gnu.so</a:t>
-            </a:r>
-          </a:p>
-          <a:p>
-            <a:r>
-              <a:rPr lang="en-US" sz="1250" dirty="0"/>
-              <a:t>/venv/lib/python3.11/site-packages/pandas/_libs/window/indexers.cpython-311-x86_64-linux-gnu.so</a:t>
-            </a:r>
-          </a:p>
-          <a:p>
-            <a:r>
-              <a:rPr lang="en-US" sz="1250" dirty="0"/>
-              <a:t>/pr/venv/lib/python3.11/site-packages/pandas/_libs/reshape.cpython-311-x86_64-linux-gnu.so</a:t>
-            </a:r>
-          </a:p>
-          <a:p>
-            <a:r>
-              <a:rPr lang="en-US" sz="1250" dirty="0"/>
-              <a:t>/pr/venv/lib/python3.11/site-packages/pandas/_libs/groupby.cpython-311-x86_64-linux-gnu.so</a:t>
-            </a:r>
-          </a:p>
-          <a:p>
-            <a:r>
-              <a:rPr lang="en-US" sz="1250" dirty="0"/>
-              <a:t>/pr/venv/lib/python3.11/site-packages/pandas/_libs/json.cpython-311-x86_64-linux-gnu.so</a:t>
-            </a:r>
-          </a:p>
-          <a:p>
-            <a:r>
-              <a:rPr lang="en-US" sz="1250" dirty="0"/>
-              <a:t>/pr/venv/lib/python3.11/site-packages/pandas/_libs/parsers.cpython-311-x86_64-linux-gnu.so</a:t>
-            </a:r>
-          </a:p>
-          <a:p>
-            <a:r>
-              <a:rPr lang="en-US" sz="1250" dirty="0"/>
-              <a:t>/pr/venv/lib/python3.11/site-packages/pandas/_libs/testing.cpython-311-x86_64-linux-gnu.so</a:t>
-            </a:r>
-          </a:p>
-          <a:p>
-            <a:r>
-              <a:rPr lang="en-US" sz="1250" dirty="0"/>
-              <a:t>/home/pr/venv/lib/python3.11/site-packages/matplotlib/_c_internal_utils.cpython-311-x86_64-linux-gnu.so</a:t>
-            </a:r>
-          </a:p>
-          <a:p>
-            <a:r>
-              <a:rPr lang="en-US" sz="1250" dirty="0"/>
-              <a:t>/home/pr/venv/lib/python3.11/site-packages/PIL/_imaging.cpython-311-x86_64-linux-gnu.so</a:t>
+              <a:t>/libopenblas64_p-r0-0cf96a72.3.23.dev.so</a:t>
             </a:r>
           </a:p>
           <a:p>
@@ -8887,11 +8545,11 @@
             </a:r>
             <a:r>
               <a:rPr lang="en-US" sz="1250" dirty="0" err="1"/>
-              <a:t>Pillow.libs</a:t>
-            </a:r>
-            <a:r>
-              <a:rPr lang="en-US" sz="1250" dirty="0"/>
-              <a:t>/libtiff-91af027d.so.6.0.2</a:t>
+              <a:t>numpy.libs</a:t>
+            </a:r>
+            <a:r>
+              <a:rPr lang="en-US" sz="1250" dirty="0"/>
+              <a:t>/libgfortran-040039e1.so.5.0.0</a:t>
             </a:r>
           </a:p>
           <a:p>
@@ -8909,11 +8567,11 @@
             </a:r>
             <a:r>
               <a:rPr lang="en-US" sz="1250" dirty="0" err="1"/>
-              <a:t>Pillow.libs</a:t>
-            </a:r>
-            <a:r>
-              <a:rPr lang="en-US" sz="1250" dirty="0"/>
-              <a:t>/libjpeg-32b76cef.so.62.4.0</a:t>
+              <a:t>numpy.libs</a:t>
+            </a:r>
+            <a:r>
+              <a:rPr lang="en-US" sz="1250" dirty="0"/>
+              <a:t>/libquadmath-96973f99.so.0.0.0</a:t>
             </a:r>
           </a:p>
           <a:p>
@@ -8931,11 +8589,11 @@
             </a:r>
             <a:r>
               <a:rPr lang="en-US" sz="1250" dirty="0" err="1"/>
-              <a:t>Pillow.libs</a:t>
-            </a:r>
-            <a:r>
-              <a:rPr lang="en-US" sz="1250" dirty="0"/>
-              <a:t>/libopenjp2-20e347f0.so.2.5.0</a:t>
+              <a:t>numpy</a:t>
+            </a:r>
+            <a:r>
+              <a:rPr lang="en-US" sz="1250" dirty="0"/>
+              <a:t>/core/_multiarray_tests.cpython-311-x86_64-linux-gnu.so</a:t>
             </a:r>
           </a:p>
           <a:p>
@@ -8953,11 +8611,19 @@
             </a:r>
             <a:r>
               <a:rPr lang="en-US" sz="1250" dirty="0" err="1"/>
-              <a:t>Pillow.libs</a:t>
-            </a:r>
-            <a:r>
-              <a:rPr lang="en-US" sz="1250" dirty="0"/>
-              <a:t>/libxcb-f0538cc0.so.1.1.0</a:t>
+              <a:t>numpy</a:t>
+            </a:r>
+            <a:r>
+              <a:rPr lang="en-US" sz="1250" dirty="0"/>
+              <a:t>/</a:t>
+            </a:r>
+            <a:r>
+              <a:rPr lang="en-US" sz="1250" dirty="0" err="1"/>
+              <a:t>linalg</a:t>
+            </a:r>
+            <a:r>
+              <a:rPr lang="en-US" sz="1250" dirty="0"/>
+              <a:t>/_umath_linalg.cpython-311-x86_64-linux-gnu.so</a:t>
             </a:r>
           </a:p>
           <a:p>
@@ -8975,11 +8641,19 @@
             </a:r>
             <a:r>
               <a:rPr lang="en-US" sz="1250" dirty="0" err="1"/>
-              <a:t>Pillow.libs</a:t>
-            </a:r>
-            <a:r>
-              <a:rPr lang="en-US" sz="1250" dirty="0"/>
-              <a:t>/liblzma-1e44b93d.so.5.4.4</a:t>
+              <a:t>numpy</a:t>
+            </a:r>
+            <a:r>
+              <a:rPr lang="en-US" sz="1250" dirty="0"/>
+              <a:t>/</a:t>
+            </a:r>
+            <a:r>
+              <a:rPr lang="en-US" sz="1250" dirty="0" err="1"/>
+              <a:t>fft</a:t>
+            </a:r>
+            <a:r>
+              <a:rPr lang="en-US" sz="1250" dirty="0"/>
+              <a:t>/_pocketfft_internal.cpython-311-x86_64-linux-gnu.so</a:t>
             </a:r>
           </a:p>
           <a:p>
@@ -8997,35 +8671,1113 @@
             </a:r>
             <a:r>
               <a:rPr lang="en-US" sz="1250" dirty="0" err="1"/>
+              <a:t>numpy</a:t>
+            </a:r>
+            <a:r>
+              <a:rPr lang="en-US" sz="1250" dirty="0"/>
+              <a:t>/random/mtrand.cpython-311-x86_64-linux-gnu.so</a:t>
+            </a:r>
+          </a:p>
+          <a:p>
+            <a:r>
+              <a:rPr lang="en-US" sz="1250" dirty="0"/>
+              <a:t>/home/pr/</a:t>
+            </a:r>
+            <a:r>
+              <a:rPr lang="en-US" sz="1250" dirty="0" err="1"/>
+              <a:t>venv</a:t>
+            </a:r>
+            <a:r>
+              <a:rPr lang="en-US" sz="1250" dirty="0"/>
+              <a:t>/lib/python3.11/site-packages/</a:t>
+            </a:r>
+            <a:r>
+              <a:rPr lang="en-US" sz="1250" dirty="0" err="1"/>
+              <a:t>numpy</a:t>
+            </a:r>
+            <a:r>
+              <a:rPr lang="en-US" sz="1250" dirty="0"/>
+              <a:t>/random/bit_generator.cpython-311-x86_64-linux-gnu.so</a:t>
+            </a:r>
+          </a:p>
+          <a:p>
+            <a:r>
+              <a:rPr lang="en-US" sz="1250" dirty="0"/>
+              <a:t>/home/pr/</a:t>
+            </a:r>
+            <a:r>
+              <a:rPr lang="en-US" sz="1250" dirty="0" err="1"/>
+              <a:t>venv</a:t>
+            </a:r>
+            <a:r>
+              <a:rPr lang="en-US" sz="1250" dirty="0"/>
+              <a:t>/lib/python3.11/site-packages/</a:t>
+            </a:r>
+            <a:r>
+              <a:rPr lang="en-US" sz="1250" dirty="0" err="1"/>
+              <a:t>numpy</a:t>
+            </a:r>
+            <a:r>
+              <a:rPr lang="en-US" sz="1250" dirty="0"/>
+              <a:t>/random/_common.cpython-311-x86_64-linux-gnu.so</a:t>
+            </a:r>
+          </a:p>
+          <a:p>
+            <a:r>
+              <a:rPr lang="en-US" sz="1250" dirty="0"/>
+              <a:t>/home/pr/</a:t>
+            </a:r>
+            <a:r>
+              <a:rPr lang="en-US" sz="1250" dirty="0" err="1"/>
+              <a:t>venv</a:t>
+            </a:r>
+            <a:r>
+              <a:rPr lang="en-US" sz="1250" dirty="0"/>
+              <a:t>/lib/python3.11/site-packages/</a:t>
+            </a:r>
+            <a:r>
+              <a:rPr lang="en-US" sz="1250" dirty="0" err="1"/>
+              <a:t>numpy</a:t>
+            </a:r>
+            <a:r>
+              <a:rPr lang="en-US" sz="1250" dirty="0"/>
+              <a:t>/random/_bounded_integers.cpython-311-x86_64-linux-gnu.so</a:t>
+            </a:r>
+          </a:p>
+          <a:p>
+            <a:r>
+              <a:rPr lang="en-US" sz="1250" dirty="0"/>
+              <a:t>/home/pr/</a:t>
+            </a:r>
+            <a:r>
+              <a:rPr lang="en-US" sz="1250" dirty="0" err="1"/>
+              <a:t>venv</a:t>
+            </a:r>
+            <a:r>
+              <a:rPr lang="en-US" sz="1250" dirty="0"/>
+              <a:t>/lib/python3.11/site-packages/</a:t>
+            </a:r>
+            <a:r>
+              <a:rPr lang="en-US" sz="1250" dirty="0" err="1"/>
+              <a:t>numpy</a:t>
+            </a:r>
+            <a:r>
+              <a:rPr lang="en-US" sz="1250" dirty="0"/>
+              <a:t>/random/_mt19937.cpython-311-x86_64-linux-gnu.so</a:t>
+            </a:r>
+          </a:p>
+          <a:p>
+            <a:r>
+              <a:rPr lang="en-US" sz="1250" dirty="0"/>
+              <a:t>/home/pr/</a:t>
+            </a:r>
+            <a:r>
+              <a:rPr lang="en-US" sz="1250" dirty="0" err="1"/>
+              <a:t>venv</a:t>
+            </a:r>
+            <a:r>
+              <a:rPr lang="en-US" sz="1250" dirty="0"/>
+              <a:t>/lib/python3.11/site-packages/</a:t>
+            </a:r>
+            <a:r>
+              <a:rPr lang="en-US" sz="1250" dirty="0" err="1"/>
+              <a:t>numpy</a:t>
+            </a:r>
+            <a:r>
+              <a:rPr lang="en-US" sz="1250" dirty="0"/>
+              <a:t>/random/_philox.cpython-311-x86_64-linux-gnu.so</a:t>
+            </a:r>
+          </a:p>
+          <a:p>
+            <a:r>
+              <a:rPr lang="en-US" sz="1250" dirty="0"/>
+              <a:t>/home/pr/</a:t>
+            </a:r>
+            <a:r>
+              <a:rPr lang="en-US" sz="1250" dirty="0" err="1"/>
+              <a:t>venv</a:t>
+            </a:r>
+            <a:r>
+              <a:rPr lang="en-US" sz="1250" dirty="0"/>
+              <a:t>/lib/python3.11/site-packages/</a:t>
+            </a:r>
+            <a:r>
+              <a:rPr lang="en-US" sz="1250" dirty="0" err="1"/>
+              <a:t>numpy</a:t>
+            </a:r>
+            <a:r>
+              <a:rPr lang="en-US" sz="1250" dirty="0"/>
+              <a:t>/random/_pcg64.cpython-311-x86_64-linux-gnu.so</a:t>
+            </a:r>
+          </a:p>
+          <a:p>
+            <a:r>
+              <a:rPr lang="en-US" sz="1250" dirty="0"/>
+              <a:t>/home/pr/</a:t>
+            </a:r>
+            <a:r>
+              <a:rPr lang="en-US" sz="1250" dirty="0" err="1"/>
+              <a:t>venv</a:t>
+            </a:r>
+            <a:r>
+              <a:rPr lang="en-US" sz="1250" dirty="0"/>
+              <a:t>/lib/python3.11/site-packages/</a:t>
+            </a:r>
+            <a:r>
+              <a:rPr lang="en-US" sz="1250" dirty="0" err="1"/>
+              <a:t>numpy</a:t>
+            </a:r>
+            <a:r>
+              <a:rPr lang="en-US" sz="1250" dirty="0"/>
+              <a:t>/random/_sfc64.cpython-311-x86_64-linux-gnu.so</a:t>
+            </a:r>
+          </a:p>
+          <a:p>
+            <a:r>
+              <a:rPr lang="en-US" sz="1250" dirty="0"/>
+              <a:t>/home/pr/</a:t>
+            </a:r>
+            <a:r>
+              <a:rPr lang="en-US" sz="1250" dirty="0" err="1"/>
+              <a:t>venv</a:t>
+            </a:r>
+            <a:r>
+              <a:rPr lang="en-US" sz="1250" dirty="0"/>
+              <a:t>/lib/python3.11/site-packages/</a:t>
+            </a:r>
+            <a:r>
+              <a:rPr lang="en-US" sz="1250" dirty="0" err="1"/>
+              <a:t>numpy</a:t>
+            </a:r>
+            <a:r>
+              <a:rPr lang="en-US" sz="1250" dirty="0"/>
+              <a:t>/random/_generator.cpython-311-x86_64-linux-gnu.so</a:t>
+            </a:r>
+          </a:p>
+          <a:p>
+            <a:r>
+              <a:rPr lang="en-US" sz="1250" dirty="0"/>
+              <a:t>/home/pr/</a:t>
+            </a:r>
+            <a:r>
+              <a:rPr lang="en-US" sz="1250" dirty="0" err="1"/>
+              <a:t>venv</a:t>
+            </a:r>
+            <a:r>
+              <a:rPr lang="en-US" sz="1250" dirty="0"/>
+              <a:t>/lib/python3.11/site-packages/pandas/_libs/pandas_parser.cpython-311-x86_64-linux-gnu.so</a:t>
+            </a:r>
+          </a:p>
+          <a:p>
+            <a:r>
+              <a:rPr lang="en-US" sz="1250" dirty="0"/>
+              <a:t>/home/pr/</a:t>
+            </a:r>
+            <a:r>
+              <a:rPr lang="en-US" sz="1250" dirty="0" err="1"/>
+              <a:t>venv</a:t>
+            </a:r>
+            <a:r>
+              <a:rPr lang="en-US" sz="1250" dirty="0"/>
+              <a:t>/lib/python3.11/site-packages/pandas/_libs/pandas_datetime.cpython-311-x86_64-linux-gnu.so</a:t>
+            </a:r>
+          </a:p>
+          <a:p>
+            <a:r>
+              <a:rPr lang="en-US" sz="1250" dirty="0"/>
+              <a:t>/home/pr/</a:t>
+            </a:r>
+            <a:r>
+              <a:rPr lang="en-US" sz="1250" dirty="0" err="1"/>
+              <a:t>venv</a:t>
+            </a:r>
+            <a:r>
+              <a:rPr lang="en-US" sz="1250" dirty="0"/>
+              <a:t>/lib/python3.11/site-packages/pandas/_libs/interval.cpython-311-x86_64-linux-gnu.so</a:t>
+            </a:r>
+          </a:p>
+          <a:p>
+            <a:r>
+              <a:rPr lang="en-US" sz="1250" dirty="0"/>
+              <a:t>/home/pr/</a:t>
+            </a:r>
+            <a:r>
+              <a:rPr lang="en-US" sz="1250" dirty="0" err="1"/>
+              <a:t>venv</a:t>
+            </a:r>
+            <a:r>
+              <a:rPr lang="en-US" sz="1250" dirty="0"/>
+              <a:t>/lib/python3.11/site-packages/pandas/_libs/hashtable.cpython-311-x86_64-linux-gnu.so</a:t>
+            </a:r>
+          </a:p>
+          <a:p>
+            <a:r>
+              <a:rPr lang="en-US" sz="1250" dirty="0"/>
+              <a:t>/home/pr/</a:t>
+            </a:r>
+            <a:r>
+              <a:rPr lang="en-US" sz="1250" dirty="0" err="1"/>
+              <a:t>venv</a:t>
+            </a:r>
+            <a:r>
+              <a:rPr lang="en-US" sz="1250" dirty="0"/>
+              <a:t>/lib/python3.11/site-packages/pandas/_libs/missing.cpython-311-x86_64-linux-gnu.so</a:t>
+            </a:r>
+          </a:p>
+          <a:p>
+            <a:r>
+              <a:rPr lang="en-US" sz="1250" dirty="0"/>
+              <a:t>/home/pr/</a:t>
+            </a:r>
+            <a:r>
+              <a:rPr lang="en-US" sz="1250" dirty="0" err="1"/>
+              <a:t>venv</a:t>
+            </a:r>
+            <a:r>
+              <a:rPr lang="en-US" sz="1250" dirty="0"/>
+              <a:t>/lib/python3.11/site-packages/pandas/_libs/</a:t>
+            </a:r>
+            <a:r>
+              <a:rPr lang="en-US" sz="1250" dirty="0" err="1"/>
+              <a:t>tslibs</a:t>
+            </a:r>
+            <a:r>
+              <a:rPr lang="en-US" sz="1250" dirty="0"/>
+              <a:t>/dtypes.cpython-311-x86_64-linux-gnu.so</a:t>
+            </a:r>
+          </a:p>
+          <a:p>
+            <a:r>
+              <a:rPr lang="en-US" sz="1250" dirty="0"/>
+              <a:t>/home/pr/</a:t>
+            </a:r>
+            <a:r>
+              <a:rPr lang="en-US" sz="1250" dirty="0" err="1"/>
+              <a:t>venv</a:t>
+            </a:r>
+            <a:r>
+              <a:rPr lang="en-US" sz="1250" dirty="0"/>
+              <a:t>/lib/python3.11/site-packages/pandas/_libs/</a:t>
+            </a:r>
+            <a:r>
+              <a:rPr lang="en-US" sz="1250" dirty="0" err="1"/>
+              <a:t>tslibs</a:t>
+            </a:r>
+            <a:r>
+              <a:rPr lang="en-US" sz="1250" dirty="0"/>
+              <a:t>/np_datetime.cpython-311-x86_64-linux-gnu.so</a:t>
+            </a:r>
+          </a:p>
+          <a:p>
+            <a:r>
+              <a:rPr lang="en-US" sz="1250" dirty="0"/>
+              <a:t>/home/pr/</a:t>
+            </a:r>
+            <a:r>
+              <a:rPr lang="en-US" sz="1250" dirty="0" err="1"/>
+              <a:t>venv</a:t>
+            </a:r>
+            <a:r>
+              <a:rPr lang="en-US" sz="1250" dirty="0"/>
+              <a:t>/lib/python3.11/site-packages/pandas/_libs/</a:t>
+            </a:r>
+            <a:r>
+              <a:rPr lang="en-US" sz="1250" dirty="0" err="1"/>
+              <a:t>tslibs</a:t>
+            </a:r>
+            <a:r>
+              <a:rPr lang="en-US" sz="1250" dirty="0"/>
+              <a:t>/conversion.cpython-311-x86_64-linux-gnu.so</a:t>
+            </a:r>
+          </a:p>
+          <a:p>
+            <a:r>
+              <a:rPr lang="en-US" sz="1250" dirty="0"/>
+              <a:t>/home/pr/</a:t>
+            </a:r>
+            <a:r>
+              <a:rPr lang="en-US" sz="1250" dirty="0" err="1"/>
+              <a:t>venv</a:t>
+            </a:r>
+            <a:r>
+              <a:rPr lang="en-US" sz="1250" dirty="0"/>
+              <a:t>/lib/python3.11/site-packages/pandas/_libs/</a:t>
+            </a:r>
+            <a:r>
+              <a:rPr lang="en-US" sz="1250" dirty="0" err="1"/>
+              <a:t>tslibs</a:t>
+            </a:r>
+            <a:r>
+              <a:rPr lang="en-US" sz="1250" dirty="0"/>
+              <a:t>/base.cpython-311-x86_64-linux-gnu.so</a:t>
+            </a:r>
+          </a:p>
+          <a:p>
+            <a:r>
+              <a:rPr lang="en-US" sz="1250" dirty="0"/>
+              <a:t>/home/pr/</a:t>
+            </a:r>
+            <a:r>
+              <a:rPr lang="en-US" sz="1250" dirty="0" err="1"/>
+              <a:t>venv</a:t>
+            </a:r>
+            <a:r>
+              <a:rPr lang="en-US" sz="1250" dirty="0"/>
+              <a:t>/lib/python3.11/site-packages/pandas/_libs/</a:t>
+            </a:r>
+            <a:r>
+              <a:rPr lang="en-US" sz="1250" dirty="0" err="1"/>
+              <a:t>tslibs</a:t>
+            </a:r>
+            <a:r>
+              <a:rPr lang="en-US" sz="1250" dirty="0"/>
+              <a:t>/offsets.cpython-311-x86_64-linux-gnu.so</a:t>
+            </a:r>
+          </a:p>
+          <a:p>
+            <a:r>
+              <a:rPr lang="en-US" sz="1250" dirty="0"/>
+              <a:t>/home/pr/</a:t>
+            </a:r>
+            <a:r>
+              <a:rPr lang="en-US" sz="1250" dirty="0" err="1"/>
+              <a:t>venv</a:t>
+            </a:r>
+            <a:r>
+              <a:rPr lang="en-US" sz="1250" dirty="0"/>
+              <a:t>/lib/python3.11/site-packages/pandas/_libs/</a:t>
+            </a:r>
+            <a:r>
+              <a:rPr lang="en-US" sz="1250" dirty="0" err="1"/>
+              <a:t>tslibs</a:t>
+            </a:r>
+            <a:r>
+              <a:rPr lang="en-US" sz="1250" dirty="0"/>
+              <a:t>/timestamps.cpython-311-x86_64-linux-gnu.so</a:t>
+            </a:r>
+          </a:p>
+          <a:p>
+            <a:r>
+              <a:rPr lang="en-US" sz="1250" dirty="0"/>
+              <a:t>/home/pr/</a:t>
+            </a:r>
+            <a:r>
+              <a:rPr lang="en-US" sz="1250" dirty="0" err="1"/>
+              <a:t>venv</a:t>
+            </a:r>
+            <a:r>
+              <a:rPr lang="en-US" sz="1250" dirty="0"/>
+              <a:t>/lib/python3.11/site-packages/pandas/_libs/</a:t>
+            </a:r>
+            <a:r>
+              <a:rPr lang="en-US" sz="1250" dirty="0" err="1"/>
+              <a:t>tslibs</a:t>
+            </a:r>
+            <a:r>
+              <a:rPr lang="en-US" sz="1250" dirty="0"/>
+              <a:t>/nattype.cpython-311-x86_64-linux-gnu.so</a:t>
+            </a:r>
+          </a:p>
+          <a:p>
+            <a:r>
+              <a:rPr lang="en-US" sz="1250" dirty="0"/>
+              <a:t>/home/pr/</a:t>
+            </a:r>
+            <a:r>
+              <a:rPr lang="en-US" sz="1250" dirty="0" err="1"/>
+              <a:t>venv</a:t>
+            </a:r>
+            <a:r>
+              <a:rPr lang="en-US" sz="1250" dirty="0"/>
+              <a:t>/lib/python3.11/site-packages/pandas/_libs/</a:t>
+            </a:r>
+            <a:r>
+              <a:rPr lang="en-US" sz="1250" dirty="0" err="1"/>
+              <a:t>tslibs</a:t>
+            </a:r>
+            <a:r>
+              <a:rPr lang="en-US" sz="1250" dirty="0"/>
+              <a:t>/timedeltas.cpython-311-x86_64-linux-gnu.so</a:t>
+            </a:r>
+          </a:p>
+          <a:p>
+            <a:r>
+              <a:rPr lang="en-US" sz="1250" dirty="0"/>
+              <a:t>/home/pr/</a:t>
+            </a:r>
+            <a:r>
+              <a:rPr lang="en-US" sz="1250" dirty="0" err="1"/>
+              <a:t>venv</a:t>
+            </a:r>
+            <a:r>
+              <a:rPr lang="en-US" sz="1250" dirty="0"/>
+              <a:t>/lib/python3.11/site-packages/pandas/_libs/</a:t>
+            </a:r>
+            <a:r>
+              <a:rPr lang="en-US" sz="1250" dirty="0" err="1"/>
+              <a:t>tslibs</a:t>
+            </a:r>
+            <a:r>
+              <a:rPr lang="en-US" sz="1250" dirty="0"/>
+              <a:t>/timezones.cpython-311-x86_64-linux-gnu.so</a:t>
+            </a:r>
+          </a:p>
+          <a:p>
+            <a:r>
+              <a:rPr lang="en-US" sz="1250" dirty="0"/>
+              <a:t>/home/pr/</a:t>
+            </a:r>
+            <a:r>
+              <a:rPr lang="en-US" sz="1250" dirty="0" err="1"/>
+              <a:t>venv</a:t>
+            </a:r>
+            <a:r>
+              <a:rPr lang="en-US" sz="1250" dirty="0"/>
+              <a:t>/lib/python3.11/site-packages/pandas/_libs/</a:t>
+            </a:r>
+            <a:r>
+              <a:rPr lang="en-US" sz="1250" dirty="0" err="1"/>
+              <a:t>tslibs</a:t>
+            </a:r>
+            <a:r>
+              <a:rPr lang="en-US" sz="1250" dirty="0"/>
+              <a:t>/fields.cpython-311-x86_64-linux-gnu.so</a:t>
+            </a:r>
+          </a:p>
+          <a:p>
+            <a:r>
+              <a:rPr lang="en-US" sz="1250" dirty="0"/>
+              <a:t>/home/pr/</a:t>
+            </a:r>
+            <a:r>
+              <a:rPr lang="en-US" sz="1250" dirty="0" err="1"/>
+              <a:t>venv</a:t>
+            </a:r>
+            <a:r>
+              <a:rPr lang="en-US" sz="1250" dirty="0"/>
+              <a:t>/lib/python3.11/site-packages/pandas/_libs/</a:t>
+            </a:r>
+            <a:r>
+              <a:rPr lang="en-US" sz="1250" dirty="0" err="1"/>
+              <a:t>tslibs</a:t>
+            </a:r>
+            <a:r>
+              <a:rPr lang="en-US" sz="1250" dirty="0"/>
+              <a:t>/ccalendar.cpython-311-x86_64-linux-gnu.so</a:t>
+            </a:r>
+          </a:p>
+          <a:p>
+            <a:r>
+              <a:rPr lang="en-US" sz="1250" dirty="0"/>
+              <a:t>/home/pr/</a:t>
+            </a:r>
+            <a:r>
+              <a:rPr lang="en-US" sz="1250" dirty="0" err="1"/>
+              <a:t>venv</a:t>
+            </a:r>
+            <a:r>
+              <a:rPr lang="en-US" sz="1250" dirty="0"/>
+              <a:t>/lib/python3.11/site-packages/pandas/_libs/</a:t>
+            </a:r>
+            <a:r>
+              <a:rPr lang="en-US" sz="1250" dirty="0" err="1"/>
+              <a:t>tslibs</a:t>
+            </a:r>
+            <a:r>
+              <a:rPr lang="en-US" sz="1250" dirty="0"/>
+              <a:t>/tzconversion.cpython-311-x86_64-linux-gnu.so</a:t>
+            </a:r>
+          </a:p>
+          <a:p>
+            <a:r>
+              <a:rPr lang="en-US" sz="1250" dirty="0"/>
+              <a:t>/home/pr/</a:t>
+            </a:r>
+            <a:r>
+              <a:rPr lang="en-US" sz="1250" dirty="0" err="1"/>
+              <a:t>venv</a:t>
+            </a:r>
+            <a:r>
+              <a:rPr lang="en-US" sz="1250" dirty="0"/>
+              <a:t>/lib/python3.11/site-packages/pandas/_libs/properties.cpython-311-x86_64-linux-gnu.so</a:t>
+            </a:r>
+          </a:p>
+          <a:p>
+            <a:r>
+              <a:rPr lang="en-US" sz="1250" dirty="0"/>
+              <a:t>/home/pr/</a:t>
+            </a:r>
+            <a:r>
+              <a:rPr lang="en-US" sz="1250" dirty="0" err="1"/>
+              <a:t>venv</a:t>
+            </a:r>
+            <a:r>
+              <a:rPr lang="en-US" sz="1250" dirty="0"/>
+              <a:t>/lib/python3.11/site-packages/pandas/_libs/</a:t>
+            </a:r>
+            <a:r>
+              <a:rPr lang="en-US" sz="1250" dirty="0" err="1"/>
+              <a:t>tslibs</a:t>
+            </a:r>
+            <a:r>
+              <a:rPr lang="en-US" sz="1250" dirty="0"/>
+              <a:t>/parsing.cpython-311-x86_64-linux-gnu.so</a:t>
+            </a:r>
+          </a:p>
+          <a:p>
+            <a:r>
+              <a:rPr lang="en-US" sz="1250" dirty="0"/>
+              <a:t>/home/pr/</a:t>
+            </a:r>
+            <a:r>
+              <a:rPr lang="en-US" sz="1250" dirty="0" err="1"/>
+              <a:t>venv</a:t>
+            </a:r>
+            <a:r>
+              <a:rPr lang="en-US" sz="1250" dirty="0"/>
+              <a:t>/lib/python3.11/site-packages/pandas/_libs/</a:t>
+            </a:r>
+            <a:r>
+              <a:rPr lang="en-US" sz="1250" dirty="0" err="1"/>
+              <a:t>tslibs</a:t>
+            </a:r>
+            <a:r>
+              <a:rPr lang="en-US" sz="1250" dirty="0"/>
+              <a:t>/strptime.cpython-311-x86_64-linux-gnu.so</a:t>
+            </a:r>
+          </a:p>
+          <a:p>
+            <a:r>
+              <a:rPr lang="en-US" sz="1250" dirty="0"/>
+              <a:t>/home/pr/</a:t>
+            </a:r>
+            <a:r>
+              <a:rPr lang="en-US" sz="1250" dirty="0" err="1"/>
+              <a:t>venv</a:t>
+            </a:r>
+            <a:r>
+              <a:rPr lang="en-US" sz="1250" dirty="0"/>
+              <a:t>/lib/python3.11/site-packages/pandas/_libs/</a:t>
+            </a:r>
+            <a:r>
+              <a:rPr lang="en-US" sz="1250" dirty="0" err="1"/>
+              <a:t>tslibs</a:t>
+            </a:r>
+            <a:r>
+              <a:rPr lang="en-US" sz="1250" dirty="0"/>
+              <a:t>/period.cpython-311-x86_64-linux-gnu.so</a:t>
+            </a:r>
+          </a:p>
+          <a:p>
+            <a:r>
+              <a:rPr lang="en-US" sz="1250" dirty="0"/>
+              <a:t>/home/pr/</a:t>
+            </a:r>
+            <a:r>
+              <a:rPr lang="en-US" sz="1250" dirty="0" err="1"/>
+              <a:t>venv</a:t>
+            </a:r>
+            <a:r>
+              <a:rPr lang="en-US" sz="1250" dirty="0"/>
+              <a:t>/lib/python3.11/site-packages/pandas/_libs/</a:t>
+            </a:r>
+            <a:r>
+              <a:rPr lang="en-US" sz="1250" dirty="0" err="1"/>
+              <a:t>tslibs</a:t>
+            </a:r>
+            <a:r>
+              <a:rPr lang="en-US" sz="1250" dirty="0"/>
+              <a:t>/vectorized.cpython-311-x86_64-linux-gnu.so</a:t>
+            </a:r>
+          </a:p>
+          <a:p>
+            <a:r>
+              <a:rPr lang="en-US" sz="1250" dirty="0"/>
+              <a:t>/home/pr/</a:t>
+            </a:r>
+            <a:r>
+              <a:rPr lang="en-US" sz="1250" dirty="0" err="1"/>
+              <a:t>venv</a:t>
+            </a:r>
+            <a:r>
+              <a:rPr lang="en-US" sz="1250" dirty="0"/>
+              <a:t>/lib/python3.11/site-packages/pandas/_libs/ops_dispatch.cpython-311-x86_64-linux-gnu.so</a:t>
+            </a:r>
+          </a:p>
+          <a:p>
+            <a:r>
+              <a:rPr lang="en-US" sz="1250" dirty="0"/>
+              <a:t>/home/pr/</a:t>
+            </a:r>
+            <a:r>
+              <a:rPr lang="en-US" sz="1250" dirty="0" err="1"/>
+              <a:t>venv</a:t>
+            </a:r>
+            <a:r>
+              <a:rPr lang="en-US" sz="1250" dirty="0"/>
+              <a:t>/lib/python3.11/site-packages/pandas/_libs/algos.cpython-311-x86_64-linux-gnu.so</a:t>
+            </a:r>
+          </a:p>
+          <a:p>
+            <a:r>
+              <a:rPr lang="en-US" sz="1250" dirty="0"/>
+              <a:t>/home/pr/</a:t>
+            </a:r>
+            <a:r>
+              <a:rPr lang="en-US" sz="1250" dirty="0" err="1"/>
+              <a:t>venv</a:t>
+            </a:r>
+            <a:r>
+              <a:rPr lang="en-US" sz="1250" dirty="0"/>
+              <a:t>/lib/python3.11/site-packages/pandas/_libs/lib.cpython-311-x86_64-linux-gnu.so</a:t>
+            </a:r>
+          </a:p>
+          <a:p>
+            <a:r>
+              <a:rPr lang="en-US" sz="1250" dirty="0"/>
+              <a:t>/home/pr/</a:t>
+            </a:r>
+            <a:r>
+              <a:rPr lang="en-US" sz="1250" dirty="0" err="1"/>
+              <a:t>venv</a:t>
+            </a:r>
+            <a:r>
+              <a:rPr lang="en-US" sz="1250" dirty="0"/>
+              <a:t>/lib/python3.11/site-packages/pandas/_libs/ops.cpython-311-x86_64-linux-gnu.so</a:t>
+            </a:r>
+          </a:p>
+          <a:p>
+            <a:r>
+              <a:rPr lang="en-US" sz="1250" dirty="0"/>
+              <a:t>/home/pr/</a:t>
+            </a:r>
+            <a:r>
+              <a:rPr lang="en-US" sz="1250" dirty="0" err="1"/>
+              <a:t>venv</a:t>
+            </a:r>
+            <a:r>
+              <a:rPr lang="en-US" sz="1250" dirty="0"/>
+              <a:t>/lib/python3.11/site-packages/pandas/_libs/arrays.cpython-311-x86_64-linux-gnu.so</a:t>
+            </a:r>
+          </a:p>
+          <a:p>
+            <a:r>
+              <a:rPr lang="en-US" sz="1250" dirty="0"/>
+              <a:t>/home/pr/</a:t>
+            </a:r>
+            <a:r>
+              <a:rPr lang="en-US" sz="1250" dirty="0" err="1"/>
+              <a:t>venv</a:t>
+            </a:r>
+            <a:r>
+              <a:rPr lang="en-US" sz="1250" dirty="0"/>
+              <a:t>/lib/python3.11/site-packages/pandas/_libs/tslib.cpython-311-x86_64-linux-gnu.so</a:t>
+            </a:r>
+          </a:p>
+          <a:p>
+            <a:r>
+              <a:rPr lang="en-US" sz="1250" dirty="0"/>
+              <a:t>/home/pr/</a:t>
+            </a:r>
+            <a:r>
+              <a:rPr lang="en-US" sz="1250" dirty="0" err="1"/>
+              <a:t>venv</a:t>
+            </a:r>
+            <a:r>
+              <a:rPr lang="en-US" sz="1250" dirty="0"/>
+              <a:t>/lib/python3.11/site-packages/pandas/_libs/sparse.cpython-311-x86_64-linux-gnu.so</a:t>
+            </a:r>
+          </a:p>
+          <a:p>
+            <a:r>
+              <a:rPr lang="en-US" sz="1250" dirty="0"/>
+              <a:t>/home/pr/</a:t>
+            </a:r>
+            <a:r>
+              <a:rPr lang="en-US" sz="1250" dirty="0" err="1"/>
+              <a:t>venv</a:t>
+            </a:r>
+            <a:r>
+              <a:rPr lang="en-US" sz="1250" dirty="0"/>
+              <a:t>/lib/python3.11/site-packages/pandas/_libs/indexing.cpython-311-x86_64-linux-gnu.so</a:t>
+            </a:r>
+          </a:p>
+          <a:p>
+            <a:r>
+              <a:rPr lang="en-US" sz="1250" dirty="0"/>
+              <a:t>/home/pr/</a:t>
+            </a:r>
+            <a:r>
+              <a:rPr lang="en-US" sz="1250" dirty="0" err="1"/>
+              <a:t>venv</a:t>
+            </a:r>
+            <a:r>
+              <a:rPr lang="en-US" sz="1250" dirty="0"/>
+              <a:t>/lib/python3.11/site-packages/pandas/_libs/index.cpython-311-x86_64-linux-gnu.so</a:t>
+            </a:r>
+          </a:p>
+          <a:p>
+            <a:r>
+              <a:rPr lang="en-US" sz="1250" dirty="0"/>
+              <a:t>/home/pr/</a:t>
+            </a:r>
+            <a:r>
+              <a:rPr lang="en-US" sz="1250" dirty="0" err="1"/>
+              <a:t>venv</a:t>
+            </a:r>
+            <a:r>
+              <a:rPr lang="en-US" sz="1250" dirty="0"/>
+              <a:t>/lib/python3.11/site-packages/pandas/_libs/internals.cpython-311-x86_64-linux-gnu.so</a:t>
+            </a:r>
+          </a:p>
+          <a:p>
+            <a:r>
+              <a:rPr lang="en-US" sz="1250" dirty="0"/>
+              <a:t>/home/pr/</a:t>
+            </a:r>
+            <a:r>
+              <a:rPr lang="en-US" sz="1250" dirty="0" err="1"/>
+              <a:t>venv</a:t>
+            </a:r>
+            <a:r>
+              <a:rPr lang="en-US" sz="1250" dirty="0"/>
+              <a:t>/lib/python3.11/site-packages/pandas/_libs/join.cpython-311-x86_64-linux-gnu.so</a:t>
+            </a:r>
+          </a:p>
+          <a:p>
+            <a:r>
+              <a:rPr lang="en-US" sz="1250" dirty="0"/>
+              <a:t>/home/pr/</a:t>
+            </a:r>
+            <a:r>
+              <a:rPr lang="en-US" sz="1250" dirty="0" err="1"/>
+              <a:t>venv</a:t>
+            </a:r>
+            <a:r>
+              <a:rPr lang="en-US" sz="1250" dirty="0"/>
+              <a:t>/lib/python3.11/site-packages/pandas/_libs/writers.cpython-311-x86_64-linux-gnu.so</a:t>
+            </a:r>
+          </a:p>
+          <a:p>
+            <a:r>
+              <a:rPr lang="en-US" sz="1250" dirty="0"/>
+              <a:t>/home/pr/</a:t>
+            </a:r>
+            <a:r>
+              <a:rPr lang="en-US" sz="1250" dirty="0" err="1"/>
+              <a:t>venv</a:t>
+            </a:r>
+            <a:r>
+              <a:rPr lang="en-US" sz="1250" dirty="0"/>
+              <a:t>/lib/python3.11/site-packages/pandas/_libs/window/aggregations.cpython-311-x86_64-linux-gnu.so</a:t>
+            </a:r>
+          </a:p>
+          <a:p>
+            <a:r>
+              <a:rPr lang="en-US" sz="1250" dirty="0"/>
+              <a:t>/home/pr/</a:t>
+            </a:r>
+            <a:r>
+              <a:rPr lang="en-US" sz="1250" dirty="0" err="1"/>
+              <a:t>venv</a:t>
+            </a:r>
+            <a:r>
+              <a:rPr lang="en-US" sz="1250" dirty="0"/>
+              <a:t>/lib/python3.11/site-packages/pandas/_libs/window/indexers.cpython-311-x86_64-linux-gnu.so</a:t>
+            </a:r>
+          </a:p>
+          <a:p>
+            <a:r>
+              <a:rPr lang="en-US" sz="1250" dirty="0"/>
+              <a:t>/home/pr/</a:t>
+            </a:r>
+            <a:r>
+              <a:rPr lang="en-US" sz="1250" dirty="0" err="1"/>
+              <a:t>venv</a:t>
+            </a:r>
+            <a:r>
+              <a:rPr lang="en-US" sz="1250" dirty="0"/>
+              <a:t>/lib/python3.11/site-packages/pandas/_libs/reshape.cpython-311-x86_64-linux-gnu.so</a:t>
+            </a:r>
+          </a:p>
+          <a:p>
+            <a:r>
+              <a:rPr lang="en-US" sz="1250" dirty="0"/>
+              <a:t>/home/pr/</a:t>
+            </a:r>
+            <a:r>
+              <a:rPr lang="en-US" sz="1250" dirty="0" err="1"/>
+              <a:t>venv</a:t>
+            </a:r>
+            <a:r>
+              <a:rPr lang="en-US" sz="1250" dirty="0"/>
+              <a:t>/lib/python3.11/site-packages/pandas/_libs/groupby.cpython-311-x86_64-linux-gnu.so</a:t>
+            </a:r>
+          </a:p>
+          <a:p>
+            <a:r>
+              <a:rPr lang="en-US" sz="1250" dirty="0"/>
+              <a:t>/home/pr/</a:t>
+            </a:r>
+            <a:r>
+              <a:rPr lang="en-US" sz="1250" dirty="0" err="1"/>
+              <a:t>venv</a:t>
+            </a:r>
+            <a:r>
+              <a:rPr lang="en-US" sz="1250" dirty="0"/>
+              <a:t>/lib/python3.11/site-packages/pandas/_libs/json.cpython-311-x86_64-linux-gnu.so</a:t>
+            </a:r>
+          </a:p>
+          <a:p>
+            <a:r>
+              <a:rPr lang="en-US" sz="1250" dirty="0"/>
+              <a:t>/home/pr/</a:t>
+            </a:r>
+            <a:r>
+              <a:rPr lang="en-US" sz="1250" dirty="0" err="1"/>
+              <a:t>venv</a:t>
+            </a:r>
+            <a:r>
+              <a:rPr lang="en-US" sz="1250" dirty="0"/>
+              <a:t>/lib/python3.11/site-packages/pandas/_libs/parsers.cpython-311-x86_64-linux-gnu.so</a:t>
+            </a:r>
+          </a:p>
+          <a:p>
+            <a:r>
+              <a:rPr lang="en-US" sz="1250" dirty="0"/>
+              <a:t>/home/pr/</a:t>
+            </a:r>
+            <a:r>
+              <a:rPr lang="en-US" sz="1250" dirty="0" err="1"/>
+              <a:t>venv</a:t>
+            </a:r>
+            <a:r>
+              <a:rPr lang="en-US" sz="1250" dirty="0"/>
+              <a:t>/lib/python3.11/site-packages/pandas/_libs/testing.cpython-311-x86_64-linux-gnu.so</a:t>
+            </a:r>
+          </a:p>
+          <a:p>
+            <a:r>
+              <a:rPr lang="en-US" sz="1250" dirty="0"/>
+              <a:t>/home/pr/</a:t>
+            </a:r>
+            <a:r>
+              <a:rPr lang="en-US" sz="1250" dirty="0" err="1"/>
+              <a:t>venv</a:t>
+            </a:r>
+            <a:r>
+              <a:rPr lang="en-US" sz="1250" dirty="0"/>
+              <a:t>/lib/python3.11/site-packages/matplotlib/_c_internal_utils.cpython-311-x86_64-linux-gnu.so</a:t>
+            </a:r>
+          </a:p>
+          <a:p>
+            <a:r>
+              <a:rPr lang="en-US" sz="1250" dirty="0"/>
+              <a:t>/home/pr/</a:t>
+            </a:r>
+            <a:r>
+              <a:rPr lang="en-US" sz="1250" dirty="0" err="1"/>
+              <a:t>venv</a:t>
+            </a:r>
+            <a:r>
+              <a:rPr lang="en-US" sz="1250" dirty="0"/>
+              <a:t>/lib/python3.11/site-packages/PIL/_imaging.cpython-311-x86_64-linux-gnu.so</a:t>
+            </a:r>
+          </a:p>
+          <a:p>
+            <a:r>
+              <a:rPr lang="en-US" sz="1250" dirty="0"/>
+              <a:t>/home/pr/</a:t>
+            </a:r>
+            <a:r>
+              <a:rPr lang="en-US" sz="1250" dirty="0" err="1"/>
+              <a:t>venv</a:t>
+            </a:r>
+            <a:r>
+              <a:rPr lang="en-US" sz="1250" dirty="0"/>
+              <a:t>/lib/python3.11/site-packages/</a:t>
+            </a:r>
+            <a:r>
+              <a:rPr lang="en-US" sz="1250" dirty="0" err="1"/>
               <a:t>Pillow.libs</a:t>
             </a:r>
             <a:r>
               <a:rPr lang="en-US" sz="1250" dirty="0"/>
+              <a:t>/libtiff-91af027d.so.6.0.2</a:t>
+            </a:r>
+          </a:p>
+          <a:p>
+            <a:r>
+              <a:rPr lang="en-US" sz="1250" dirty="0"/>
+              <a:t>/home/pr/</a:t>
+            </a:r>
+            <a:r>
+              <a:rPr lang="en-US" sz="1250" dirty="0" err="1"/>
+              <a:t>venv</a:t>
+            </a:r>
+            <a:r>
+              <a:rPr lang="en-US" sz="1250" dirty="0"/>
+              <a:t>/lib/python3.11/site-packages/</a:t>
+            </a:r>
+            <a:r>
+              <a:rPr lang="en-US" sz="1250" dirty="0" err="1"/>
+              <a:t>Pillow.libs</a:t>
+            </a:r>
+            <a:r>
+              <a:rPr lang="en-US" sz="1250" dirty="0"/>
+              <a:t>/libjpeg-32b76cef.so.62.4.0</a:t>
+            </a:r>
+          </a:p>
+          <a:p>
+            <a:r>
+              <a:rPr lang="en-US" sz="1250" dirty="0"/>
+              <a:t>/home/pr/</a:t>
+            </a:r>
+            <a:r>
+              <a:rPr lang="en-US" sz="1250" dirty="0" err="1"/>
+              <a:t>venv</a:t>
+            </a:r>
+            <a:r>
+              <a:rPr lang="en-US" sz="1250" dirty="0"/>
+              <a:t>/lib/python3.11/site-packages/</a:t>
+            </a:r>
+            <a:r>
+              <a:rPr lang="en-US" sz="1250" dirty="0" err="1"/>
+              <a:t>Pillow.libs</a:t>
+            </a:r>
+            <a:r>
+              <a:rPr lang="en-US" sz="1250" dirty="0"/>
+              <a:t>/libopenjp2-20e347f0.so.2.5.0</a:t>
+            </a:r>
+          </a:p>
+          <a:p>
+            <a:r>
+              <a:rPr lang="en-US" sz="1250" dirty="0"/>
+              <a:t>/home/pr/</a:t>
+            </a:r>
+            <a:r>
+              <a:rPr lang="en-US" sz="1250" dirty="0" err="1"/>
+              <a:t>venv</a:t>
+            </a:r>
+            <a:r>
+              <a:rPr lang="en-US" sz="1250" dirty="0"/>
+              <a:t>/lib/python3.11/site-packages/</a:t>
+            </a:r>
+            <a:r>
+              <a:rPr lang="en-US" sz="1250" dirty="0" err="1"/>
+              <a:t>Pillow.libs</a:t>
+            </a:r>
+            <a:r>
+              <a:rPr lang="en-US" sz="1250" dirty="0"/>
+              <a:t>/libxcb-f0538cc0.so.1.1.0</a:t>
+            </a:r>
+          </a:p>
+          <a:p>
+            <a:r>
+              <a:rPr lang="en-US" sz="1250" dirty="0"/>
+              <a:t>/home/pr/</a:t>
+            </a:r>
+            <a:r>
+              <a:rPr lang="en-US" sz="1250" dirty="0" err="1"/>
+              <a:t>venv</a:t>
+            </a:r>
+            <a:r>
+              <a:rPr lang="en-US" sz="1250" dirty="0"/>
+              <a:t>/lib/python3.11/site-packages/</a:t>
+            </a:r>
+            <a:r>
+              <a:rPr lang="en-US" sz="1250" dirty="0" err="1"/>
+              <a:t>Pillow.libs</a:t>
+            </a:r>
+            <a:r>
+              <a:rPr lang="en-US" sz="1250" dirty="0"/>
+              <a:t>/liblzma-1e44b93d.so.5.4.4</a:t>
+            </a:r>
+          </a:p>
+          <a:p>
+            <a:r>
+              <a:rPr lang="en-US" sz="1250" dirty="0"/>
+              <a:t>/home/pr/</a:t>
+            </a:r>
+            <a:r>
+              <a:rPr lang="en-US" sz="1250" dirty="0" err="1"/>
+              <a:t>venv</a:t>
+            </a:r>
+            <a:r>
+              <a:rPr lang="en-US" sz="1250" dirty="0"/>
+              <a:t>/lib/python3.11/site-packages/</a:t>
+            </a:r>
+            <a:r>
+              <a:rPr lang="en-US" sz="1250" dirty="0" err="1"/>
+              <a:t>Pillow.libs</a:t>
+            </a:r>
+            <a:r>
+              <a:rPr lang="en-US" sz="1250" dirty="0"/>
               <a:t>/libXau-154567c4.so.6.0.0</a:t>
             </a:r>
           </a:p>
           <a:p>
             <a:r>
               <a:rPr lang="en-US" sz="1250" dirty="0"/>
-              <a:t>/home/pr/venv/lib/python3.11/site-packages/matplotlib/_path.cpython-311-x86_64-linux-gnu.so</a:t>
-            </a:r>
-          </a:p>
-          <a:p>
-            <a:r>
-              <a:rPr lang="en-US" sz="1250" dirty="0"/>
-              <a:t>/home/pr/venv/lib/python3.11/site-packages/matplotlib/ft2font.cpython-311-x86_64-linux-gnu.so</a:t>
-            </a:r>
-          </a:p>
-          <a:p>
-            <a:r>
-              <a:rPr lang="en-US" sz="1250" dirty="0"/>
-              <a:t>/home/pr/venv/lib/python3.11/site-packages/kiwisolver/_cext.cpython-311-x86_64-linux-gnu.so</a:t>
-            </a:r>
-          </a:p>
-          <a:p>
-            <a:r>
-              <a:rPr lang="en-US" sz="1250" dirty="0"/>
-              <a:t>/home/pr/venv/lib/python3.11/site-packages/matplotlib/_image.cpython-311-x86_64-linux-gnu.so</a:t>
+              <a:t>/home/pr/</a:t>
+            </a:r>
+            <a:r>
+              <a:rPr lang="en-US" sz="1250" dirty="0" err="1"/>
+              <a:t>venv</a:t>
+            </a:r>
+            <a:r>
+              <a:rPr lang="en-US" sz="1250" dirty="0"/>
+              <a:t>/lib/python3.11/site-packages/matplotlib/_path.cpython-311-x86_64-linux-gnu.so</a:t>
+            </a:r>
+          </a:p>
+          <a:p>
+            <a:r>
+              <a:rPr lang="en-US" sz="1250" dirty="0"/>
+              <a:t>/home/pr/</a:t>
+            </a:r>
+            <a:r>
+              <a:rPr lang="en-US" sz="1250" dirty="0" err="1"/>
+              <a:t>venv</a:t>
+            </a:r>
+            <a:r>
+              <a:rPr lang="en-US" sz="1250" dirty="0"/>
+              <a:t>/lib/python3.11/site-packages/matplotlib/ft2font.cpython-311-x86_64-linux-gnu.so</a:t>
+            </a:r>
+          </a:p>
+          <a:p>
+            <a:r>
+              <a:rPr lang="en-US" sz="1250" dirty="0"/>
+              <a:t>/home/pr/</a:t>
+            </a:r>
+            <a:r>
+              <a:rPr lang="en-US" sz="1250" dirty="0" err="1"/>
+              <a:t>venv</a:t>
+            </a:r>
+            <a:r>
+              <a:rPr lang="en-US" sz="1250" dirty="0"/>
+              <a:t>/lib/python3.11/site-packages/</a:t>
+            </a:r>
+            <a:r>
+              <a:rPr lang="en-US" sz="1250" dirty="0" err="1"/>
+              <a:t>kiwisolver</a:t>
+            </a:r>
+            <a:r>
+              <a:rPr lang="en-US" sz="1250" dirty="0"/>
+              <a:t>/_cext.cpython-311-x86_64-linux-gnu.so</a:t>
+            </a:r>
+          </a:p>
+          <a:p>
+            <a:r>
+              <a:rPr lang="en-US" sz="1250" dirty="0"/>
+              <a:t>/home/pr/</a:t>
+            </a:r>
+            <a:r>
+              <a:rPr lang="en-US" sz="1250" dirty="0" err="1"/>
+              <a:t>venv</a:t>
+            </a:r>
+            <a:r>
+              <a:rPr lang="en-US" sz="1250" dirty="0"/>
+              <a:t>/lib/python3.11/site-packages/matplotlib/_image.cpython-311-x86_64-linux-gnu.so</a:t>
             </a:r>
           </a:p>
         </p:txBody>

</xml_diff>